<commit_message>
Fundamentals: Update session 7
</commit_message>
<xml_diff>
--- a/fundamentals/7-Set.pptx
+++ b/fundamentals/7-Set.pptx
@@ -5,7 +5,7 @@
     <p:sldMasterId id="2147483954" r:id="rId1"/>
   </p:sldMasterIdLst>
   <p:notesMasterIdLst>
-    <p:notesMasterId r:id="rId16"/>
+    <p:notesMasterId r:id="rId18"/>
   </p:notesMasterIdLst>
   <p:sldIdLst>
     <p:sldId id="256" r:id="rId2"/>
@@ -20,8 +20,10 @@
     <p:sldId id="280" r:id="rId11"/>
     <p:sldId id="281" r:id="rId12"/>
     <p:sldId id="282" r:id="rId13"/>
-    <p:sldId id="283" r:id="rId14"/>
-    <p:sldId id="284" r:id="rId15"/>
+    <p:sldId id="286" r:id="rId14"/>
+    <p:sldId id="283" r:id="rId15"/>
+    <p:sldId id="285" r:id="rId16"/>
+    <p:sldId id="284" r:id="rId17"/>
   </p:sldIdLst>
   <p:sldSz cx="12192000" cy="6858000"/>
   <p:notesSz cx="6858000" cy="9144000"/>
@@ -213,7 +215,7 @@
           <a:p>
             <a:fld id="{720C9186-47A3-C54A-A8AF-47B660C0099D}" type="datetimeFigureOut">
               <a:rPr lang="en-US" smtClean="0"/>
-              <a:t>6/18/20</a:t>
+              <a:t>8/12/20</a:t>
             </a:fld>
             <a:endParaRPr lang="en-US"/>
           </a:p>
@@ -630,7 +632,7 @@
           <a:p>
             <a:fld id="{4AAD347D-5ACD-4C99-B74B-A9C85AD731AF}" type="datetimeFigureOut">
               <a:rPr lang="en-US" smtClean="0"/>
-              <a:t>6/18/20</a:t>
+              <a:t>8/12/20</a:t>
             </a:fld>
             <a:endParaRPr lang="en-US" dirty="0"/>
           </a:p>
@@ -830,7 +832,7 @@
           <a:p>
             <a:fld id="{4AAD347D-5ACD-4C99-B74B-A9C85AD731AF}" type="datetimeFigureOut">
               <a:rPr lang="en-US" smtClean="0"/>
-              <a:t>6/18/20</a:t>
+              <a:t>8/12/20</a:t>
             </a:fld>
             <a:endParaRPr lang="en-US" dirty="0"/>
           </a:p>
@@ -1041,7 +1043,7 @@
           <a:p>
             <a:fld id="{4AAD347D-5ACD-4C99-B74B-A9C85AD731AF}" type="datetimeFigureOut">
               <a:rPr lang="en-US" smtClean="0"/>
-              <a:t>6/18/20</a:t>
+              <a:t>8/12/20</a:t>
             </a:fld>
             <a:endParaRPr lang="en-US" dirty="0"/>
           </a:p>
@@ -1242,7 +1244,7 @@
           <a:p>
             <a:fld id="{4AAD347D-5ACD-4C99-B74B-A9C85AD731AF}" type="datetimeFigureOut">
               <a:rPr lang="en-US" smtClean="0"/>
-              <a:t>6/18/20</a:t>
+              <a:t>8/12/20</a:t>
             </a:fld>
             <a:endParaRPr lang="en-US" dirty="0"/>
           </a:p>
@@ -1519,7 +1521,7 @@
           <a:p>
             <a:fld id="{9796027F-7875-4030-9381-8BD8C4F21935}" type="datetimeFigureOut">
               <a:rPr lang="en-US" smtClean="0"/>
-              <a:t>6/18/20</a:t>
+              <a:t>8/12/20</a:t>
             </a:fld>
             <a:endParaRPr lang="en-US" dirty="0"/>
           </a:p>
@@ -1787,7 +1789,7 @@
           <a:p>
             <a:fld id="{4AAD347D-5ACD-4C99-B74B-A9C85AD731AF}" type="datetimeFigureOut">
               <a:rPr lang="en-US" smtClean="0"/>
-              <a:t>6/18/20</a:t>
+              <a:t>8/12/20</a:t>
             </a:fld>
             <a:endParaRPr lang="en-US" dirty="0"/>
           </a:p>
@@ -2208,7 +2210,7 @@
           <a:p>
             <a:fld id="{4AAD347D-5ACD-4C99-B74B-A9C85AD731AF}" type="datetimeFigureOut">
               <a:rPr lang="en-US" smtClean="0"/>
-              <a:t>6/18/20</a:t>
+              <a:t>8/12/20</a:t>
             </a:fld>
             <a:endParaRPr lang="en-US" dirty="0"/>
           </a:p>
@@ -2351,7 +2353,7 @@
           <a:p>
             <a:fld id="{4509A250-FF31-4206-8172-F9D3106AACB1}" type="datetimeFigureOut">
               <a:rPr lang="en-US" smtClean="0"/>
-              <a:t>6/18/20</a:t>
+              <a:t>8/12/20</a:t>
             </a:fld>
             <a:endParaRPr lang="en-US" dirty="0"/>
           </a:p>
@@ -2464,7 +2466,7 @@
           <a:p>
             <a:fld id="{4509A250-FF31-4206-8172-F9D3106AACB1}" type="datetimeFigureOut">
               <a:rPr lang="en-US" smtClean="0"/>
-              <a:t>6/18/20</a:t>
+              <a:t>8/12/20</a:t>
             </a:fld>
             <a:endParaRPr lang="en-US" dirty="0"/>
           </a:p>
@@ -2777,7 +2779,7 @@
           <a:p>
             <a:fld id="{4AAD347D-5ACD-4C99-B74B-A9C85AD731AF}" type="datetimeFigureOut">
               <a:rPr lang="en-US" smtClean="0"/>
-              <a:t>6/18/20</a:t>
+              <a:t>8/12/20</a:t>
             </a:fld>
             <a:endParaRPr lang="en-US" dirty="0"/>
           </a:p>
@@ -3072,7 +3074,7 @@
           <a:p>
             <a:fld id="{4509A250-FF31-4206-8172-F9D3106AACB1}" type="datetimeFigureOut">
               <a:rPr lang="en-US" smtClean="0"/>
-              <a:t>6/18/20</a:t>
+              <a:t>8/12/20</a:t>
             </a:fld>
             <a:endParaRPr lang="en-US" dirty="0"/>
           </a:p>
@@ -3315,7 +3317,7 @@
           <a:p>
             <a:fld id="{4AAD347D-5ACD-4C99-B74B-A9C85AD731AF}" type="datetimeFigureOut">
               <a:rPr lang="en-US" smtClean="0"/>
-              <a:t>6/18/20</a:t>
+              <a:t>8/12/20</a:t>
             </a:fld>
             <a:endParaRPr lang="en-US" dirty="0"/>
           </a:p>
@@ -5813,7 +5815,7 @@
         </p:spPr>
         <p:txBody>
           <a:bodyPr>
-            <a:normAutofit fontScale="55000" lnSpcReduction="20000"/>
+            <a:normAutofit fontScale="92500" lnSpcReduction="10000"/>
           </a:bodyPr>
           <a:lstStyle/>
           <a:p>
@@ -6058,283 +6060,6 @@
               <a:latin typeface="Consolas" panose="020B0609020204030204" pitchFamily="49" charset="0"/>
               <a:cs typeface="Consolas" panose="020B0609020204030204" pitchFamily="49" charset="0"/>
             </a:endParaRPr>
-          </a:p>
-          <a:p>
-            <a:r>
-              <a:rPr lang="en-US" b="1" dirty="0">
-                <a:solidFill>
-                  <a:schemeClr val="tx2">
-                    <a:lumMod val="75000"/>
-                  </a:schemeClr>
-                </a:solidFill>
-                <a:latin typeface="Consolas" panose="020B0609020204030204" pitchFamily="49" charset="0"/>
-                <a:cs typeface="Consolas" panose="020B0609020204030204" pitchFamily="49" charset="0"/>
-              </a:rPr>
-              <a:t>remove(</a:t>
-            </a:r>
-            <a:r>
-              <a:rPr lang="en-US" b="1" dirty="0" err="1">
-                <a:solidFill>
-                  <a:schemeClr val="tx2">
-                    <a:lumMod val="75000"/>
-                  </a:schemeClr>
-                </a:solidFill>
-                <a:latin typeface="Consolas" panose="020B0609020204030204" pitchFamily="49" charset="0"/>
-                <a:cs typeface="Consolas" panose="020B0609020204030204" pitchFamily="49" charset="0"/>
-              </a:rPr>
-              <a:t>elem</a:t>
-            </a:r>
-            <a:r>
-              <a:rPr lang="en-US" b="1" dirty="0">
-                <a:solidFill>
-                  <a:schemeClr val="tx2">
-                    <a:lumMod val="75000"/>
-                  </a:schemeClr>
-                </a:solidFill>
-                <a:latin typeface="Consolas" panose="020B0609020204030204" pitchFamily="49" charset="0"/>
-                <a:cs typeface="Consolas" panose="020B0609020204030204" pitchFamily="49" charset="0"/>
-              </a:rPr>
-              <a:t>) </a:t>
-            </a:r>
-            <a:r>
-              <a:rPr lang="en-US" dirty="0">
-                <a:solidFill>
-                  <a:schemeClr val="tx2">
-                    <a:lumMod val="75000"/>
-                  </a:schemeClr>
-                </a:solidFill>
-              </a:rPr>
-              <a:t>Remove element </a:t>
-            </a:r>
-            <a:r>
-              <a:rPr lang="en-US" dirty="0" err="1">
-                <a:solidFill>
-                  <a:schemeClr val="tx2">
-                    <a:lumMod val="75000"/>
-                  </a:schemeClr>
-                </a:solidFill>
-              </a:rPr>
-              <a:t>elem</a:t>
-            </a:r>
-            <a:r>
-              <a:rPr lang="en-US" dirty="0">
-                <a:solidFill>
-                  <a:schemeClr val="tx2">
-                    <a:lumMod val="75000"/>
-                  </a:schemeClr>
-                </a:solidFill>
-              </a:rPr>
-              <a:t> from the set. Raises </a:t>
-            </a:r>
-            <a:r>
-              <a:rPr lang="en-US" dirty="0" err="1">
-                <a:solidFill>
-                  <a:schemeClr val="tx2">
-                    <a:lumMod val="75000"/>
-                  </a:schemeClr>
-                </a:solidFill>
-              </a:rPr>
-              <a:t>KeyError</a:t>
-            </a:r>
-            <a:r>
-              <a:rPr lang="en-US" dirty="0">
-                <a:solidFill>
-                  <a:schemeClr val="tx2">
-                    <a:lumMod val="75000"/>
-                  </a:schemeClr>
-                </a:solidFill>
-              </a:rPr>
-              <a:t> if </a:t>
-            </a:r>
-            <a:r>
-              <a:rPr lang="en-US" dirty="0" err="1">
-                <a:solidFill>
-                  <a:schemeClr val="tx2">
-                    <a:lumMod val="75000"/>
-                  </a:schemeClr>
-                </a:solidFill>
-              </a:rPr>
-              <a:t>elem</a:t>
-            </a:r>
-            <a:r>
-              <a:rPr lang="en-US" dirty="0">
-                <a:solidFill>
-                  <a:schemeClr val="tx2">
-                    <a:lumMod val="75000"/>
-                  </a:schemeClr>
-                </a:solidFill>
-              </a:rPr>
-              <a:t> is not contained in the set.</a:t>
-            </a:r>
-          </a:p>
-          <a:p>
-            <a:endParaRPr lang="en-US" b="1" dirty="0">
-              <a:solidFill>
-                <a:schemeClr val="tx2">
-                  <a:lumMod val="75000"/>
-                </a:schemeClr>
-              </a:solidFill>
-              <a:latin typeface="Consolas" panose="020B0609020204030204" pitchFamily="49" charset="0"/>
-              <a:cs typeface="Consolas" panose="020B0609020204030204" pitchFamily="49" charset="0"/>
-            </a:endParaRPr>
-          </a:p>
-          <a:p>
-            <a:r>
-              <a:rPr lang="en-US" b="1" dirty="0">
-                <a:solidFill>
-                  <a:schemeClr val="tx2">
-                    <a:lumMod val="75000"/>
-                  </a:schemeClr>
-                </a:solidFill>
-                <a:latin typeface="Consolas" panose="020B0609020204030204" pitchFamily="49" charset="0"/>
-                <a:cs typeface="Consolas" panose="020B0609020204030204" pitchFamily="49" charset="0"/>
-              </a:rPr>
-              <a:t>discard(</a:t>
-            </a:r>
-            <a:r>
-              <a:rPr lang="en-US" b="1" dirty="0" err="1">
-                <a:solidFill>
-                  <a:schemeClr val="tx2">
-                    <a:lumMod val="75000"/>
-                  </a:schemeClr>
-                </a:solidFill>
-                <a:latin typeface="Consolas" panose="020B0609020204030204" pitchFamily="49" charset="0"/>
-                <a:cs typeface="Consolas" panose="020B0609020204030204" pitchFamily="49" charset="0"/>
-              </a:rPr>
-              <a:t>elem</a:t>
-            </a:r>
-            <a:r>
-              <a:rPr lang="en-US" b="1" dirty="0">
-                <a:solidFill>
-                  <a:schemeClr val="tx2">
-                    <a:lumMod val="75000"/>
-                  </a:schemeClr>
-                </a:solidFill>
-                <a:latin typeface="Consolas" panose="020B0609020204030204" pitchFamily="49" charset="0"/>
-                <a:cs typeface="Consolas" panose="020B0609020204030204" pitchFamily="49" charset="0"/>
-              </a:rPr>
-              <a:t>)</a:t>
-            </a:r>
-            <a:r>
-              <a:rPr lang="en-US" dirty="0">
-                <a:solidFill>
-                  <a:schemeClr val="tx2">
-                    <a:lumMod val="75000"/>
-                  </a:schemeClr>
-                </a:solidFill>
-              </a:rPr>
-              <a:t> Remove element </a:t>
-            </a:r>
-            <a:r>
-              <a:rPr lang="en-US" dirty="0" err="1">
-                <a:solidFill>
-                  <a:schemeClr val="tx2">
-                    <a:lumMod val="75000"/>
-                  </a:schemeClr>
-                </a:solidFill>
-              </a:rPr>
-              <a:t>elem</a:t>
-            </a:r>
-            <a:r>
-              <a:rPr lang="en-US" dirty="0">
-                <a:solidFill>
-                  <a:schemeClr val="tx2">
-                    <a:lumMod val="75000"/>
-                  </a:schemeClr>
-                </a:solidFill>
-              </a:rPr>
-              <a:t> from the set if it is present.</a:t>
-            </a:r>
-          </a:p>
-          <a:p>
-            <a:endParaRPr lang="en-US" b="1" dirty="0">
-              <a:solidFill>
-                <a:schemeClr val="tx2">
-                  <a:lumMod val="75000"/>
-                </a:schemeClr>
-              </a:solidFill>
-              <a:latin typeface="Consolas" panose="020B0609020204030204" pitchFamily="49" charset="0"/>
-              <a:cs typeface="Consolas" panose="020B0609020204030204" pitchFamily="49" charset="0"/>
-            </a:endParaRPr>
-          </a:p>
-          <a:p>
-            <a:r>
-              <a:rPr lang="en-US" b="1" dirty="0">
-                <a:solidFill>
-                  <a:schemeClr val="tx2">
-                    <a:lumMod val="75000"/>
-                  </a:schemeClr>
-                </a:solidFill>
-                <a:latin typeface="Consolas" panose="020B0609020204030204" pitchFamily="49" charset="0"/>
-                <a:cs typeface="Consolas" panose="020B0609020204030204" pitchFamily="49" charset="0"/>
-              </a:rPr>
-              <a:t>pop()</a:t>
-            </a:r>
-            <a:r>
-              <a:rPr lang="en-US" dirty="0">
-                <a:solidFill>
-                  <a:schemeClr val="tx2">
-                    <a:lumMod val="75000"/>
-                  </a:schemeClr>
-                </a:solidFill>
-              </a:rPr>
-              <a:t> Remove and return an arbitrary element from the set. Raises </a:t>
-            </a:r>
-            <a:r>
-              <a:rPr lang="en-US" dirty="0" err="1">
-                <a:solidFill>
-                  <a:schemeClr val="tx2">
-                    <a:lumMod val="75000"/>
-                  </a:schemeClr>
-                </a:solidFill>
-              </a:rPr>
-              <a:t>KeyError</a:t>
-            </a:r>
-            <a:r>
-              <a:rPr lang="en-US" dirty="0">
-                <a:solidFill>
-                  <a:schemeClr val="tx2">
-                    <a:lumMod val="75000"/>
-                  </a:schemeClr>
-                </a:solidFill>
-              </a:rPr>
-              <a:t> if the set is empty.</a:t>
-            </a:r>
-          </a:p>
-          <a:p>
-            <a:endParaRPr lang="en-US" b="1" dirty="0">
-              <a:solidFill>
-                <a:schemeClr val="tx2">
-                  <a:lumMod val="75000"/>
-                </a:schemeClr>
-              </a:solidFill>
-              <a:latin typeface="Consolas" panose="020B0609020204030204" pitchFamily="49" charset="0"/>
-              <a:cs typeface="Consolas" panose="020B0609020204030204" pitchFamily="49" charset="0"/>
-            </a:endParaRPr>
-          </a:p>
-          <a:p>
-            <a:r>
-              <a:rPr lang="en-US" b="1" dirty="0">
-                <a:solidFill>
-                  <a:schemeClr val="tx2">
-                    <a:lumMod val="75000"/>
-                  </a:schemeClr>
-                </a:solidFill>
-                <a:latin typeface="Consolas" panose="020B0609020204030204" pitchFamily="49" charset="0"/>
-                <a:cs typeface="Consolas" panose="020B0609020204030204" pitchFamily="49" charset="0"/>
-              </a:rPr>
-              <a:t>clear() </a:t>
-            </a:r>
-            <a:r>
-              <a:rPr lang="en-US" dirty="0">
-                <a:solidFill>
-                  <a:schemeClr val="tx2">
-                    <a:lumMod val="75000"/>
-                  </a:schemeClr>
-                </a:solidFill>
-              </a:rPr>
-              <a:t>Remove all elements from the set.</a:t>
-            </a:r>
           </a:p>
         </p:txBody>
       </p:sp>
@@ -6354,14 +6079,6 @@
 <file path=ppt/slides/slide13.xml><?xml version="1.0" encoding="utf-8"?>
 <p:sld xmlns:a="http://schemas.openxmlformats.org/drawingml/2006/main" xmlns:r="http://schemas.openxmlformats.org/officeDocument/2006/relationships" xmlns:p="http://schemas.openxmlformats.org/presentationml/2006/main">
   <p:cSld>
-    <p:bg>
-      <p:bgPr>
-        <a:solidFill>
-          <a:schemeClr val="bg1"/>
-        </a:solidFill>
-        <a:effectLst/>
-      </p:bgPr>
-    </p:bg>
     <p:spTree>
       <p:nvGrpSpPr>
         <p:cNvPr id="1" name=""/>
@@ -6378,51 +6095,10 @@
       </p:grpSpPr>
       <p:sp>
         <p:nvSpPr>
-          <p:cNvPr id="2" name="Title 1">
-            <a:extLst>
-              <a:ext uri="{FF2B5EF4-FFF2-40B4-BE49-F238E27FC236}">
-                <a16:creationId xmlns:a16="http://schemas.microsoft.com/office/drawing/2014/main" id="{D6DB001F-B6AE-A14E-8017-DE33E26EAD9D}"/>
-              </a:ext>
-            </a:extLst>
-          </p:cNvPr>
-          <p:cNvSpPr>
-            <a:spLocks noGrp="1"/>
-          </p:cNvSpPr>
-          <p:nvPr>
-            <p:ph type="title"/>
-          </p:nvPr>
-        </p:nvSpPr>
-        <p:spPr>
-          <a:xfrm>
-            <a:off x="1175512" y="870132"/>
-            <a:ext cx="9792208" cy="1527078"/>
-          </a:xfrm>
-        </p:spPr>
-        <p:txBody>
-          <a:bodyPr>
-            <a:normAutofit/>
-          </a:bodyPr>
-          <a:lstStyle/>
-          <a:p>
-            <a:r>
-              <a:rPr lang="en-US" dirty="0">
-                <a:solidFill>
-                  <a:schemeClr val="tx2">
-                    <a:lumMod val="75000"/>
-                  </a:schemeClr>
-                </a:solidFill>
-              </a:rPr>
-              <a:t>Frozenset</a:t>
-            </a:r>
-          </a:p>
-        </p:txBody>
-      </p:sp>
-      <p:sp>
-        <p:nvSpPr>
           <p:cNvPr id="3" name="Content Placeholder 2">
             <a:extLst>
               <a:ext uri="{FF2B5EF4-FFF2-40B4-BE49-F238E27FC236}">
-                <a16:creationId xmlns:a16="http://schemas.microsoft.com/office/drawing/2014/main" id="{9FD0CF55-E955-3E4E-9AA9-0202855DEBEC}"/>
+                <a16:creationId xmlns:a16="http://schemas.microsoft.com/office/drawing/2014/main" id="{909FDBA1-7B9C-6A42-B484-7B69CF19F10F}"/>
               </a:ext>
             </a:extLst>
           </p:cNvPr>
@@ -6435,229 +6111,160 @@
         </p:nvSpPr>
         <p:spPr>
           <a:xfrm>
-            <a:off x="1175512" y="2557849"/>
-            <a:ext cx="9792208" cy="3407862"/>
-          </a:xfrm>
-        </p:spPr>
-        <p:txBody>
-          <a:bodyPr>
-            <a:normAutofit fontScale="92500" lnSpcReduction="20000"/>
-          </a:bodyPr>
-          <a:lstStyle/>
-          <a:p>
-            <a:r>
-              <a:rPr lang="en-US" dirty="0">
-                <a:solidFill>
-                  <a:schemeClr val="tx2">
-                    <a:lumMod val="75000"/>
-                  </a:schemeClr>
-                </a:solidFill>
-              </a:rPr>
-              <a:t>Frozenset is a set but is also </a:t>
-            </a:r>
+            <a:off x="811658" y="924674"/>
+            <a:ext cx="10542142" cy="5252289"/>
+          </a:xfrm>
+        </p:spPr>
+        <p:txBody>
+          <a:bodyPr/>
+          <a:lstStyle/>
+          <a:p>
             <a:r>
               <a:rPr lang="en-US" b="1" dirty="0">
-                <a:solidFill>
-                  <a:schemeClr val="tx2">
-                    <a:lumMod val="75000"/>
-                  </a:schemeClr>
-                </a:solidFill>
-              </a:rPr>
-              <a:t>immutable</a:t>
-            </a:r>
-          </a:p>
-          <a:p>
-            <a:r>
-              <a:rPr lang="en-US" dirty="0">
-                <a:solidFill>
-                  <a:schemeClr val="tx2">
-                    <a:lumMod val="75000"/>
-                  </a:schemeClr>
-                </a:solidFill>
                 <a:latin typeface="Consolas" panose="020B0609020204030204" pitchFamily="49" charset="0"/>
                 <a:cs typeface="Consolas" panose="020B0609020204030204" pitchFamily="49" charset="0"/>
               </a:rPr>
-              <a:t>$ </a:t>
-            </a:r>
-            <a:r>
-              <a:rPr lang="en-US" dirty="0" err="1">
-                <a:solidFill>
-                  <a:schemeClr val="tx2">
-                    <a:lumMod val="75000"/>
-                  </a:schemeClr>
-                </a:solidFill>
+              <a:t>remove(</a:t>
+            </a:r>
+            <a:r>
+              <a:rPr lang="en-US" b="1" dirty="0" err="1">
                 <a:latin typeface="Consolas" panose="020B0609020204030204" pitchFamily="49" charset="0"/>
                 <a:cs typeface="Consolas" panose="020B0609020204030204" pitchFamily="49" charset="0"/>
               </a:rPr>
-              <a:t>fset</a:t>
-            </a:r>
-            <a:r>
-              <a:rPr lang="en-US" dirty="0">
-                <a:solidFill>
-                  <a:schemeClr val="tx2">
-                    <a:lumMod val="75000"/>
-                  </a:schemeClr>
-                </a:solidFill>
+              <a:t>elem</a:t>
+            </a:r>
+            <a:r>
+              <a:rPr lang="en-US" b="1" dirty="0">
                 <a:latin typeface="Consolas" panose="020B0609020204030204" pitchFamily="49" charset="0"/>
                 <a:cs typeface="Consolas" panose="020B0609020204030204" pitchFamily="49" charset="0"/>
               </a:rPr>
-              <a:t> = frozenset( { 5, “five”, ‘f’ } )</a:t>
-            </a:r>
-          </a:p>
-          <a:p>
-            <a:r>
-              <a:rPr lang="en-US" dirty="0">
-                <a:solidFill>
-                  <a:schemeClr val="tx2">
-                    <a:lumMod val="75000"/>
-                  </a:schemeClr>
-                </a:solidFill>
-                <a:latin typeface="Consolas" panose="020B0609020204030204" pitchFamily="49" charset="0"/>
-                <a:cs typeface="Consolas" panose="020B0609020204030204" pitchFamily="49" charset="0"/>
-              </a:rPr>
-              <a:t>membership</a:t>
-            </a:r>
-          </a:p>
-          <a:p>
-            <a:r>
-              <a:rPr lang="en-US" dirty="0">
-                <a:solidFill>
-                  <a:schemeClr val="tx2">
-                    <a:lumMod val="75000"/>
-                  </a:schemeClr>
-                </a:solidFill>
-                <a:latin typeface="Consolas" panose="020B0609020204030204" pitchFamily="49" charset="0"/>
-                <a:cs typeface="Consolas" panose="020B0609020204030204" pitchFamily="49" charset="0"/>
-              </a:rPr>
-              <a:t>subset</a:t>
-            </a:r>
-          </a:p>
-          <a:p>
-            <a:r>
-              <a:rPr lang="en-US" dirty="0">
-                <a:solidFill>
-                  <a:schemeClr val="tx2">
-                    <a:lumMod val="75000"/>
-                  </a:schemeClr>
-                </a:solidFill>
-                <a:latin typeface="Consolas" panose="020B0609020204030204" pitchFamily="49" charset="0"/>
-                <a:cs typeface="Consolas" panose="020B0609020204030204" pitchFamily="49" charset="0"/>
-              </a:rPr>
-              <a:t>union</a:t>
-            </a:r>
-          </a:p>
-          <a:p>
-            <a:r>
-              <a:rPr lang="en-US" dirty="0">
-                <a:solidFill>
-                  <a:schemeClr val="tx2">
-                    <a:lumMod val="75000"/>
-                  </a:schemeClr>
-                </a:solidFill>
-                <a:latin typeface="Consolas" panose="020B0609020204030204" pitchFamily="49" charset="0"/>
-                <a:cs typeface="Consolas" panose="020B0609020204030204" pitchFamily="49" charset="0"/>
-              </a:rPr>
-              <a:t>intersection</a:t>
-            </a:r>
-          </a:p>
-          <a:p>
-            <a:r>
-              <a:rPr lang="en-US" dirty="0">
-                <a:solidFill>
-                  <a:schemeClr val="tx2">
-                    <a:lumMod val="75000"/>
-                  </a:schemeClr>
-                </a:solidFill>
-                <a:latin typeface="Consolas" panose="020B0609020204030204" pitchFamily="49" charset="0"/>
-                <a:cs typeface="Consolas" panose="020B0609020204030204" pitchFamily="49" charset="0"/>
-              </a:rPr>
-              <a:t>difference</a:t>
-            </a:r>
-          </a:p>
-          <a:p>
-            <a:r>
-              <a:rPr lang="en-US" dirty="0" err="1">
-                <a:solidFill>
-                  <a:schemeClr val="tx2">
-                    <a:lumMod val="75000"/>
-                  </a:schemeClr>
-                </a:solidFill>
-                <a:latin typeface="Consolas" panose="020B0609020204030204" pitchFamily="49" charset="0"/>
-                <a:cs typeface="Consolas" panose="020B0609020204030204" pitchFamily="49" charset="0"/>
-              </a:rPr>
-              <a:t>symmetric_difference</a:t>
-            </a:r>
-            <a:endParaRPr lang="en-US" dirty="0">
-              <a:solidFill>
-                <a:schemeClr val="tx2">
-                  <a:lumMod val="75000"/>
-                </a:schemeClr>
-              </a:solidFill>
+              <a:t>) </a:t>
+            </a:r>
+            <a:r>
+              <a:rPr lang="en-US" dirty="0"/>
+              <a:t>Remove element </a:t>
+            </a:r>
+            <a:r>
+              <a:rPr lang="en-US" dirty="0" err="1"/>
+              <a:t>elem</a:t>
+            </a:r>
+            <a:r>
+              <a:rPr lang="en-US" dirty="0"/>
+              <a:t> from the set. Raises </a:t>
+            </a:r>
+            <a:r>
+              <a:rPr lang="en-US" dirty="0" err="1"/>
+              <a:t>KeyError</a:t>
+            </a:r>
+            <a:r>
+              <a:rPr lang="en-US" dirty="0"/>
+              <a:t> if </a:t>
+            </a:r>
+            <a:r>
+              <a:rPr lang="en-US" dirty="0" err="1"/>
+              <a:t>elem</a:t>
+            </a:r>
+            <a:r>
+              <a:rPr lang="en-US" dirty="0"/>
+              <a:t> is not contained in the set.</a:t>
+            </a:r>
+          </a:p>
+          <a:p>
+            <a:endParaRPr lang="en-US" b="1" dirty="0">
               <a:latin typeface="Consolas" panose="020B0609020204030204" pitchFamily="49" charset="0"/>
               <a:cs typeface="Consolas" panose="020B0609020204030204" pitchFamily="49" charset="0"/>
             </a:endParaRPr>
           </a:p>
-        </p:txBody>
-      </p:sp>
-      <p:sp>
-        <p:nvSpPr>
-          <p:cNvPr id="4" name="TextBox 3">
-            <a:extLst>
-              <a:ext uri="{FF2B5EF4-FFF2-40B4-BE49-F238E27FC236}">
-                <a16:creationId xmlns:a16="http://schemas.microsoft.com/office/drawing/2014/main" id="{B5E6F5D9-3EE5-774F-BA49-4D6C5A5BDF22}"/>
-              </a:ext>
-            </a:extLst>
-          </p:cNvPr>
-          <p:cNvSpPr txBox="1"/>
-          <p:nvPr/>
-        </p:nvSpPr>
-        <p:spPr>
-          <a:xfrm>
-            <a:off x="3227832" y="5961414"/>
-            <a:ext cx="4490332" cy="646331"/>
-          </a:xfrm>
-          <a:prstGeom prst="rect">
-            <a:avLst/>
-          </a:prstGeom>
-          <a:noFill/>
-        </p:spPr>
-        <p:txBody>
-          <a:bodyPr wrap="none" rtlCol="0">
-            <a:spAutoFit/>
-          </a:bodyPr>
-          <a:lstStyle/>
-          <a:p>
-            <a:r>
-              <a:rPr lang="en-US" dirty="0">
-                <a:solidFill>
-                  <a:schemeClr val="tx2">
-                    <a:lumMod val="75000"/>
-                  </a:schemeClr>
-                </a:solidFill>
+          <a:p>
+            <a:r>
+              <a:rPr lang="en-US" b="1" dirty="0">
                 <a:latin typeface="Consolas" panose="020B0609020204030204" pitchFamily="49" charset="0"/>
                 <a:cs typeface="Consolas" panose="020B0609020204030204" pitchFamily="49" charset="0"/>
               </a:rPr>
-              <a:t># A set can contain a frozenset</a:t>
-            </a:r>
-          </a:p>
-          <a:p>
-            <a:r>
-              <a:rPr lang="en-US" dirty="0">
-                <a:solidFill>
-                  <a:srgbClr val="FF0000"/>
-                </a:solidFill>
+              <a:t>discard(</a:t>
+            </a:r>
+            <a:r>
+              <a:rPr lang="en-US" b="1" dirty="0" err="1">
                 <a:latin typeface="Consolas" panose="020B0609020204030204" pitchFamily="49" charset="0"/>
                 <a:cs typeface="Consolas" panose="020B0609020204030204" pitchFamily="49" charset="0"/>
               </a:rPr>
-              <a:t># A frozenset cannot contain a set</a:t>
-            </a:r>
+              <a:t>elem</a:t>
+            </a:r>
+            <a:r>
+              <a:rPr lang="en-US" b="1" dirty="0">
+                <a:latin typeface="Consolas" panose="020B0609020204030204" pitchFamily="49" charset="0"/>
+                <a:cs typeface="Consolas" panose="020B0609020204030204" pitchFamily="49" charset="0"/>
+              </a:rPr>
+              <a:t>)</a:t>
+            </a:r>
+            <a:r>
+              <a:rPr lang="en-US" dirty="0"/>
+              <a:t> Remove element </a:t>
+            </a:r>
+            <a:r>
+              <a:rPr lang="en-US" dirty="0" err="1"/>
+              <a:t>elem</a:t>
+            </a:r>
+            <a:r>
+              <a:rPr lang="en-US" dirty="0"/>
+              <a:t> from the set if it is present.</a:t>
+            </a:r>
+          </a:p>
+          <a:p>
+            <a:endParaRPr lang="en-US" b="1" dirty="0">
+              <a:latin typeface="Consolas" panose="020B0609020204030204" pitchFamily="49" charset="0"/>
+              <a:cs typeface="Consolas" panose="020B0609020204030204" pitchFamily="49" charset="0"/>
+            </a:endParaRPr>
+          </a:p>
+          <a:p>
+            <a:r>
+              <a:rPr lang="en-US" b="1" dirty="0">
+                <a:latin typeface="Consolas" panose="020B0609020204030204" pitchFamily="49" charset="0"/>
+                <a:cs typeface="Consolas" panose="020B0609020204030204" pitchFamily="49" charset="0"/>
+              </a:rPr>
+              <a:t>pop()</a:t>
+            </a:r>
+            <a:r>
+              <a:rPr lang="en-US" dirty="0"/>
+              <a:t> Remove and return an arbitrary element from the set. Raises </a:t>
+            </a:r>
+            <a:r>
+              <a:rPr lang="en-US" dirty="0" err="1"/>
+              <a:t>KeyError</a:t>
+            </a:r>
+            <a:r>
+              <a:rPr lang="en-US" dirty="0"/>
+              <a:t> if the set is empty.</a:t>
+            </a:r>
+          </a:p>
+          <a:p>
+            <a:endParaRPr lang="en-US" b="1" dirty="0">
+              <a:latin typeface="Consolas" panose="020B0609020204030204" pitchFamily="49" charset="0"/>
+              <a:cs typeface="Consolas" panose="020B0609020204030204" pitchFamily="49" charset="0"/>
+            </a:endParaRPr>
+          </a:p>
+          <a:p>
+            <a:r>
+              <a:rPr lang="en-US" b="1" dirty="0">
+                <a:latin typeface="Consolas" panose="020B0609020204030204" pitchFamily="49" charset="0"/>
+                <a:cs typeface="Consolas" panose="020B0609020204030204" pitchFamily="49" charset="0"/>
+              </a:rPr>
+              <a:t>clear() </a:t>
+            </a:r>
+            <a:r>
+              <a:rPr lang="en-US" dirty="0"/>
+              <a:t>Remove all elements from the set.</a:t>
+            </a:r>
+          </a:p>
+          <a:p>
+            <a:endParaRPr lang="en-US" dirty="0"/>
           </a:p>
         </p:txBody>
       </p:sp>
     </p:spTree>
     <p:extLst>
       <p:ext uri="{BB962C8B-B14F-4D97-AF65-F5344CB8AC3E}">
-        <p14:creationId xmlns:p14="http://schemas.microsoft.com/office/powerpoint/2010/main" val="3691368440"/>
+        <p14:creationId xmlns:p14="http://schemas.microsoft.com/office/powerpoint/2010/main" val="3041167175"/>
       </p:ext>
     </p:extLst>
   </p:cSld>
@@ -6697,7 +6304,7 @@
           <p:cNvPr id="2" name="Title 1">
             <a:extLst>
               <a:ext uri="{FF2B5EF4-FFF2-40B4-BE49-F238E27FC236}">
-                <a16:creationId xmlns:a16="http://schemas.microsoft.com/office/drawing/2014/main" id="{20404047-9EB1-AE49-833E-4570DD2E0571}"/>
+                <a16:creationId xmlns:a16="http://schemas.microsoft.com/office/drawing/2014/main" id="{D6DB001F-B6AE-A14E-8017-DE33E26EAD9D}"/>
               </a:ext>
             </a:extLst>
           </p:cNvPr>
@@ -6728,7 +6335,7 @@
                   </a:schemeClr>
                 </a:solidFill>
               </a:rPr>
-              <a:t>Exercises</a:t>
+              <a:t>Frozenset</a:t>
             </a:r>
           </a:p>
         </p:txBody>
@@ -6738,7 +6345,7 @@
           <p:cNvPr id="3" name="Content Placeholder 2">
             <a:extLst>
               <a:ext uri="{FF2B5EF4-FFF2-40B4-BE49-F238E27FC236}">
-                <a16:creationId xmlns:a16="http://schemas.microsoft.com/office/drawing/2014/main" id="{A82F16F2-1066-DD45-81FD-C06CDE640212}"/>
+                <a16:creationId xmlns:a16="http://schemas.microsoft.com/office/drawing/2014/main" id="{9FD0CF55-E955-3E4E-9AA9-0202855DEBEC}"/>
               </a:ext>
             </a:extLst>
           </p:cNvPr>
@@ -6751,6 +6358,858 @@
         </p:nvSpPr>
         <p:spPr>
           <a:xfrm>
+            <a:off x="1175512" y="2568123"/>
+            <a:ext cx="9792208" cy="3407862"/>
+          </a:xfrm>
+        </p:spPr>
+        <p:txBody>
+          <a:bodyPr>
+            <a:normAutofit fontScale="92500" lnSpcReduction="20000"/>
+          </a:bodyPr>
+          <a:lstStyle/>
+          <a:p>
+            <a:r>
+              <a:rPr lang="en-US" dirty="0">
+                <a:solidFill>
+                  <a:schemeClr val="tx2">
+                    <a:lumMod val="75000"/>
+                  </a:schemeClr>
+                </a:solidFill>
+              </a:rPr>
+              <a:t>Frozenset is a set but is also </a:t>
+            </a:r>
+            <a:r>
+              <a:rPr lang="en-US" b="1" dirty="0">
+                <a:solidFill>
+                  <a:schemeClr val="tx2">
+                    <a:lumMod val="75000"/>
+                  </a:schemeClr>
+                </a:solidFill>
+              </a:rPr>
+              <a:t>immutable</a:t>
+            </a:r>
+          </a:p>
+          <a:p>
+            <a:r>
+              <a:rPr lang="en-US" dirty="0">
+                <a:solidFill>
+                  <a:schemeClr val="tx2">
+                    <a:lumMod val="75000"/>
+                  </a:schemeClr>
+                </a:solidFill>
+                <a:latin typeface="Consolas" panose="020B0609020204030204" pitchFamily="49" charset="0"/>
+                <a:cs typeface="Consolas" panose="020B0609020204030204" pitchFamily="49" charset="0"/>
+              </a:rPr>
+              <a:t>$ </a:t>
+            </a:r>
+            <a:r>
+              <a:rPr lang="en-US" dirty="0" err="1">
+                <a:solidFill>
+                  <a:schemeClr val="tx2">
+                    <a:lumMod val="75000"/>
+                  </a:schemeClr>
+                </a:solidFill>
+                <a:latin typeface="Consolas" panose="020B0609020204030204" pitchFamily="49" charset="0"/>
+                <a:cs typeface="Consolas" panose="020B0609020204030204" pitchFamily="49" charset="0"/>
+              </a:rPr>
+              <a:t>fset</a:t>
+            </a:r>
+            <a:r>
+              <a:rPr lang="en-US" dirty="0">
+                <a:solidFill>
+                  <a:schemeClr val="tx2">
+                    <a:lumMod val="75000"/>
+                  </a:schemeClr>
+                </a:solidFill>
+                <a:latin typeface="Consolas" panose="020B0609020204030204" pitchFamily="49" charset="0"/>
+                <a:cs typeface="Consolas" panose="020B0609020204030204" pitchFamily="49" charset="0"/>
+              </a:rPr>
+              <a:t> = frozenset( { 5, “five”, ‘f’ } )</a:t>
+            </a:r>
+          </a:p>
+          <a:p>
+            <a:r>
+              <a:rPr lang="en-US" dirty="0">
+                <a:solidFill>
+                  <a:schemeClr val="tx2">
+                    <a:lumMod val="75000"/>
+                  </a:schemeClr>
+                </a:solidFill>
+                <a:latin typeface="Consolas" panose="020B0609020204030204" pitchFamily="49" charset="0"/>
+                <a:cs typeface="Consolas" panose="020B0609020204030204" pitchFamily="49" charset="0"/>
+              </a:rPr>
+              <a:t>membership</a:t>
+            </a:r>
+          </a:p>
+          <a:p>
+            <a:r>
+              <a:rPr lang="en-US" dirty="0">
+                <a:solidFill>
+                  <a:schemeClr val="tx2">
+                    <a:lumMod val="75000"/>
+                  </a:schemeClr>
+                </a:solidFill>
+                <a:latin typeface="Consolas" panose="020B0609020204030204" pitchFamily="49" charset="0"/>
+                <a:cs typeface="Consolas" panose="020B0609020204030204" pitchFamily="49" charset="0"/>
+              </a:rPr>
+              <a:t>subset</a:t>
+            </a:r>
+          </a:p>
+          <a:p>
+            <a:r>
+              <a:rPr lang="en-US" dirty="0">
+                <a:solidFill>
+                  <a:schemeClr val="tx2">
+                    <a:lumMod val="75000"/>
+                  </a:schemeClr>
+                </a:solidFill>
+                <a:latin typeface="Consolas" panose="020B0609020204030204" pitchFamily="49" charset="0"/>
+                <a:cs typeface="Consolas" panose="020B0609020204030204" pitchFamily="49" charset="0"/>
+              </a:rPr>
+              <a:t>union</a:t>
+            </a:r>
+          </a:p>
+          <a:p>
+            <a:r>
+              <a:rPr lang="en-US" dirty="0">
+                <a:solidFill>
+                  <a:schemeClr val="tx2">
+                    <a:lumMod val="75000"/>
+                  </a:schemeClr>
+                </a:solidFill>
+                <a:latin typeface="Consolas" panose="020B0609020204030204" pitchFamily="49" charset="0"/>
+                <a:cs typeface="Consolas" panose="020B0609020204030204" pitchFamily="49" charset="0"/>
+              </a:rPr>
+              <a:t>intersection</a:t>
+            </a:r>
+          </a:p>
+          <a:p>
+            <a:r>
+              <a:rPr lang="en-US" dirty="0">
+                <a:solidFill>
+                  <a:schemeClr val="tx2">
+                    <a:lumMod val="75000"/>
+                  </a:schemeClr>
+                </a:solidFill>
+                <a:latin typeface="Consolas" panose="020B0609020204030204" pitchFamily="49" charset="0"/>
+                <a:cs typeface="Consolas" panose="020B0609020204030204" pitchFamily="49" charset="0"/>
+              </a:rPr>
+              <a:t>difference</a:t>
+            </a:r>
+          </a:p>
+          <a:p>
+            <a:r>
+              <a:rPr lang="en-US" dirty="0" err="1">
+                <a:solidFill>
+                  <a:schemeClr val="tx2">
+                    <a:lumMod val="75000"/>
+                  </a:schemeClr>
+                </a:solidFill>
+                <a:latin typeface="Consolas" panose="020B0609020204030204" pitchFamily="49" charset="0"/>
+                <a:cs typeface="Consolas" panose="020B0609020204030204" pitchFamily="49" charset="0"/>
+              </a:rPr>
+              <a:t>symmetric_difference</a:t>
+            </a:r>
+            <a:endParaRPr lang="en-US" dirty="0">
+              <a:solidFill>
+                <a:schemeClr val="tx2">
+                  <a:lumMod val="75000"/>
+                </a:schemeClr>
+              </a:solidFill>
+              <a:latin typeface="Consolas" panose="020B0609020204030204" pitchFamily="49" charset="0"/>
+              <a:cs typeface="Consolas" panose="020B0609020204030204" pitchFamily="49" charset="0"/>
+            </a:endParaRPr>
+          </a:p>
+        </p:txBody>
+      </p:sp>
+      <p:sp>
+        <p:nvSpPr>
+          <p:cNvPr id="4" name="TextBox 3">
+            <a:extLst>
+              <a:ext uri="{FF2B5EF4-FFF2-40B4-BE49-F238E27FC236}">
+                <a16:creationId xmlns:a16="http://schemas.microsoft.com/office/drawing/2014/main" id="{B5E6F5D9-3EE5-774F-BA49-4D6C5A5BDF22}"/>
+              </a:ext>
+            </a:extLst>
+          </p:cNvPr>
+          <p:cNvSpPr txBox="1"/>
+          <p:nvPr/>
+        </p:nvSpPr>
+        <p:spPr>
+          <a:xfrm>
+            <a:off x="3227832" y="5961414"/>
+            <a:ext cx="4490332" cy="646331"/>
+          </a:xfrm>
+          <a:prstGeom prst="rect">
+            <a:avLst/>
+          </a:prstGeom>
+          <a:noFill/>
+        </p:spPr>
+        <p:txBody>
+          <a:bodyPr wrap="none" rtlCol="0">
+            <a:spAutoFit/>
+          </a:bodyPr>
+          <a:lstStyle/>
+          <a:p>
+            <a:r>
+              <a:rPr lang="en-US" dirty="0">
+                <a:solidFill>
+                  <a:schemeClr val="tx2">
+                    <a:lumMod val="75000"/>
+                  </a:schemeClr>
+                </a:solidFill>
+                <a:latin typeface="Consolas" panose="020B0609020204030204" pitchFamily="49" charset="0"/>
+                <a:cs typeface="Consolas" panose="020B0609020204030204" pitchFamily="49" charset="0"/>
+              </a:rPr>
+              <a:t># A set can contain a frozenset</a:t>
+            </a:r>
+          </a:p>
+          <a:p>
+            <a:r>
+              <a:rPr lang="en-US" dirty="0">
+                <a:solidFill>
+                  <a:srgbClr val="FF0000"/>
+                </a:solidFill>
+                <a:latin typeface="Consolas" panose="020B0609020204030204" pitchFamily="49" charset="0"/>
+                <a:cs typeface="Consolas" panose="020B0609020204030204" pitchFamily="49" charset="0"/>
+              </a:rPr>
+              <a:t># A frozenset cannot contain a set</a:t>
+            </a:r>
+          </a:p>
+        </p:txBody>
+      </p:sp>
+    </p:spTree>
+    <p:extLst>
+      <p:ext uri="{BB962C8B-B14F-4D97-AF65-F5344CB8AC3E}">
+        <p14:creationId xmlns:p14="http://schemas.microsoft.com/office/powerpoint/2010/main" val="3691368440"/>
+      </p:ext>
+    </p:extLst>
+  </p:cSld>
+  <p:clrMapOvr>
+    <a:masterClrMapping/>
+  </p:clrMapOvr>
+</p:sld>
+</file>
+
+<file path=ppt/slides/slide15.xml><?xml version="1.0" encoding="utf-8"?>
+<p:sld xmlns:a="http://schemas.openxmlformats.org/drawingml/2006/main" xmlns:r="http://schemas.openxmlformats.org/officeDocument/2006/relationships" xmlns:p="http://schemas.openxmlformats.org/presentationml/2006/main">
+  <p:cSld>
+    <p:spTree>
+      <p:nvGrpSpPr>
+        <p:cNvPr id="1" name=""/>
+        <p:cNvGrpSpPr/>
+        <p:nvPr/>
+      </p:nvGrpSpPr>
+      <p:grpSpPr>
+        <a:xfrm>
+          <a:off x="0" y="0"/>
+          <a:ext cx="0" cy="0"/>
+          <a:chOff x="0" y="0"/>
+          <a:chExt cx="0" cy="0"/>
+        </a:xfrm>
+      </p:grpSpPr>
+      <p:sp>
+        <p:nvSpPr>
+          <p:cNvPr id="2" name="Title 1">
+            <a:extLst>
+              <a:ext uri="{FF2B5EF4-FFF2-40B4-BE49-F238E27FC236}">
+                <a16:creationId xmlns:a16="http://schemas.microsoft.com/office/drawing/2014/main" id="{7ABAF061-B59F-AD41-8BD4-1828516FCEBD}"/>
+              </a:ext>
+            </a:extLst>
+          </p:cNvPr>
+          <p:cNvSpPr>
+            <a:spLocks noGrp="1"/>
+          </p:cNvSpPr>
+          <p:nvPr>
+            <p:ph type="title"/>
+          </p:nvPr>
+        </p:nvSpPr>
+        <p:spPr/>
+        <p:txBody>
+          <a:bodyPr/>
+          <a:lstStyle/>
+          <a:p>
+            <a:r>
+              <a:rPr lang="en-US" dirty="0"/>
+              <a:t>List versus Set</a:t>
+            </a:r>
+          </a:p>
+        </p:txBody>
+      </p:sp>
+      <p:sp>
+        <p:nvSpPr>
+          <p:cNvPr id="3" name="Content Placeholder 2">
+            <a:extLst>
+              <a:ext uri="{FF2B5EF4-FFF2-40B4-BE49-F238E27FC236}">
+                <a16:creationId xmlns:a16="http://schemas.microsoft.com/office/drawing/2014/main" id="{7C354B4E-781F-D444-81AF-27C6BB0D9AAD}"/>
+              </a:ext>
+            </a:extLst>
+          </p:cNvPr>
+          <p:cNvSpPr>
+            <a:spLocks noGrp="1"/>
+          </p:cNvSpPr>
+          <p:nvPr>
+            <p:ph idx="1"/>
+          </p:nvPr>
+        </p:nvSpPr>
+        <p:spPr>
+          <a:xfrm>
+            <a:off x="838200" y="1825625"/>
+            <a:ext cx="10515600" cy="4667250"/>
+          </a:xfrm>
+        </p:spPr>
+        <p:txBody>
+          <a:bodyPr>
+            <a:normAutofit fontScale="92500" lnSpcReduction="20000"/>
+          </a:bodyPr>
+          <a:lstStyle/>
+          <a:p>
+            <a:pPr marL="0" indent="0">
+              <a:buNone/>
+            </a:pPr>
+            <a:r>
+              <a:rPr lang="en-US" dirty="0"/>
+              <a:t>Rule of thumb</a:t>
+            </a:r>
+          </a:p>
+          <a:p>
+            <a:pPr marL="0" indent="0">
+              <a:buNone/>
+            </a:pPr>
+            <a:endParaRPr lang="en-US" dirty="0"/>
+          </a:p>
+          <a:p>
+            <a:pPr marL="0" indent="0">
+              <a:buNone/>
+            </a:pPr>
+            <a:r>
+              <a:rPr lang="en-US" dirty="0"/>
+              <a:t>When you have </a:t>
+            </a:r>
+            <a:r>
+              <a:rPr lang="en-US" b="1" dirty="0"/>
+              <a:t>frequent inserts, frequent deletes, frequent accesses</a:t>
+            </a:r>
+            <a:r>
+              <a:rPr lang="en-US" dirty="0"/>
+              <a:t>, throughout the execution of a program, use</a:t>
+            </a:r>
+          </a:p>
+          <a:p>
+            <a:pPr marL="0" indent="0">
+              <a:buNone/>
+            </a:pPr>
+            <a:r>
+              <a:rPr lang="en-US" b="1" dirty="0"/>
+              <a:t>List</a:t>
+            </a:r>
+          </a:p>
+          <a:p>
+            <a:pPr marL="0" indent="0">
+              <a:buNone/>
+            </a:pPr>
+            <a:endParaRPr lang="en-US" b="1" dirty="0"/>
+          </a:p>
+          <a:p>
+            <a:pPr marL="0" indent="0">
+              <a:buNone/>
+            </a:pPr>
+            <a:r>
+              <a:rPr lang="en-US" dirty="0"/>
+              <a:t>When you have </a:t>
+            </a:r>
+            <a:r>
+              <a:rPr lang="en-US" b="1" dirty="0"/>
+              <a:t>infrequent inserts, infrequent deletes, frequent accesses</a:t>
+            </a:r>
+            <a:r>
+              <a:rPr lang="en-US" dirty="0"/>
+              <a:t>, throughout the execution of a program, use</a:t>
+            </a:r>
+          </a:p>
+          <a:p>
+            <a:pPr marL="0" indent="0">
+              <a:buNone/>
+            </a:pPr>
+            <a:r>
+              <a:rPr lang="en-US" b="1" dirty="0"/>
+              <a:t>Set</a:t>
+            </a:r>
+          </a:p>
+          <a:p>
+            <a:pPr marL="0" indent="0">
+              <a:buNone/>
+            </a:pPr>
+            <a:endParaRPr lang="en-US" sz="1700" b="1" dirty="0">
+              <a:solidFill>
+                <a:srgbClr val="D06A22"/>
+              </a:solidFill>
+            </a:endParaRPr>
+          </a:p>
+          <a:p>
+            <a:pPr marL="0" indent="0">
+              <a:buNone/>
+            </a:pPr>
+            <a:endParaRPr lang="en-US" sz="1700" b="1" dirty="0">
+              <a:solidFill>
+                <a:srgbClr val="D06A22"/>
+              </a:solidFill>
+            </a:endParaRPr>
+          </a:p>
+          <a:p>
+            <a:pPr marL="0" indent="0">
+              <a:buNone/>
+            </a:pPr>
+            <a:endParaRPr lang="en-US" sz="1700" b="1" dirty="0">
+              <a:solidFill>
+                <a:srgbClr val="D06A22"/>
+              </a:solidFill>
+            </a:endParaRPr>
+          </a:p>
+          <a:p>
+            <a:pPr marL="0" indent="0">
+              <a:buNone/>
+            </a:pPr>
+            <a:r>
+              <a:rPr lang="en-US" sz="1700" b="1" dirty="0">
+                <a:solidFill>
+                  <a:srgbClr val="D06A22"/>
+                </a:solidFill>
+              </a:rPr>
+              <a:t># Rationale: Come to “Python Intermediate” course</a:t>
+            </a:r>
+          </a:p>
+          <a:p>
+            <a:pPr marL="0" indent="0">
+              <a:buNone/>
+            </a:pPr>
+            <a:endParaRPr lang="en-US" b="1" dirty="0"/>
+          </a:p>
+        </p:txBody>
+      </p:sp>
+    </p:spTree>
+    <p:extLst>
+      <p:ext uri="{BB962C8B-B14F-4D97-AF65-F5344CB8AC3E}">
+        <p14:creationId xmlns:p14="http://schemas.microsoft.com/office/powerpoint/2010/main" val="129113212"/>
+      </p:ext>
+    </p:extLst>
+  </p:cSld>
+  <p:clrMapOvr>
+    <a:masterClrMapping/>
+  </p:clrMapOvr>
+  <p:timing>
+    <p:tnLst>
+      <p:par>
+        <p:cTn id="1" dur="indefinite" restart="never" nodeType="tmRoot">
+          <p:childTnLst>
+            <p:seq concurrent="1" nextAc="seek">
+              <p:cTn id="2" dur="indefinite" nodeType="mainSeq">
+                <p:childTnLst>
+                  <p:par>
+                    <p:cTn id="3" fill="hold">
+                      <p:stCondLst>
+                        <p:cond delay="indefinite"/>
+                      </p:stCondLst>
+                      <p:childTnLst>
+                        <p:par>
+                          <p:cTn id="4" fill="hold">
+                            <p:stCondLst>
+                              <p:cond delay="0"/>
+                            </p:stCondLst>
+                            <p:childTnLst>
+                              <p:par>
+                                <p:cTn id="5" presetID="1" presetClass="entr" presetSubtype="0" fill="hold" grpId="0" nodeType="clickEffect">
+                                  <p:stCondLst>
+                                    <p:cond delay="0"/>
+                                  </p:stCondLst>
+                                  <p:childTnLst>
+                                    <p:set>
+                                      <p:cBhvr>
+                                        <p:cTn id="6" dur="1" fill="hold">
+                                          <p:stCondLst>
+                                            <p:cond delay="0"/>
+                                          </p:stCondLst>
+                                        </p:cTn>
+                                        <p:tgtEl>
+                                          <p:spTgt spid="3">
+                                            <p:txEl>
+                                              <p:pRg st="0" end="0"/>
+                                            </p:txEl>
+                                          </p:spTgt>
+                                        </p:tgtEl>
+                                        <p:attrNameLst>
+                                          <p:attrName>style.visibility</p:attrName>
+                                        </p:attrNameLst>
+                                      </p:cBhvr>
+                                      <p:to>
+                                        <p:strVal val="visible"/>
+                                      </p:to>
+                                    </p:set>
+                                  </p:childTnLst>
+                                </p:cTn>
+                              </p:par>
+                            </p:childTnLst>
+                          </p:cTn>
+                        </p:par>
+                      </p:childTnLst>
+                    </p:cTn>
+                  </p:par>
+                  <p:par>
+                    <p:cTn id="7" fill="hold">
+                      <p:stCondLst>
+                        <p:cond delay="indefinite"/>
+                      </p:stCondLst>
+                      <p:childTnLst>
+                        <p:par>
+                          <p:cTn id="8" fill="hold">
+                            <p:stCondLst>
+                              <p:cond delay="0"/>
+                            </p:stCondLst>
+                            <p:childTnLst>
+                              <p:par>
+                                <p:cTn id="9" presetID="1" presetClass="entr" presetSubtype="0" fill="hold" grpId="0" nodeType="clickEffect">
+                                  <p:stCondLst>
+                                    <p:cond delay="0"/>
+                                  </p:stCondLst>
+                                  <p:childTnLst>
+                                    <p:set>
+                                      <p:cBhvr>
+                                        <p:cTn id="10" dur="1" fill="hold">
+                                          <p:stCondLst>
+                                            <p:cond delay="0"/>
+                                          </p:stCondLst>
+                                        </p:cTn>
+                                        <p:tgtEl>
+                                          <p:spTgt spid="3">
+                                            <p:txEl>
+                                              <p:pRg st="2" end="2"/>
+                                            </p:txEl>
+                                          </p:spTgt>
+                                        </p:tgtEl>
+                                        <p:attrNameLst>
+                                          <p:attrName>style.visibility</p:attrName>
+                                        </p:attrNameLst>
+                                      </p:cBhvr>
+                                      <p:to>
+                                        <p:strVal val="visible"/>
+                                      </p:to>
+                                    </p:set>
+                                  </p:childTnLst>
+                                </p:cTn>
+                              </p:par>
+                            </p:childTnLst>
+                          </p:cTn>
+                        </p:par>
+                      </p:childTnLst>
+                    </p:cTn>
+                  </p:par>
+                  <p:par>
+                    <p:cTn id="11" fill="hold">
+                      <p:stCondLst>
+                        <p:cond delay="indefinite"/>
+                      </p:stCondLst>
+                      <p:childTnLst>
+                        <p:par>
+                          <p:cTn id="12" fill="hold">
+                            <p:stCondLst>
+                              <p:cond delay="0"/>
+                            </p:stCondLst>
+                            <p:childTnLst>
+                              <p:par>
+                                <p:cTn id="13" presetID="1" presetClass="entr" presetSubtype="0" fill="hold" grpId="0" nodeType="clickEffect">
+                                  <p:stCondLst>
+                                    <p:cond delay="0"/>
+                                  </p:stCondLst>
+                                  <p:childTnLst>
+                                    <p:set>
+                                      <p:cBhvr>
+                                        <p:cTn id="14" dur="1" fill="hold">
+                                          <p:stCondLst>
+                                            <p:cond delay="0"/>
+                                          </p:stCondLst>
+                                        </p:cTn>
+                                        <p:tgtEl>
+                                          <p:spTgt spid="3">
+                                            <p:txEl>
+                                              <p:pRg st="3" end="3"/>
+                                            </p:txEl>
+                                          </p:spTgt>
+                                        </p:tgtEl>
+                                        <p:attrNameLst>
+                                          <p:attrName>style.visibility</p:attrName>
+                                        </p:attrNameLst>
+                                      </p:cBhvr>
+                                      <p:to>
+                                        <p:strVal val="visible"/>
+                                      </p:to>
+                                    </p:set>
+                                  </p:childTnLst>
+                                </p:cTn>
+                              </p:par>
+                            </p:childTnLst>
+                          </p:cTn>
+                        </p:par>
+                      </p:childTnLst>
+                    </p:cTn>
+                  </p:par>
+                  <p:par>
+                    <p:cTn id="15" fill="hold">
+                      <p:stCondLst>
+                        <p:cond delay="indefinite"/>
+                      </p:stCondLst>
+                      <p:childTnLst>
+                        <p:par>
+                          <p:cTn id="16" fill="hold">
+                            <p:stCondLst>
+                              <p:cond delay="0"/>
+                            </p:stCondLst>
+                            <p:childTnLst>
+                              <p:par>
+                                <p:cTn id="17" presetID="1" presetClass="entr" presetSubtype="0" fill="hold" grpId="0" nodeType="clickEffect">
+                                  <p:stCondLst>
+                                    <p:cond delay="0"/>
+                                  </p:stCondLst>
+                                  <p:childTnLst>
+                                    <p:set>
+                                      <p:cBhvr>
+                                        <p:cTn id="18" dur="1" fill="hold">
+                                          <p:stCondLst>
+                                            <p:cond delay="0"/>
+                                          </p:stCondLst>
+                                        </p:cTn>
+                                        <p:tgtEl>
+                                          <p:spTgt spid="3">
+                                            <p:txEl>
+                                              <p:pRg st="5" end="5"/>
+                                            </p:txEl>
+                                          </p:spTgt>
+                                        </p:tgtEl>
+                                        <p:attrNameLst>
+                                          <p:attrName>style.visibility</p:attrName>
+                                        </p:attrNameLst>
+                                      </p:cBhvr>
+                                      <p:to>
+                                        <p:strVal val="visible"/>
+                                      </p:to>
+                                    </p:set>
+                                  </p:childTnLst>
+                                </p:cTn>
+                              </p:par>
+                            </p:childTnLst>
+                          </p:cTn>
+                        </p:par>
+                      </p:childTnLst>
+                    </p:cTn>
+                  </p:par>
+                  <p:par>
+                    <p:cTn id="19" fill="hold">
+                      <p:stCondLst>
+                        <p:cond delay="indefinite"/>
+                      </p:stCondLst>
+                      <p:childTnLst>
+                        <p:par>
+                          <p:cTn id="20" fill="hold">
+                            <p:stCondLst>
+                              <p:cond delay="0"/>
+                            </p:stCondLst>
+                            <p:childTnLst>
+                              <p:par>
+                                <p:cTn id="21" presetID="1" presetClass="entr" presetSubtype="0" fill="hold" grpId="0" nodeType="clickEffect">
+                                  <p:stCondLst>
+                                    <p:cond delay="0"/>
+                                  </p:stCondLst>
+                                  <p:childTnLst>
+                                    <p:set>
+                                      <p:cBhvr>
+                                        <p:cTn id="22" dur="1" fill="hold">
+                                          <p:stCondLst>
+                                            <p:cond delay="0"/>
+                                          </p:stCondLst>
+                                        </p:cTn>
+                                        <p:tgtEl>
+                                          <p:spTgt spid="3">
+                                            <p:txEl>
+                                              <p:pRg st="6" end="6"/>
+                                            </p:txEl>
+                                          </p:spTgt>
+                                        </p:tgtEl>
+                                        <p:attrNameLst>
+                                          <p:attrName>style.visibility</p:attrName>
+                                        </p:attrNameLst>
+                                      </p:cBhvr>
+                                      <p:to>
+                                        <p:strVal val="visible"/>
+                                      </p:to>
+                                    </p:set>
+                                  </p:childTnLst>
+                                </p:cTn>
+                              </p:par>
+                            </p:childTnLst>
+                          </p:cTn>
+                        </p:par>
+                      </p:childTnLst>
+                    </p:cTn>
+                  </p:par>
+                  <p:par>
+                    <p:cTn id="23" fill="hold">
+                      <p:stCondLst>
+                        <p:cond delay="indefinite"/>
+                      </p:stCondLst>
+                      <p:childTnLst>
+                        <p:par>
+                          <p:cTn id="24" fill="hold">
+                            <p:stCondLst>
+                              <p:cond delay="0"/>
+                            </p:stCondLst>
+                            <p:childTnLst>
+                              <p:par>
+                                <p:cTn id="25" presetID="1" presetClass="entr" presetSubtype="0" fill="hold" grpId="0" nodeType="clickEffect">
+                                  <p:stCondLst>
+                                    <p:cond delay="0"/>
+                                  </p:stCondLst>
+                                  <p:childTnLst>
+                                    <p:set>
+                                      <p:cBhvr>
+                                        <p:cTn id="26" dur="1" fill="hold">
+                                          <p:stCondLst>
+                                            <p:cond delay="0"/>
+                                          </p:stCondLst>
+                                        </p:cTn>
+                                        <p:tgtEl>
+                                          <p:spTgt spid="3">
+                                            <p:txEl>
+                                              <p:pRg st="10" end="10"/>
+                                            </p:txEl>
+                                          </p:spTgt>
+                                        </p:tgtEl>
+                                        <p:attrNameLst>
+                                          <p:attrName>style.visibility</p:attrName>
+                                        </p:attrNameLst>
+                                      </p:cBhvr>
+                                      <p:to>
+                                        <p:strVal val="visible"/>
+                                      </p:to>
+                                    </p:set>
+                                  </p:childTnLst>
+                                </p:cTn>
+                              </p:par>
+                            </p:childTnLst>
+                          </p:cTn>
+                        </p:par>
+                      </p:childTnLst>
+                    </p:cTn>
+                  </p:par>
+                </p:childTnLst>
+              </p:cTn>
+              <p:prevCondLst>
+                <p:cond evt="onPrev" delay="0">
+                  <p:tgtEl>
+                    <p:sldTgt/>
+                  </p:tgtEl>
+                </p:cond>
+              </p:prevCondLst>
+              <p:nextCondLst>
+                <p:cond evt="onNext" delay="0">
+                  <p:tgtEl>
+                    <p:sldTgt/>
+                  </p:tgtEl>
+                </p:cond>
+              </p:nextCondLst>
+            </p:seq>
+          </p:childTnLst>
+        </p:cTn>
+      </p:par>
+    </p:tnLst>
+    <p:bldLst>
+      <p:bldP spid="3" grpId="0" build="p"/>
+    </p:bldLst>
+  </p:timing>
+</p:sld>
+</file>
+
+<file path=ppt/slides/slide16.xml><?xml version="1.0" encoding="utf-8"?>
+<p:sld xmlns:a="http://schemas.openxmlformats.org/drawingml/2006/main" xmlns:r="http://schemas.openxmlformats.org/officeDocument/2006/relationships" xmlns:p="http://schemas.openxmlformats.org/presentationml/2006/main">
+  <p:cSld>
+    <p:bg>
+      <p:bgPr>
+        <a:solidFill>
+          <a:schemeClr val="bg1"/>
+        </a:solidFill>
+        <a:effectLst/>
+      </p:bgPr>
+    </p:bg>
+    <p:spTree>
+      <p:nvGrpSpPr>
+        <p:cNvPr id="1" name=""/>
+        <p:cNvGrpSpPr/>
+        <p:nvPr/>
+      </p:nvGrpSpPr>
+      <p:grpSpPr>
+        <a:xfrm>
+          <a:off x="0" y="0"/>
+          <a:ext cx="0" cy="0"/>
+          <a:chOff x="0" y="0"/>
+          <a:chExt cx="0" cy="0"/>
+        </a:xfrm>
+      </p:grpSpPr>
+      <p:sp>
+        <p:nvSpPr>
+          <p:cNvPr id="2" name="Title 1">
+            <a:extLst>
+              <a:ext uri="{FF2B5EF4-FFF2-40B4-BE49-F238E27FC236}">
+                <a16:creationId xmlns:a16="http://schemas.microsoft.com/office/drawing/2014/main" id="{20404047-9EB1-AE49-833E-4570DD2E0571}"/>
+              </a:ext>
+            </a:extLst>
+          </p:cNvPr>
+          <p:cNvSpPr>
+            <a:spLocks noGrp="1"/>
+          </p:cNvSpPr>
+          <p:nvPr>
+            <p:ph type="title"/>
+          </p:nvPr>
+        </p:nvSpPr>
+        <p:spPr>
+          <a:xfrm>
+            <a:off x="1175512" y="870132"/>
+            <a:ext cx="9792208" cy="1527078"/>
+          </a:xfrm>
+        </p:spPr>
+        <p:txBody>
+          <a:bodyPr>
+            <a:normAutofit/>
+          </a:bodyPr>
+          <a:lstStyle/>
+          <a:p>
+            <a:r>
+              <a:rPr lang="en-US" dirty="0">
+                <a:solidFill>
+                  <a:schemeClr val="tx2">
+                    <a:lumMod val="75000"/>
+                  </a:schemeClr>
+                </a:solidFill>
+              </a:rPr>
+              <a:t>Exercises</a:t>
+            </a:r>
+          </a:p>
+        </p:txBody>
+      </p:sp>
+      <p:sp>
+        <p:nvSpPr>
+          <p:cNvPr id="3" name="Content Placeholder 2">
+            <a:extLst>
+              <a:ext uri="{FF2B5EF4-FFF2-40B4-BE49-F238E27FC236}">
+                <a16:creationId xmlns:a16="http://schemas.microsoft.com/office/drawing/2014/main" id="{A82F16F2-1066-DD45-81FD-C06CDE640212}"/>
+              </a:ext>
+            </a:extLst>
+          </p:cNvPr>
+          <p:cNvSpPr>
+            <a:spLocks noGrp="1"/>
+          </p:cNvSpPr>
+          <p:nvPr>
+            <p:ph idx="1"/>
+          </p:nvPr>
+        </p:nvSpPr>
+        <p:spPr>
+          <a:xfrm>
             <a:off x="1175512" y="2557849"/>
             <a:ext cx="9792208" cy="3407862"/>
           </a:xfrm>
@@ -6805,7 +7264,7 @@
                   </a:schemeClr>
                 </a:solidFill>
               </a:rPr>
-              <a:t>Create a list of a string representing first-name and last-name of your family. Now, create a set of first-name and another set of last-name from this list. What should be the size of each set?</a:t>
+              <a:t>Create a list of a string representing first-name and last-name of your family members. Now, create a set of first-name and another set of last-name from this list. What should be the size of each set?</a:t>
             </a:r>
           </a:p>
           <a:p>
@@ -7250,7 +7709,7 @@
           </a:lstStyle>
           <a:p>
             <a:r>
-              <a:rPr lang="en-US" dirty="0">
+              <a:rPr lang="en-US" sz="2800" dirty="0">
                 <a:solidFill>
                   <a:schemeClr val="tx2">
                     <a:lumMod val="75000"/>
@@ -7264,7 +7723,7 @@
           </a:p>
           <a:p>
             <a:r>
-              <a:rPr lang="en-US" dirty="0">
+              <a:rPr lang="en-US" sz="2800" dirty="0">
                 <a:solidFill>
                   <a:schemeClr val="tx2">
                     <a:lumMod val="75000"/>
@@ -7275,7 +7734,7 @@
               </a:rPr>
               <a:t>int		</a:t>
             </a:r>
-            <a:endParaRPr lang="en-US" i="1" dirty="0">
+            <a:endParaRPr lang="en-US" sz="2800" i="1" dirty="0">
               <a:solidFill>
                 <a:schemeClr val="tx2">
                   <a:lumMod val="75000"/>
@@ -7287,7 +7746,7 @@
           </a:p>
           <a:p>
             <a:r>
-              <a:rPr lang="en-US" i="1" dirty="0">
+              <a:rPr lang="en-US" sz="2800" i="1" dirty="0">
                 <a:solidFill>
                   <a:schemeClr val="tx2">
                     <a:lumMod val="75000"/>
@@ -7301,7 +7760,7 @@
           </a:p>
           <a:p>
             <a:r>
-              <a:rPr lang="en-US" i="1" dirty="0">
+              <a:rPr lang="en-US" sz="2800" i="1" dirty="0">
                 <a:solidFill>
                   <a:schemeClr val="tx2">
                     <a:lumMod val="75000"/>
@@ -7315,7 +7774,7 @@
           </a:p>
           <a:p>
             <a:r>
-              <a:rPr lang="en-US" i="1" dirty="0">
+              <a:rPr lang="en-US" sz="2800" i="1" dirty="0">
                 <a:solidFill>
                   <a:schemeClr val="tx2">
                     <a:lumMod val="75000"/>
@@ -8378,7 +8837,7 @@
         <p:spPr>
           <a:xfrm>
             <a:off x="1175512" y="6080760"/>
-            <a:ext cx="8972328" cy="369332"/>
+            <a:ext cx="7463838" cy="369332"/>
           </a:xfrm>
           <a:prstGeom prst="rect">
             <a:avLst/>
@@ -8394,9 +8853,7 @@
             <a:r>
               <a:rPr lang="en-US" i="1" dirty="0">
                 <a:solidFill>
-                  <a:schemeClr val="tx2">
-                    <a:lumMod val="75000"/>
-                  </a:schemeClr>
+                  <a:srgbClr val="D06A22"/>
                 </a:solidFill>
               </a:rPr>
               <a:t># Hashing is a way of storing data. To be hashable, a type must be immutable.</a:t>
@@ -8882,7 +9339,7 @@
         </p:spPr>
         <p:txBody>
           <a:bodyPr>
-            <a:normAutofit/>
+            <a:normAutofit fontScale="90000"/>
           </a:bodyPr>
           <a:lstStyle/>
           <a:p>
@@ -8905,16 +9362,31 @@
                 </a:solidFill>
               </a:rPr>
             </a:br>
-            <a:r>
-              <a:rPr lang="en-US" dirty="0">
-                <a:solidFill>
-                  <a:schemeClr val="tx2">
-                    <a:lumMod val="75000"/>
-                  </a:schemeClr>
-                </a:solidFill>
-              </a:rPr>
-              <a:t>S = { 1, “one”, ‘2’ }</a:t>
-            </a:r>
+            <a:br>
+              <a:rPr lang="en-US" dirty="0">
+                <a:solidFill>
+                  <a:schemeClr val="tx2">
+                    <a:lumMod val="75000"/>
+                  </a:schemeClr>
+                </a:solidFill>
+              </a:rPr>
+            </a:br>
+            <a:r>
+              <a:rPr lang="en-US" dirty="0"/>
+              <a:t>Membership</a:t>
+            </a:r>
+            <a:br>
+              <a:rPr lang="en-US" dirty="0"/>
+            </a:br>
+            <a:endParaRPr lang="en-US" dirty="0">
+              <a:solidFill>
+                <a:schemeClr val="tx2">
+                  <a:lumMod val="75000"/>
+                </a:schemeClr>
+              </a:solidFill>
+              <a:latin typeface="Consolas" panose="020B0609020204030204" pitchFamily="49" charset="0"/>
+              <a:cs typeface="Consolas" panose="020B0609020204030204" pitchFamily="49" charset="0"/>
+            </a:endParaRPr>
           </a:p>
         </p:txBody>
       </p:sp>
@@ -8942,31 +9414,26 @@
         </p:spPr>
         <p:txBody>
           <a:bodyPr>
-            <a:normAutofit lnSpcReduction="10000"/>
+            <a:normAutofit/>
           </a:bodyPr>
           <a:lstStyle/>
           <a:p>
-            <a:r>
-              <a:rPr lang="en-US" sz="3200" dirty="0">
-                <a:solidFill>
-                  <a:schemeClr val="tx2">
-                    <a:lumMod val="75000"/>
-                  </a:schemeClr>
-                </a:solidFill>
-              </a:rPr>
-              <a:t>Membership</a:t>
-            </a:r>
-          </a:p>
-          <a:p>
-            <a:r>
-              <a:rPr lang="en-US" dirty="0">
-                <a:solidFill>
-                  <a:schemeClr val="tx2">
-                    <a:lumMod val="75000"/>
-                  </a:schemeClr>
-                </a:solidFill>
-              </a:rPr>
-              <a:t>$ ‘2’ </a:t>
+            <a:pPr marL="0" indent="0">
+              <a:buNone/>
+            </a:pPr>
+            <a:r>
+              <a:rPr lang="en-US" dirty="0"/>
+              <a:t>&gt;&gt;&gt;</a:t>
+            </a:r>
+            <a:r>
+              <a:rPr lang="en-US" dirty="0">
+                <a:solidFill>
+                  <a:schemeClr val="tx2">
+                    <a:lumMod val="75000"/>
+                  </a:schemeClr>
+                </a:solidFill>
+              </a:rPr>
+              <a:t> ‘2’ </a:t>
             </a:r>
             <a:r>
               <a:rPr lang="en-US" b="1" dirty="0">
@@ -8990,27 +9457,33 @@
             </a:r>
           </a:p>
           <a:p>
-            <a:r>
-              <a:rPr lang="en-US" dirty="0">
-                <a:solidFill>
-                  <a:schemeClr val="tx2">
-                    <a:lumMod val="75000"/>
-                  </a:schemeClr>
-                </a:solidFill>
-              </a:rPr>
-              <a:t>$ True</a:t>
-            </a:r>
-          </a:p>
-          <a:p>
-            <a:r>
-              <a:rPr lang="en-US" dirty="0">
-                <a:solidFill>
-                  <a:schemeClr val="tx2">
-                    <a:lumMod val="75000"/>
-                  </a:schemeClr>
-                </a:solidFill>
-              </a:rPr>
-              <a:t>$ 3 </a:t>
+            <a:pPr marL="0" indent="0">
+              <a:buNone/>
+            </a:pPr>
+            <a:r>
+              <a:rPr lang="en-US" dirty="0">
+                <a:solidFill>
+                  <a:schemeClr val="tx2">
+                    <a:lumMod val="75000"/>
+                  </a:schemeClr>
+                </a:solidFill>
+              </a:rPr>
+              <a:t>&gt;&gt;&gt; True</a:t>
+            </a:r>
+          </a:p>
+          <a:p>
+            <a:pPr marL="0" indent="0">
+              <a:buNone/>
+            </a:pPr>
+            <a:r>
+              <a:rPr lang="en-US" dirty="0">
+                <a:solidFill>
+                  <a:schemeClr val="tx2">
+                    <a:lumMod val="75000"/>
+                  </a:schemeClr>
+                </a:solidFill>
+              </a:rPr>
+              <a:t>&gt;&gt;&gt; 3 </a:t>
             </a:r>
             <a:r>
               <a:rPr lang="en-US" b="1" dirty="0">
@@ -9034,27 +9507,33 @@
             </a:r>
           </a:p>
           <a:p>
-            <a:r>
-              <a:rPr lang="en-US" dirty="0">
-                <a:solidFill>
-                  <a:schemeClr val="tx2">
-                    <a:lumMod val="75000"/>
-                  </a:schemeClr>
-                </a:solidFill>
-              </a:rPr>
-              <a:t>$ False</a:t>
-            </a:r>
-          </a:p>
-          <a:p>
-            <a:r>
-              <a:rPr lang="en-US" dirty="0">
-                <a:solidFill>
-                  <a:schemeClr val="tx2">
-                    <a:lumMod val="75000"/>
-                  </a:schemeClr>
-                </a:solidFill>
-              </a:rPr>
-              <a:t>$ 2 </a:t>
+            <a:pPr marL="0" indent="0">
+              <a:buNone/>
+            </a:pPr>
+            <a:r>
+              <a:rPr lang="en-US" dirty="0">
+                <a:solidFill>
+                  <a:schemeClr val="tx2">
+                    <a:lumMod val="75000"/>
+                  </a:schemeClr>
+                </a:solidFill>
+              </a:rPr>
+              <a:t>&gt;&gt;&gt; False</a:t>
+            </a:r>
+          </a:p>
+          <a:p>
+            <a:pPr marL="0" indent="0">
+              <a:buNone/>
+            </a:pPr>
+            <a:r>
+              <a:rPr lang="en-US" dirty="0">
+                <a:solidFill>
+                  <a:schemeClr val="tx2">
+                    <a:lumMod val="75000"/>
+                  </a:schemeClr>
+                </a:solidFill>
+              </a:rPr>
+              <a:t>&gt;&gt;&gt; 2 </a:t>
             </a:r>
             <a:r>
               <a:rPr lang="en-US" b="1" dirty="0">
@@ -9078,15 +9557,18 @@
             </a:r>
           </a:p>
           <a:p>
-            <a:r>
-              <a:rPr lang="en-US" dirty="0">
-                <a:solidFill>
-                  <a:schemeClr val="tx2">
-                    <a:lumMod val="75000"/>
-                  </a:schemeClr>
-                </a:solidFill>
-              </a:rPr>
-              <a:t>$ True</a:t>
+            <a:pPr marL="0" indent="0">
+              <a:buNone/>
+            </a:pPr>
+            <a:r>
+              <a:rPr lang="en-US" dirty="0">
+                <a:solidFill>
+                  <a:schemeClr val="tx2">
+                    <a:lumMod val="75000"/>
+                  </a:schemeClr>
+                </a:solidFill>
+              </a:rPr>
+              <a:t>&gt;&gt;&gt; True</a:t>
             </a:r>
           </a:p>
         </p:txBody>
@@ -9209,6 +9691,50 @@
               </a:rPr>
               <a:t> as well</a:t>
             </a:r>
+          </a:p>
+        </p:txBody>
+      </p:sp>
+      <p:sp>
+        <p:nvSpPr>
+          <p:cNvPr id="5" name="TextBox 4">
+            <a:extLst>
+              <a:ext uri="{FF2B5EF4-FFF2-40B4-BE49-F238E27FC236}">
+                <a16:creationId xmlns:a16="http://schemas.microsoft.com/office/drawing/2014/main" id="{FB8D9704-ACEB-AE40-9B30-FD88CC973BDC}"/>
+              </a:ext>
+            </a:extLst>
+          </p:cNvPr>
+          <p:cNvSpPr txBox="1"/>
+          <p:nvPr/>
+        </p:nvSpPr>
+        <p:spPr>
+          <a:xfrm>
+            <a:off x="7705618" y="913413"/>
+            <a:ext cx="3752950" cy="461665"/>
+          </a:xfrm>
+          <a:prstGeom prst="rect">
+            <a:avLst/>
+          </a:prstGeom>
+          <a:noFill/>
+        </p:spPr>
+        <p:txBody>
+          <a:bodyPr wrap="none" rtlCol="0">
+            <a:spAutoFit/>
+          </a:bodyPr>
+          <a:lstStyle/>
+          <a:p>
+            <a:r>
+              <a:rPr lang="en-US" sz="2400" dirty="0">
+                <a:solidFill>
+                  <a:schemeClr val="tx2">
+                    <a:lumMod val="75000"/>
+                  </a:schemeClr>
+                </a:solidFill>
+                <a:latin typeface="Consolas" panose="020B0609020204030204" pitchFamily="49" charset="0"/>
+                <a:cs typeface="Consolas" panose="020B0609020204030204" pitchFamily="49" charset="0"/>
+              </a:rPr>
+              <a:t>S = { 1, “one”, ‘2’ }</a:t>
+            </a:r>
+            <a:endParaRPr lang="en-US" sz="2400" dirty="0"/>
           </a:p>
         </p:txBody>
       </p:sp>

</xml_diff>

<commit_message>
Add animations to session #7
</commit_message>
<xml_diff>
--- a/fundamentals/7-Set.pptx
+++ b/fundamentals/7-Set.pptx
@@ -215,7 +215,7 @@
           <a:p>
             <a:fld id="{720C9186-47A3-C54A-A8AF-47B660C0099D}" type="datetimeFigureOut">
               <a:rPr lang="en-US" smtClean="0"/>
-              <a:t>8/12/20</a:t>
+              <a:t>8/25/20</a:t>
             </a:fld>
             <a:endParaRPr lang="en-US"/>
           </a:p>
@@ -632,7 +632,7 @@
           <a:p>
             <a:fld id="{4AAD347D-5ACD-4C99-B74B-A9C85AD731AF}" type="datetimeFigureOut">
               <a:rPr lang="en-US" smtClean="0"/>
-              <a:t>8/12/20</a:t>
+              <a:t>8/25/20</a:t>
             </a:fld>
             <a:endParaRPr lang="en-US" dirty="0"/>
           </a:p>
@@ -832,7 +832,7 @@
           <a:p>
             <a:fld id="{4AAD347D-5ACD-4C99-B74B-A9C85AD731AF}" type="datetimeFigureOut">
               <a:rPr lang="en-US" smtClean="0"/>
-              <a:t>8/12/20</a:t>
+              <a:t>8/25/20</a:t>
             </a:fld>
             <a:endParaRPr lang="en-US" dirty="0"/>
           </a:p>
@@ -1043,7 +1043,7 @@
           <a:p>
             <a:fld id="{4AAD347D-5ACD-4C99-B74B-A9C85AD731AF}" type="datetimeFigureOut">
               <a:rPr lang="en-US" smtClean="0"/>
-              <a:t>8/12/20</a:t>
+              <a:t>8/25/20</a:t>
             </a:fld>
             <a:endParaRPr lang="en-US" dirty="0"/>
           </a:p>
@@ -1244,7 +1244,7 @@
           <a:p>
             <a:fld id="{4AAD347D-5ACD-4C99-B74B-A9C85AD731AF}" type="datetimeFigureOut">
               <a:rPr lang="en-US" smtClean="0"/>
-              <a:t>8/12/20</a:t>
+              <a:t>8/25/20</a:t>
             </a:fld>
             <a:endParaRPr lang="en-US" dirty="0"/>
           </a:p>
@@ -1521,7 +1521,7 @@
           <a:p>
             <a:fld id="{9796027F-7875-4030-9381-8BD8C4F21935}" type="datetimeFigureOut">
               <a:rPr lang="en-US" smtClean="0"/>
-              <a:t>8/12/20</a:t>
+              <a:t>8/25/20</a:t>
             </a:fld>
             <a:endParaRPr lang="en-US" dirty="0"/>
           </a:p>
@@ -1789,7 +1789,7 @@
           <a:p>
             <a:fld id="{4AAD347D-5ACD-4C99-B74B-A9C85AD731AF}" type="datetimeFigureOut">
               <a:rPr lang="en-US" smtClean="0"/>
-              <a:t>8/12/20</a:t>
+              <a:t>8/25/20</a:t>
             </a:fld>
             <a:endParaRPr lang="en-US" dirty="0"/>
           </a:p>
@@ -2210,7 +2210,7 @@
           <a:p>
             <a:fld id="{4AAD347D-5ACD-4C99-B74B-A9C85AD731AF}" type="datetimeFigureOut">
               <a:rPr lang="en-US" smtClean="0"/>
-              <a:t>8/12/20</a:t>
+              <a:t>8/25/20</a:t>
             </a:fld>
             <a:endParaRPr lang="en-US" dirty="0"/>
           </a:p>
@@ -2353,7 +2353,7 @@
           <a:p>
             <a:fld id="{4509A250-FF31-4206-8172-F9D3106AACB1}" type="datetimeFigureOut">
               <a:rPr lang="en-US" smtClean="0"/>
-              <a:t>8/12/20</a:t>
+              <a:t>8/25/20</a:t>
             </a:fld>
             <a:endParaRPr lang="en-US" dirty="0"/>
           </a:p>
@@ -2466,7 +2466,7 @@
           <a:p>
             <a:fld id="{4509A250-FF31-4206-8172-F9D3106AACB1}" type="datetimeFigureOut">
               <a:rPr lang="en-US" smtClean="0"/>
-              <a:t>8/12/20</a:t>
+              <a:t>8/25/20</a:t>
             </a:fld>
             <a:endParaRPr lang="en-US" dirty="0"/>
           </a:p>
@@ -2779,7 +2779,7 @@
           <a:p>
             <a:fld id="{4AAD347D-5ACD-4C99-B74B-A9C85AD731AF}" type="datetimeFigureOut">
               <a:rPr lang="en-US" smtClean="0"/>
-              <a:t>8/12/20</a:t>
+              <a:t>8/25/20</a:t>
             </a:fld>
             <a:endParaRPr lang="en-US" dirty="0"/>
           </a:p>
@@ -3074,7 +3074,7 @@
           <a:p>
             <a:fld id="{4509A250-FF31-4206-8172-F9D3106AACB1}" type="datetimeFigureOut">
               <a:rPr lang="en-US" smtClean="0"/>
-              <a:t>8/12/20</a:t>
+              <a:t>8/25/20</a:t>
             </a:fld>
             <a:endParaRPr lang="en-US" dirty="0"/>
           </a:p>
@@ -3317,7 +3317,7 @@
           <a:p>
             <a:fld id="{4AAD347D-5ACD-4C99-B74B-A9C85AD731AF}" type="datetimeFigureOut">
               <a:rPr lang="en-US" smtClean="0"/>
-              <a:t>8/12/20</a:t>
+              <a:t>8/25/20</a:t>
             </a:fld>
             <a:endParaRPr lang="en-US" dirty="0"/>
           </a:p>
@@ -4768,6 +4768,409 @@
   <p:clrMapOvr>
     <a:masterClrMapping/>
   </p:clrMapOvr>
+  <p:timing>
+    <p:tnLst>
+      <p:par>
+        <p:cTn id="1" dur="indefinite" restart="never" nodeType="tmRoot">
+          <p:childTnLst>
+            <p:seq concurrent="1" nextAc="seek">
+              <p:cTn id="2" dur="indefinite" nodeType="mainSeq">
+                <p:childTnLst>
+                  <p:par>
+                    <p:cTn id="3" fill="hold">
+                      <p:stCondLst>
+                        <p:cond delay="indefinite"/>
+                      </p:stCondLst>
+                      <p:childTnLst>
+                        <p:par>
+                          <p:cTn id="4" fill="hold">
+                            <p:stCondLst>
+                              <p:cond delay="0"/>
+                            </p:stCondLst>
+                            <p:childTnLst>
+                              <p:par>
+                                <p:cTn id="5" presetID="1" presetClass="entr" presetSubtype="0" fill="hold" grpId="0" nodeType="clickEffect">
+                                  <p:stCondLst>
+                                    <p:cond delay="0"/>
+                                  </p:stCondLst>
+                                  <p:childTnLst>
+                                    <p:set>
+                                      <p:cBhvr>
+                                        <p:cTn id="6" dur="1" fill="hold">
+                                          <p:stCondLst>
+                                            <p:cond delay="0"/>
+                                          </p:stCondLst>
+                                        </p:cTn>
+                                        <p:tgtEl>
+                                          <p:spTgt spid="22"/>
+                                        </p:tgtEl>
+                                        <p:attrNameLst>
+                                          <p:attrName>style.visibility</p:attrName>
+                                        </p:attrNameLst>
+                                      </p:cBhvr>
+                                      <p:to>
+                                        <p:strVal val="visible"/>
+                                      </p:to>
+                                    </p:set>
+                                  </p:childTnLst>
+                                </p:cTn>
+                              </p:par>
+                            </p:childTnLst>
+                          </p:cTn>
+                        </p:par>
+                      </p:childTnLst>
+                    </p:cTn>
+                  </p:par>
+                  <p:par>
+                    <p:cTn id="7" fill="hold">
+                      <p:stCondLst>
+                        <p:cond delay="indefinite"/>
+                      </p:stCondLst>
+                      <p:childTnLst>
+                        <p:par>
+                          <p:cTn id="8" fill="hold">
+                            <p:stCondLst>
+                              <p:cond delay="0"/>
+                            </p:stCondLst>
+                            <p:childTnLst>
+                              <p:par>
+                                <p:cTn id="9" presetID="1" presetClass="entr" presetSubtype="0" fill="hold" grpId="0" nodeType="clickEffect">
+                                  <p:stCondLst>
+                                    <p:cond delay="0"/>
+                                  </p:stCondLst>
+                                  <p:childTnLst>
+                                    <p:set>
+                                      <p:cBhvr>
+                                        <p:cTn id="10" dur="1" fill="hold">
+                                          <p:stCondLst>
+                                            <p:cond delay="0"/>
+                                          </p:stCondLst>
+                                        </p:cTn>
+                                        <p:tgtEl>
+                                          <p:spTgt spid="8"/>
+                                        </p:tgtEl>
+                                        <p:attrNameLst>
+                                          <p:attrName>style.visibility</p:attrName>
+                                        </p:attrNameLst>
+                                      </p:cBhvr>
+                                      <p:to>
+                                        <p:strVal val="visible"/>
+                                      </p:to>
+                                    </p:set>
+                                  </p:childTnLst>
+                                </p:cTn>
+                              </p:par>
+                              <p:par>
+                                <p:cTn id="11" presetID="1" presetClass="entr" presetSubtype="0" fill="hold" grpId="0" nodeType="withEffect">
+                                  <p:stCondLst>
+                                    <p:cond delay="0"/>
+                                  </p:stCondLst>
+                                  <p:childTnLst>
+                                    <p:set>
+                                      <p:cBhvr>
+                                        <p:cTn id="12" dur="1" fill="hold">
+                                          <p:stCondLst>
+                                            <p:cond delay="0"/>
+                                          </p:stCondLst>
+                                        </p:cTn>
+                                        <p:tgtEl>
+                                          <p:spTgt spid="9"/>
+                                        </p:tgtEl>
+                                        <p:attrNameLst>
+                                          <p:attrName>style.visibility</p:attrName>
+                                        </p:attrNameLst>
+                                      </p:cBhvr>
+                                      <p:to>
+                                        <p:strVal val="visible"/>
+                                      </p:to>
+                                    </p:set>
+                                  </p:childTnLst>
+                                </p:cTn>
+                              </p:par>
+                              <p:par>
+                                <p:cTn id="13" presetID="1" presetClass="entr" presetSubtype="0" fill="hold" grpId="0" nodeType="withEffect">
+                                  <p:stCondLst>
+                                    <p:cond delay="0"/>
+                                  </p:stCondLst>
+                                  <p:childTnLst>
+                                    <p:set>
+                                      <p:cBhvr>
+                                        <p:cTn id="14" dur="1" fill="hold">
+                                          <p:stCondLst>
+                                            <p:cond delay="0"/>
+                                          </p:stCondLst>
+                                        </p:cTn>
+                                        <p:tgtEl>
+                                          <p:spTgt spid="10"/>
+                                        </p:tgtEl>
+                                        <p:attrNameLst>
+                                          <p:attrName>style.visibility</p:attrName>
+                                        </p:attrNameLst>
+                                      </p:cBhvr>
+                                      <p:to>
+                                        <p:strVal val="visible"/>
+                                      </p:to>
+                                    </p:set>
+                                  </p:childTnLst>
+                                </p:cTn>
+                              </p:par>
+                              <p:par>
+                                <p:cTn id="15" presetID="1" presetClass="entr" presetSubtype="0" fill="hold" grpId="0" nodeType="withEffect">
+                                  <p:stCondLst>
+                                    <p:cond delay="0"/>
+                                  </p:stCondLst>
+                                  <p:childTnLst>
+                                    <p:set>
+                                      <p:cBhvr>
+                                        <p:cTn id="16" dur="1" fill="hold">
+                                          <p:stCondLst>
+                                            <p:cond delay="0"/>
+                                          </p:stCondLst>
+                                        </p:cTn>
+                                        <p:tgtEl>
+                                          <p:spTgt spid="13"/>
+                                        </p:tgtEl>
+                                        <p:attrNameLst>
+                                          <p:attrName>style.visibility</p:attrName>
+                                        </p:attrNameLst>
+                                      </p:cBhvr>
+                                      <p:to>
+                                        <p:strVal val="visible"/>
+                                      </p:to>
+                                    </p:set>
+                                  </p:childTnLst>
+                                </p:cTn>
+                              </p:par>
+                              <p:par>
+                                <p:cTn id="17" presetID="1" presetClass="entr" presetSubtype="0" fill="hold" grpId="0" nodeType="withEffect">
+                                  <p:stCondLst>
+                                    <p:cond delay="0"/>
+                                  </p:stCondLst>
+                                  <p:childTnLst>
+                                    <p:set>
+                                      <p:cBhvr>
+                                        <p:cTn id="18" dur="1" fill="hold">
+                                          <p:stCondLst>
+                                            <p:cond delay="0"/>
+                                          </p:stCondLst>
+                                        </p:cTn>
+                                        <p:tgtEl>
+                                          <p:spTgt spid="14"/>
+                                        </p:tgtEl>
+                                        <p:attrNameLst>
+                                          <p:attrName>style.visibility</p:attrName>
+                                        </p:attrNameLst>
+                                      </p:cBhvr>
+                                      <p:to>
+                                        <p:strVal val="visible"/>
+                                      </p:to>
+                                    </p:set>
+                                  </p:childTnLst>
+                                </p:cTn>
+                              </p:par>
+                              <p:par>
+                                <p:cTn id="19" presetID="1" presetClass="entr" presetSubtype="0" fill="hold" grpId="0" nodeType="withEffect">
+                                  <p:stCondLst>
+                                    <p:cond delay="0"/>
+                                  </p:stCondLst>
+                                  <p:childTnLst>
+                                    <p:set>
+                                      <p:cBhvr>
+                                        <p:cTn id="20" dur="1" fill="hold">
+                                          <p:stCondLst>
+                                            <p:cond delay="0"/>
+                                          </p:stCondLst>
+                                        </p:cTn>
+                                        <p:tgtEl>
+                                          <p:spTgt spid="15"/>
+                                        </p:tgtEl>
+                                        <p:attrNameLst>
+                                          <p:attrName>style.visibility</p:attrName>
+                                        </p:attrNameLst>
+                                      </p:cBhvr>
+                                      <p:to>
+                                        <p:strVal val="visible"/>
+                                      </p:to>
+                                    </p:set>
+                                  </p:childTnLst>
+                                </p:cTn>
+                              </p:par>
+                              <p:par>
+                                <p:cTn id="21" presetID="1" presetClass="entr" presetSubtype="0" fill="hold" grpId="0" nodeType="withEffect">
+                                  <p:stCondLst>
+                                    <p:cond delay="0"/>
+                                  </p:stCondLst>
+                                  <p:childTnLst>
+                                    <p:set>
+                                      <p:cBhvr>
+                                        <p:cTn id="22" dur="1" fill="hold">
+                                          <p:stCondLst>
+                                            <p:cond delay="0"/>
+                                          </p:stCondLst>
+                                        </p:cTn>
+                                        <p:tgtEl>
+                                          <p:spTgt spid="18"/>
+                                        </p:tgtEl>
+                                        <p:attrNameLst>
+                                          <p:attrName>style.visibility</p:attrName>
+                                        </p:attrNameLst>
+                                      </p:cBhvr>
+                                      <p:to>
+                                        <p:strVal val="visible"/>
+                                      </p:to>
+                                    </p:set>
+                                  </p:childTnLst>
+                                </p:cTn>
+                              </p:par>
+                              <p:par>
+                                <p:cTn id="23" presetID="1" presetClass="entr" presetSubtype="0" fill="hold" grpId="0" nodeType="withEffect">
+                                  <p:stCondLst>
+                                    <p:cond delay="0"/>
+                                  </p:stCondLst>
+                                  <p:childTnLst>
+                                    <p:set>
+                                      <p:cBhvr>
+                                        <p:cTn id="24" dur="1" fill="hold">
+                                          <p:stCondLst>
+                                            <p:cond delay="0"/>
+                                          </p:stCondLst>
+                                        </p:cTn>
+                                        <p:tgtEl>
+                                          <p:spTgt spid="19"/>
+                                        </p:tgtEl>
+                                        <p:attrNameLst>
+                                          <p:attrName>style.visibility</p:attrName>
+                                        </p:attrNameLst>
+                                      </p:cBhvr>
+                                      <p:to>
+                                        <p:strVal val="visible"/>
+                                      </p:to>
+                                    </p:set>
+                                  </p:childTnLst>
+                                </p:cTn>
+                              </p:par>
+                              <p:par>
+                                <p:cTn id="25" presetID="1" presetClass="entr" presetSubtype="0" fill="hold" grpId="0" nodeType="withEffect">
+                                  <p:stCondLst>
+                                    <p:cond delay="0"/>
+                                  </p:stCondLst>
+                                  <p:childTnLst>
+                                    <p:set>
+                                      <p:cBhvr>
+                                        <p:cTn id="26" dur="1" fill="hold">
+                                          <p:stCondLst>
+                                            <p:cond delay="0"/>
+                                          </p:stCondLst>
+                                        </p:cTn>
+                                        <p:tgtEl>
+                                          <p:spTgt spid="21"/>
+                                        </p:tgtEl>
+                                        <p:attrNameLst>
+                                          <p:attrName>style.visibility</p:attrName>
+                                        </p:attrNameLst>
+                                      </p:cBhvr>
+                                      <p:to>
+                                        <p:strVal val="visible"/>
+                                      </p:to>
+                                    </p:set>
+                                  </p:childTnLst>
+                                </p:cTn>
+                              </p:par>
+                              <p:par>
+                                <p:cTn id="27" presetID="1" presetClass="entr" presetSubtype="0" fill="hold" nodeType="withEffect">
+                                  <p:stCondLst>
+                                    <p:cond delay="0"/>
+                                  </p:stCondLst>
+                                  <p:childTnLst>
+                                    <p:set>
+                                      <p:cBhvr>
+                                        <p:cTn id="28" dur="1" fill="hold">
+                                          <p:stCondLst>
+                                            <p:cond delay="0"/>
+                                          </p:stCondLst>
+                                        </p:cTn>
+                                        <p:tgtEl>
+                                          <p:spTgt spid="24"/>
+                                        </p:tgtEl>
+                                        <p:attrNameLst>
+                                          <p:attrName>style.visibility</p:attrName>
+                                        </p:attrNameLst>
+                                      </p:cBhvr>
+                                      <p:to>
+                                        <p:strVal val="visible"/>
+                                      </p:to>
+                                    </p:set>
+                                  </p:childTnLst>
+                                </p:cTn>
+                              </p:par>
+                              <p:par>
+                                <p:cTn id="29" presetID="1" presetClass="entr" presetSubtype="0" fill="hold" grpId="0" nodeType="withEffect">
+                                  <p:stCondLst>
+                                    <p:cond delay="0"/>
+                                  </p:stCondLst>
+                                  <p:childTnLst>
+                                    <p:set>
+                                      <p:cBhvr>
+                                        <p:cTn id="30" dur="1" fill="hold">
+                                          <p:stCondLst>
+                                            <p:cond delay="0"/>
+                                          </p:stCondLst>
+                                        </p:cTn>
+                                        <p:tgtEl>
+                                          <p:spTgt spid="25"/>
+                                        </p:tgtEl>
+                                        <p:attrNameLst>
+                                          <p:attrName>style.visibility</p:attrName>
+                                        </p:attrNameLst>
+                                      </p:cBhvr>
+                                      <p:to>
+                                        <p:strVal val="visible"/>
+                                      </p:to>
+                                    </p:set>
+                                  </p:childTnLst>
+                                </p:cTn>
+                              </p:par>
+                            </p:childTnLst>
+                          </p:cTn>
+                        </p:par>
+                      </p:childTnLst>
+                    </p:cTn>
+                  </p:par>
+                </p:childTnLst>
+              </p:cTn>
+              <p:prevCondLst>
+                <p:cond evt="onPrev" delay="0">
+                  <p:tgtEl>
+                    <p:sldTgt/>
+                  </p:tgtEl>
+                </p:cond>
+              </p:prevCondLst>
+              <p:nextCondLst>
+                <p:cond evt="onNext" delay="0">
+                  <p:tgtEl>
+                    <p:sldTgt/>
+                  </p:tgtEl>
+                </p:cond>
+              </p:nextCondLst>
+            </p:seq>
+          </p:childTnLst>
+        </p:cTn>
+      </p:par>
+    </p:tnLst>
+    <p:bldLst>
+      <p:bldP spid="8" grpId="0"/>
+      <p:bldP spid="9" grpId="0"/>
+      <p:bldP spid="10" grpId="0"/>
+      <p:bldP spid="13" grpId="0"/>
+      <p:bldP spid="14" grpId="0"/>
+      <p:bldP spid="15" grpId="0"/>
+      <p:bldP spid="18" grpId="0"/>
+      <p:bldP spid="19" grpId="0"/>
+      <p:bldP spid="21" grpId="0" animBg="1"/>
+      <p:bldP spid="22" grpId="0"/>
+      <p:bldP spid="25" grpId="0"/>
+    </p:bldLst>
+  </p:timing>
 </p:sld>
 </file>
 
@@ -5448,7 +5851,7 @@
         <p:spPr>
           <a:xfrm>
             <a:off x="1252728" y="5394960"/>
-            <a:ext cx="4996881" cy="923330"/>
+            <a:ext cx="6263253" cy="923330"/>
           </a:xfrm>
           <a:prstGeom prst="rect">
             <a:avLst/>
@@ -5535,7 +5938,7 @@
                 <a:latin typeface="Consolas" panose="020B0609020204030204" pitchFamily="49" charset="0"/>
                 <a:cs typeface="Consolas" panose="020B0609020204030204" pitchFamily="49" charset="0"/>
               </a:rPr>
-              <a:t>set_A.difference</a:t>
+              <a:t>set_A.symmetric_difference</a:t>
             </a:r>
             <a:r>
               <a:rPr lang="en-US" dirty="0">
@@ -5722,6 +6125,493 @@
   <p:clrMapOvr>
     <a:masterClrMapping/>
   </p:clrMapOvr>
+  <p:timing>
+    <p:tnLst>
+      <p:par>
+        <p:cTn id="1" dur="indefinite" restart="never" nodeType="tmRoot">
+          <p:childTnLst>
+            <p:seq concurrent="1" nextAc="seek">
+              <p:cTn id="2" dur="indefinite" nodeType="mainSeq">
+                <p:childTnLst>
+                  <p:par>
+                    <p:cTn id="3" fill="hold">
+                      <p:stCondLst>
+                        <p:cond delay="indefinite"/>
+                      </p:stCondLst>
+                      <p:childTnLst>
+                        <p:par>
+                          <p:cTn id="4" fill="hold">
+                            <p:stCondLst>
+                              <p:cond delay="0"/>
+                            </p:stCondLst>
+                            <p:childTnLst>
+                              <p:par>
+                                <p:cTn id="5" presetID="1" presetClass="entr" presetSubtype="0" fill="hold" grpId="0" nodeType="clickEffect">
+                                  <p:stCondLst>
+                                    <p:cond delay="0"/>
+                                  </p:stCondLst>
+                                  <p:childTnLst>
+                                    <p:set>
+                                      <p:cBhvr>
+                                        <p:cTn id="6" dur="1" fill="hold">
+                                          <p:stCondLst>
+                                            <p:cond delay="0"/>
+                                          </p:stCondLst>
+                                        </p:cTn>
+                                        <p:tgtEl>
+                                          <p:spTgt spid="21"/>
+                                        </p:tgtEl>
+                                        <p:attrNameLst>
+                                          <p:attrName>style.visibility</p:attrName>
+                                        </p:attrNameLst>
+                                      </p:cBhvr>
+                                      <p:to>
+                                        <p:strVal val="visible"/>
+                                      </p:to>
+                                    </p:set>
+                                  </p:childTnLst>
+                                </p:cTn>
+                              </p:par>
+                            </p:childTnLst>
+                          </p:cTn>
+                        </p:par>
+                      </p:childTnLst>
+                    </p:cTn>
+                  </p:par>
+                  <p:par>
+                    <p:cTn id="7" fill="hold">
+                      <p:stCondLst>
+                        <p:cond delay="indefinite"/>
+                      </p:stCondLst>
+                      <p:childTnLst>
+                        <p:par>
+                          <p:cTn id="8" fill="hold">
+                            <p:stCondLst>
+                              <p:cond delay="0"/>
+                            </p:stCondLst>
+                            <p:childTnLst>
+                              <p:par>
+                                <p:cTn id="9" presetID="1" presetClass="entr" presetSubtype="0" fill="hold" grpId="0" nodeType="clickEffect">
+                                  <p:stCondLst>
+                                    <p:cond delay="0"/>
+                                  </p:stCondLst>
+                                  <p:childTnLst>
+                                    <p:set>
+                                      <p:cBhvr>
+                                        <p:cTn id="10" dur="1" fill="hold">
+                                          <p:stCondLst>
+                                            <p:cond delay="0"/>
+                                          </p:stCondLst>
+                                        </p:cTn>
+                                        <p:tgtEl>
+                                          <p:spTgt spid="8"/>
+                                        </p:tgtEl>
+                                        <p:attrNameLst>
+                                          <p:attrName>style.visibility</p:attrName>
+                                        </p:attrNameLst>
+                                      </p:cBhvr>
+                                      <p:to>
+                                        <p:strVal val="visible"/>
+                                      </p:to>
+                                    </p:set>
+                                  </p:childTnLst>
+                                </p:cTn>
+                              </p:par>
+                              <p:par>
+                                <p:cTn id="11" presetID="1" presetClass="entr" presetSubtype="0" fill="hold" grpId="0" nodeType="withEffect">
+                                  <p:stCondLst>
+                                    <p:cond delay="0"/>
+                                  </p:stCondLst>
+                                  <p:childTnLst>
+                                    <p:set>
+                                      <p:cBhvr>
+                                        <p:cTn id="12" dur="1" fill="hold">
+                                          <p:stCondLst>
+                                            <p:cond delay="0"/>
+                                          </p:stCondLst>
+                                        </p:cTn>
+                                        <p:tgtEl>
+                                          <p:spTgt spid="9"/>
+                                        </p:tgtEl>
+                                        <p:attrNameLst>
+                                          <p:attrName>style.visibility</p:attrName>
+                                        </p:attrNameLst>
+                                      </p:cBhvr>
+                                      <p:to>
+                                        <p:strVal val="visible"/>
+                                      </p:to>
+                                    </p:set>
+                                  </p:childTnLst>
+                                </p:cTn>
+                              </p:par>
+                              <p:par>
+                                <p:cTn id="13" presetID="1" presetClass="entr" presetSubtype="0" fill="hold" grpId="0" nodeType="withEffect">
+                                  <p:stCondLst>
+                                    <p:cond delay="0"/>
+                                  </p:stCondLst>
+                                  <p:childTnLst>
+                                    <p:set>
+                                      <p:cBhvr>
+                                        <p:cTn id="14" dur="1" fill="hold">
+                                          <p:stCondLst>
+                                            <p:cond delay="0"/>
+                                          </p:stCondLst>
+                                        </p:cTn>
+                                        <p:tgtEl>
+                                          <p:spTgt spid="10"/>
+                                        </p:tgtEl>
+                                        <p:attrNameLst>
+                                          <p:attrName>style.visibility</p:attrName>
+                                        </p:attrNameLst>
+                                      </p:cBhvr>
+                                      <p:to>
+                                        <p:strVal val="visible"/>
+                                      </p:to>
+                                    </p:set>
+                                  </p:childTnLst>
+                                </p:cTn>
+                              </p:par>
+                              <p:par>
+                                <p:cTn id="15" presetID="1" presetClass="entr" presetSubtype="0" fill="hold" grpId="0" nodeType="withEffect">
+                                  <p:stCondLst>
+                                    <p:cond delay="0"/>
+                                  </p:stCondLst>
+                                  <p:childTnLst>
+                                    <p:set>
+                                      <p:cBhvr>
+                                        <p:cTn id="16" dur="1" fill="hold">
+                                          <p:stCondLst>
+                                            <p:cond delay="0"/>
+                                          </p:stCondLst>
+                                        </p:cTn>
+                                        <p:tgtEl>
+                                          <p:spTgt spid="11"/>
+                                        </p:tgtEl>
+                                        <p:attrNameLst>
+                                          <p:attrName>style.visibility</p:attrName>
+                                        </p:attrNameLst>
+                                      </p:cBhvr>
+                                      <p:to>
+                                        <p:strVal val="visible"/>
+                                      </p:to>
+                                    </p:set>
+                                  </p:childTnLst>
+                                </p:cTn>
+                              </p:par>
+                              <p:par>
+                                <p:cTn id="17" presetID="1" presetClass="entr" presetSubtype="0" fill="hold" grpId="0" nodeType="withEffect">
+                                  <p:stCondLst>
+                                    <p:cond delay="0"/>
+                                  </p:stCondLst>
+                                  <p:childTnLst>
+                                    <p:set>
+                                      <p:cBhvr>
+                                        <p:cTn id="18" dur="1" fill="hold">
+                                          <p:stCondLst>
+                                            <p:cond delay="0"/>
+                                          </p:stCondLst>
+                                        </p:cTn>
+                                        <p:tgtEl>
+                                          <p:spTgt spid="13"/>
+                                        </p:tgtEl>
+                                        <p:attrNameLst>
+                                          <p:attrName>style.visibility</p:attrName>
+                                        </p:attrNameLst>
+                                      </p:cBhvr>
+                                      <p:to>
+                                        <p:strVal val="visible"/>
+                                      </p:to>
+                                    </p:set>
+                                  </p:childTnLst>
+                                </p:cTn>
+                              </p:par>
+                              <p:par>
+                                <p:cTn id="19" presetID="1" presetClass="entr" presetSubtype="0" fill="hold" grpId="0" nodeType="withEffect">
+                                  <p:stCondLst>
+                                    <p:cond delay="0"/>
+                                  </p:stCondLst>
+                                  <p:childTnLst>
+                                    <p:set>
+                                      <p:cBhvr>
+                                        <p:cTn id="20" dur="1" fill="hold">
+                                          <p:stCondLst>
+                                            <p:cond delay="0"/>
+                                          </p:stCondLst>
+                                        </p:cTn>
+                                        <p:tgtEl>
+                                          <p:spTgt spid="14"/>
+                                        </p:tgtEl>
+                                        <p:attrNameLst>
+                                          <p:attrName>style.visibility</p:attrName>
+                                        </p:attrNameLst>
+                                      </p:cBhvr>
+                                      <p:to>
+                                        <p:strVal val="visible"/>
+                                      </p:to>
+                                    </p:set>
+                                  </p:childTnLst>
+                                </p:cTn>
+                              </p:par>
+                              <p:par>
+                                <p:cTn id="21" presetID="1" presetClass="entr" presetSubtype="0" fill="hold" grpId="0" nodeType="withEffect">
+                                  <p:stCondLst>
+                                    <p:cond delay="0"/>
+                                  </p:stCondLst>
+                                  <p:childTnLst>
+                                    <p:set>
+                                      <p:cBhvr>
+                                        <p:cTn id="22" dur="1" fill="hold">
+                                          <p:stCondLst>
+                                            <p:cond delay="0"/>
+                                          </p:stCondLst>
+                                        </p:cTn>
+                                        <p:tgtEl>
+                                          <p:spTgt spid="15"/>
+                                        </p:tgtEl>
+                                        <p:attrNameLst>
+                                          <p:attrName>style.visibility</p:attrName>
+                                        </p:attrNameLst>
+                                      </p:cBhvr>
+                                      <p:to>
+                                        <p:strVal val="visible"/>
+                                      </p:to>
+                                    </p:set>
+                                  </p:childTnLst>
+                                </p:cTn>
+                              </p:par>
+                              <p:par>
+                                <p:cTn id="23" presetID="1" presetClass="entr" presetSubtype="0" fill="hold" grpId="0" nodeType="withEffect">
+                                  <p:stCondLst>
+                                    <p:cond delay="0"/>
+                                  </p:stCondLst>
+                                  <p:childTnLst>
+                                    <p:set>
+                                      <p:cBhvr>
+                                        <p:cTn id="24" dur="1" fill="hold">
+                                          <p:stCondLst>
+                                            <p:cond delay="0"/>
+                                          </p:stCondLst>
+                                        </p:cTn>
+                                        <p:tgtEl>
+                                          <p:spTgt spid="16"/>
+                                        </p:tgtEl>
+                                        <p:attrNameLst>
+                                          <p:attrName>style.visibility</p:attrName>
+                                        </p:attrNameLst>
+                                      </p:cBhvr>
+                                      <p:to>
+                                        <p:strVal val="visible"/>
+                                      </p:to>
+                                    </p:set>
+                                  </p:childTnLst>
+                                </p:cTn>
+                              </p:par>
+                              <p:par>
+                                <p:cTn id="25" presetID="1" presetClass="entr" presetSubtype="0" fill="hold" grpId="0" nodeType="withEffect">
+                                  <p:stCondLst>
+                                    <p:cond delay="0"/>
+                                  </p:stCondLst>
+                                  <p:childTnLst>
+                                    <p:set>
+                                      <p:cBhvr>
+                                        <p:cTn id="26" dur="1" fill="hold">
+                                          <p:stCondLst>
+                                            <p:cond delay="0"/>
+                                          </p:stCondLst>
+                                        </p:cTn>
+                                        <p:tgtEl>
+                                          <p:spTgt spid="18"/>
+                                        </p:tgtEl>
+                                        <p:attrNameLst>
+                                          <p:attrName>style.visibility</p:attrName>
+                                        </p:attrNameLst>
+                                      </p:cBhvr>
+                                      <p:to>
+                                        <p:strVal val="visible"/>
+                                      </p:to>
+                                    </p:set>
+                                  </p:childTnLst>
+                                </p:cTn>
+                              </p:par>
+                              <p:par>
+                                <p:cTn id="27" presetID="1" presetClass="entr" presetSubtype="0" fill="hold" grpId="0" nodeType="withEffect">
+                                  <p:stCondLst>
+                                    <p:cond delay="0"/>
+                                  </p:stCondLst>
+                                  <p:childTnLst>
+                                    <p:set>
+                                      <p:cBhvr>
+                                        <p:cTn id="28" dur="1" fill="hold">
+                                          <p:stCondLst>
+                                            <p:cond delay="0"/>
+                                          </p:stCondLst>
+                                        </p:cTn>
+                                        <p:tgtEl>
+                                          <p:spTgt spid="19"/>
+                                        </p:tgtEl>
+                                        <p:attrNameLst>
+                                          <p:attrName>style.visibility</p:attrName>
+                                        </p:attrNameLst>
+                                      </p:cBhvr>
+                                      <p:to>
+                                        <p:strVal val="visible"/>
+                                      </p:to>
+                                    </p:set>
+                                  </p:childTnLst>
+                                </p:cTn>
+                              </p:par>
+                              <p:par>
+                                <p:cTn id="29" presetID="1" presetClass="entr" presetSubtype="0" fill="hold" grpId="0" nodeType="withEffect">
+                                  <p:stCondLst>
+                                    <p:cond delay="0"/>
+                                  </p:stCondLst>
+                                  <p:childTnLst>
+                                    <p:set>
+                                      <p:cBhvr>
+                                        <p:cTn id="30" dur="1" fill="hold">
+                                          <p:stCondLst>
+                                            <p:cond delay="0"/>
+                                          </p:stCondLst>
+                                        </p:cTn>
+                                        <p:tgtEl>
+                                          <p:spTgt spid="20"/>
+                                        </p:tgtEl>
+                                        <p:attrNameLst>
+                                          <p:attrName>style.visibility</p:attrName>
+                                        </p:attrNameLst>
+                                      </p:cBhvr>
+                                      <p:to>
+                                        <p:strVal val="visible"/>
+                                      </p:to>
+                                    </p:set>
+                                  </p:childTnLst>
+                                </p:cTn>
+                              </p:par>
+                              <p:par>
+                                <p:cTn id="31" presetID="1" presetClass="entr" presetSubtype="0" fill="hold" nodeType="withEffect">
+                                  <p:stCondLst>
+                                    <p:cond delay="0"/>
+                                  </p:stCondLst>
+                                  <p:childTnLst>
+                                    <p:set>
+                                      <p:cBhvr>
+                                        <p:cTn id="32" dur="1" fill="hold">
+                                          <p:stCondLst>
+                                            <p:cond delay="0"/>
+                                          </p:stCondLst>
+                                        </p:cTn>
+                                        <p:tgtEl>
+                                          <p:spTgt spid="22"/>
+                                        </p:tgtEl>
+                                        <p:attrNameLst>
+                                          <p:attrName>style.visibility</p:attrName>
+                                        </p:attrNameLst>
+                                      </p:cBhvr>
+                                      <p:to>
+                                        <p:strVal val="visible"/>
+                                      </p:to>
+                                    </p:set>
+                                  </p:childTnLst>
+                                </p:cTn>
+                              </p:par>
+                              <p:par>
+                                <p:cTn id="33" presetID="1" presetClass="entr" presetSubtype="0" fill="hold" grpId="0" nodeType="withEffect">
+                                  <p:stCondLst>
+                                    <p:cond delay="0"/>
+                                  </p:stCondLst>
+                                  <p:childTnLst>
+                                    <p:set>
+                                      <p:cBhvr>
+                                        <p:cTn id="34" dur="1" fill="hold">
+                                          <p:stCondLst>
+                                            <p:cond delay="0"/>
+                                          </p:stCondLst>
+                                        </p:cTn>
+                                        <p:tgtEl>
+                                          <p:spTgt spid="23"/>
+                                        </p:tgtEl>
+                                        <p:attrNameLst>
+                                          <p:attrName>style.visibility</p:attrName>
+                                        </p:attrNameLst>
+                                      </p:cBhvr>
+                                      <p:to>
+                                        <p:strVal val="visible"/>
+                                      </p:to>
+                                    </p:set>
+                                  </p:childTnLst>
+                                </p:cTn>
+                              </p:par>
+                              <p:par>
+                                <p:cTn id="35" presetID="1" presetClass="entr" presetSubtype="0" fill="hold" grpId="0" nodeType="withEffect">
+                                  <p:stCondLst>
+                                    <p:cond delay="0"/>
+                                  </p:stCondLst>
+                                  <p:childTnLst>
+                                    <p:set>
+                                      <p:cBhvr>
+                                        <p:cTn id="36" dur="1" fill="hold">
+                                          <p:stCondLst>
+                                            <p:cond delay="0"/>
+                                          </p:stCondLst>
+                                        </p:cTn>
+                                        <p:tgtEl>
+                                          <p:spTgt spid="25"/>
+                                        </p:tgtEl>
+                                        <p:attrNameLst>
+                                          <p:attrName>style.visibility</p:attrName>
+                                        </p:attrNameLst>
+                                      </p:cBhvr>
+                                      <p:to>
+                                        <p:strVal val="visible"/>
+                                      </p:to>
+                                    </p:set>
+                                  </p:childTnLst>
+                                </p:cTn>
+                              </p:par>
+                            </p:childTnLst>
+                          </p:cTn>
+                        </p:par>
+                      </p:childTnLst>
+                    </p:cTn>
+                  </p:par>
+                </p:childTnLst>
+              </p:cTn>
+              <p:prevCondLst>
+                <p:cond evt="onPrev" delay="0">
+                  <p:tgtEl>
+                    <p:sldTgt/>
+                  </p:tgtEl>
+                </p:cond>
+              </p:prevCondLst>
+              <p:nextCondLst>
+                <p:cond evt="onNext" delay="0">
+                  <p:tgtEl>
+                    <p:sldTgt/>
+                  </p:tgtEl>
+                </p:cond>
+              </p:nextCondLst>
+            </p:seq>
+          </p:childTnLst>
+        </p:cTn>
+      </p:par>
+    </p:tnLst>
+    <p:bldLst>
+      <p:bldP spid="8" grpId="0"/>
+      <p:bldP spid="9" grpId="0"/>
+      <p:bldP spid="10" grpId="0"/>
+      <p:bldP spid="11" grpId="0"/>
+      <p:bldP spid="13" grpId="0"/>
+      <p:bldP spid="14" grpId="0"/>
+      <p:bldP spid="15" grpId="0"/>
+      <p:bldP spid="16" grpId="0"/>
+      <p:bldP spid="18" grpId="0"/>
+      <p:bldP spid="19" grpId="0"/>
+      <p:bldP spid="20" grpId="0" animBg="1"/>
+      <p:bldP spid="21" grpId="0"/>
+      <p:bldP spid="23" grpId="0"/>
+      <p:bldP spid="25" grpId="0"/>
+    </p:bldLst>
+  </p:timing>
 </p:sld>
 </file>
 
@@ -5821,66 +6711,36 @@
           <a:p>
             <a:r>
               <a:rPr lang="en-US" b="1" dirty="0">
-                <a:solidFill>
-                  <a:schemeClr val="tx2">
-                    <a:lumMod val="75000"/>
-                  </a:schemeClr>
-                </a:solidFill>
                 <a:latin typeface="Consolas" panose="020B0609020204030204" pitchFamily="49" charset="0"/>
                 <a:cs typeface="Consolas" panose="020B0609020204030204" pitchFamily="49" charset="0"/>
               </a:rPr>
-              <a:t>update(*others)</a:t>
-            </a:r>
-            <a:r>
-              <a:rPr lang="en-US" dirty="0">
-                <a:solidFill>
-                  <a:schemeClr val="tx2">
-                    <a:lumMod val="75000"/>
-                  </a:schemeClr>
-                </a:solidFill>
-              </a:rPr>
-              <a:t> set |= other | ... Update the set, adding elements from all others.</a:t>
-            </a:r>
-          </a:p>
-          <a:p>
-            <a:endParaRPr lang="en-US" b="1" dirty="0">
-              <a:solidFill>
-                <a:schemeClr val="tx2">
-                  <a:lumMod val="75000"/>
-                </a:schemeClr>
-              </a:solidFill>
-            </a:endParaRPr>
-          </a:p>
-          <a:p>
+              <a:t>add(</a:t>
+            </a:r>
             <a:r>
               <a:rPr lang="en-US" b="1" dirty="0" err="1">
-                <a:solidFill>
-                  <a:schemeClr val="tx2">
-                    <a:lumMod val="75000"/>
-                  </a:schemeClr>
-                </a:solidFill>
-              </a:rPr>
-              <a:t>intersection_update</a:t>
+                <a:latin typeface="Consolas" panose="020B0609020204030204" pitchFamily="49" charset="0"/>
+                <a:cs typeface="Consolas" panose="020B0609020204030204" pitchFamily="49" charset="0"/>
+              </a:rPr>
+              <a:t>elem</a:t>
             </a:r>
             <a:r>
               <a:rPr lang="en-US" b="1" dirty="0">
-                <a:solidFill>
-                  <a:schemeClr val="tx2">
-                    <a:lumMod val="75000"/>
-                  </a:schemeClr>
-                </a:solidFill>
-              </a:rPr>
-              <a:t>(*others)</a:t>
-            </a:r>
-            <a:r>
-              <a:rPr lang="en-US" dirty="0">
-                <a:solidFill>
-                  <a:schemeClr val="tx2">
-                    <a:lumMod val="75000"/>
-                  </a:schemeClr>
-                </a:solidFill>
-              </a:rPr>
-              <a:t> set &amp;= other &amp; ... Update the set, keeping only elements found in it and all others.</a:t>
+                <a:latin typeface="Consolas" panose="020B0609020204030204" pitchFamily="49" charset="0"/>
+                <a:cs typeface="Consolas" panose="020B0609020204030204" pitchFamily="49" charset="0"/>
+              </a:rPr>
+              <a:t>)</a:t>
+            </a:r>
+            <a:r>
+              <a:rPr lang="en-US" dirty="0"/>
+              <a:t> Add element </a:t>
+            </a:r>
+            <a:r>
+              <a:rPr lang="en-US" dirty="0" err="1"/>
+              <a:t>elem</a:t>
+            </a:r>
+            <a:r>
+              <a:rPr lang="en-US" dirty="0"/>
+              <a:t> to the set.</a:t>
             </a:r>
           </a:p>
           <a:p>
@@ -5896,7 +6756,7 @@
           </a:p>
           <a:p>
             <a:r>
-              <a:rPr lang="en-US" b="1" dirty="0" err="1">
+              <a:rPr lang="en-US" b="1" dirty="0">
                 <a:solidFill>
                   <a:schemeClr val="tx2">
                     <a:lumMod val="75000"/>
@@ -5905,19 +6765,7 @@
                 <a:latin typeface="Consolas" panose="020B0609020204030204" pitchFamily="49" charset="0"/>
                 <a:cs typeface="Consolas" panose="020B0609020204030204" pitchFamily="49" charset="0"/>
               </a:rPr>
-              <a:t>difference_update</a:t>
-            </a:r>
-            <a:r>
-              <a:rPr lang="en-US" b="1" dirty="0">
-                <a:solidFill>
-                  <a:schemeClr val="tx2">
-                    <a:lumMod val="75000"/>
-                  </a:schemeClr>
-                </a:solidFill>
-                <a:latin typeface="Consolas" panose="020B0609020204030204" pitchFamily="49" charset="0"/>
-                <a:cs typeface="Consolas" panose="020B0609020204030204" pitchFamily="49" charset="0"/>
-              </a:rPr>
-              <a:t>(*others) </a:t>
+              <a:t>update(*others)</a:t>
             </a:r>
             <a:r>
               <a:rPr lang="en-US" dirty="0">
@@ -5927,7 +6775,7 @@
                   </a:schemeClr>
                 </a:solidFill>
               </a:rPr>
-              <a:t>set -= other | ... Update the set, removing elements found in others.</a:t>
+              <a:t> set |= other | ... Update the set, adding elements from all others.</a:t>
             </a:r>
           </a:p>
           <a:p>
@@ -5948,7 +6796,7 @@
                   </a:schemeClr>
                 </a:solidFill>
               </a:rPr>
-              <a:t>symmetric_difference_update</a:t>
+              <a:t>intersection_update</a:t>
             </a:r>
             <a:r>
               <a:rPr lang="en-US" b="1" dirty="0">
@@ -5958,7 +6806,7 @@
                   </a:schemeClr>
                 </a:solidFill>
               </a:rPr>
-              <a:t>(other)</a:t>
+              <a:t>(*others)</a:t>
             </a:r>
             <a:r>
               <a:rPr lang="en-US" dirty="0">
@@ -5968,7 +6816,7 @@
                   </a:schemeClr>
                 </a:solidFill>
               </a:rPr>
-              <a:t> set ^= other Update the set, keeping only elements found in either set, but not in both.</a:t>
+              <a:t> set &amp;= other &amp; ... Update the set, keeping only elements found in it and all others.</a:t>
             </a:r>
           </a:p>
           <a:p>
@@ -5984,7 +6832,7 @@
           </a:p>
           <a:p>
             <a:r>
-              <a:rPr lang="en-US" b="1" dirty="0">
+              <a:rPr lang="en-US" b="1" dirty="0" err="1">
                 <a:solidFill>
                   <a:schemeClr val="tx2">
                     <a:lumMod val="75000"/>
@@ -5993,10 +6841,10 @@
                 <a:latin typeface="Consolas" panose="020B0609020204030204" pitchFamily="49" charset="0"/>
                 <a:cs typeface="Consolas" panose="020B0609020204030204" pitchFamily="49" charset="0"/>
               </a:rPr>
-              <a:t>add(</a:t>
-            </a:r>
-            <a:r>
-              <a:rPr lang="en-US" b="1" dirty="0" err="1">
+              <a:t>difference_update</a:t>
+            </a:r>
+            <a:r>
+              <a:rPr lang="en-US" b="1" dirty="0">
                 <a:solidFill>
                   <a:schemeClr val="tx2">
                     <a:lumMod val="75000"/>
@@ -6005,19 +6853,7 @@
                 <a:latin typeface="Consolas" panose="020B0609020204030204" pitchFamily="49" charset="0"/>
                 <a:cs typeface="Consolas" panose="020B0609020204030204" pitchFamily="49" charset="0"/>
               </a:rPr>
-              <a:t>elem</a:t>
-            </a:r>
-            <a:r>
-              <a:rPr lang="en-US" b="1" dirty="0">
-                <a:solidFill>
-                  <a:schemeClr val="tx2">
-                    <a:lumMod val="75000"/>
-                  </a:schemeClr>
-                </a:solidFill>
-                <a:latin typeface="Consolas" panose="020B0609020204030204" pitchFamily="49" charset="0"/>
-                <a:cs typeface="Consolas" panose="020B0609020204030204" pitchFamily="49" charset="0"/>
-              </a:rPr>
-              <a:t>)</a:t>
+              <a:t>(*others) </a:t>
             </a:r>
             <a:r>
               <a:rPr lang="en-US" dirty="0">
@@ -6027,27 +6863,7 @@
                   </a:schemeClr>
                 </a:solidFill>
               </a:rPr>
-              <a:t> Add element </a:t>
-            </a:r>
-            <a:r>
-              <a:rPr lang="en-US" dirty="0" err="1">
-                <a:solidFill>
-                  <a:schemeClr val="tx2">
-                    <a:lumMod val="75000"/>
-                  </a:schemeClr>
-                </a:solidFill>
-              </a:rPr>
-              <a:t>elem</a:t>
-            </a:r>
-            <a:r>
-              <a:rPr lang="en-US" dirty="0">
-                <a:solidFill>
-                  <a:schemeClr val="tx2">
-                    <a:lumMod val="75000"/>
-                  </a:schemeClr>
-                </a:solidFill>
-              </a:rPr>
-              <a:t> to the set.</a:t>
+              <a:t>set -= other | ... Update the set, removing elements found in others.</a:t>
             </a:r>
           </a:p>
           <a:p>
@@ -6057,9 +6873,39 @@
                   <a:lumMod val="75000"/>
                 </a:schemeClr>
               </a:solidFill>
-              <a:latin typeface="Consolas" panose="020B0609020204030204" pitchFamily="49" charset="0"/>
-              <a:cs typeface="Consolas" panose="020B0609020204030204" pitchFamily="49" charset="0"/>
             </a:endParaRPr>
+          </a:p>
+          <a:p>
+            <a:r>
+              <a:rPr lang="en-US" b="1" dirty="0" err="1">
+                <a:solidFill>
+                  <a:schemeClr val="tx2">
+                    <a:lumMod val="75000"/>
+                  </a:schemeClr>
+                </a:solidFill>
+              </a:rPr>
+              <a:t>symmetric_difference_update</a:t>
+            </a:r>
+            <a:r>
+              <a:rPr lang="en-US" b="1" dirty="0">
+                <a:solidFill>
+                  <a:schemeClr val="tx2">
+                    <a:lumMod val="75000"/>
+                  </a:schemeClr>
+                </a:solidFill>
+              </a:rPr>
+              <a:t>(other)</a:t>
+            </a:r>
+            <a:r>
+              <a:rPr lang="en-US" dirty="0">
+                <a:solidFill>
+                  <a:schemeClr val="tx2">
+                    <a:lumMod val="75000"/>
+                  </a:schemeClr>
+                </a:solidFill>
+              </a:rPr>
+              <a:t> set ^= other Update the set, keeping only elements found in either set, but not in both.</a:t>
+            </a:r>
           </a:p>
         </p:txBody>
       </p:sp>
@@ -6073,6 +6919,284 @@
   <p:clrMapOvr>
     <a:masterClrMapping/>
   </p:clrMapOvr>
+  <p:timing>
+    <p:tnLst>
+      <p:par>
+        <p:cTn id="1" dur="indefinite" restart="never" nodeType="tmRoot">
+          <p:childTnLst>
+            <p:seq concurrent="1" nextAc="seek">
+              <p:cTn id="2" dur="indefinite" nodeType="mainSeq">
+                <p:childTnLst>
+                  <p:par>
+                    <p:cTn id="3" fill="hold">
+                      <p:stCondLst>
+                        <p:cond delay="indefinite"/>
+                      </p:stCondLst>
+                      <p:childTnLst>
+                        <p:par>
+                          <p:cTn id="4" fill="hold">
+                            <p:stCondLst>
+                              <p:cond delay="0"/>
+                            </p:stCondLst>
+                            <p:childTnLst>
+                              <p:par>
+                                <p:cTn id="5" presetID="1" presetClass="entr" presetSubtype="0" fill="hold" grpId="0" nodeType="clickEffect">
+                                  <p:stCondLst>
+                                    <p:cond delay="0"/>
+                                  </p:stCondLst>
+                                  <p:childTnLst>
+                                    <p:set>
+                                      <p:cBhvr>
+                                        <p:cTn id="6" dur="1" fill="hold">
+                                          <p:stCondLst>
+                                            <p:cond delay="0"/>
+                                          </p:stCondLst>
+                                        </p:cTn>
+                                        <p:tgtEl>
+                                          <p:spTgt spid="3">
+                                            <p:txEl>
+                                              <p:pRg st="0" end="0"/>
+                                            </p:txEl>
+                                          </p:spTgt>
+                                        </p:tgtEl>
+                                        <p:attrNameLst>
+                                          <p:attrName>style.visibility</p:attrName>
+                                        </p:attrNameLst>
+                                      </p:cBhvr>
+                                      <p:to>
+                                        <p:strVal val="visible"/>
+                                      </p:to>
+                                    </p:set>
+                                  </p:childTnLst>
+                                </p:cTn>
+                              </p:par>
+                            </p:childTnLst>
+                          </p:cTn>
+                        </p:par>
+                      </p:childTnLst>
+                    </p:cTn>
+                  </p:par>
+                  <p:par>
+                    <p:cTn id="7" fill="hold">
+                      <p:stCondLst>
+                        <p:cond delay="indefinite"/>
+                      </p:stCondLst>
+                      <p:childTnLst>
+                        <p:par>
+                          <p:cTn id="8" fill="hold">
+                            <p:stCondLst>
+                              <p:cond delay="0"/>
+                            </p:stCondLst>
+                            <p:childTnLst>
+                              <p:par>
+                                <p:cTn id="9" presetID="1" presetClass="entr" presetSubtype="0" fill="hold" grpId="0" nodeType="clickEffect">
+                                  <p:stCondLst>
+                                    <p:cond delay="0"/>
+                                  </p:stCondLst>
+                                  <p:childTnLst>
+                                    <p:set>
+                                      <p:cBhvr>
+                                        <p:cTn id="10" dur="1" fill="hold">
+                                          <p:stCondLst>
+                                            <p:cond delay="0"/>
+                                          </p:stCondLst>
+                                        </p:cTn>
+                                        <p:tgtEl>
+                                          <p:spTgt spid="3">
+                                            <p:txEl>
+                                              <p:pRg st="2" end="2"/>
+                                            </p:txEl>
+                                          </p:spTgt>
+                                        </p:tgtEl>
+                                        <p:attrNameLst>
+                                          <p:attrName>style.visibility</p:attrName>
+                                        </p:attrNameLst>
+                                      </p:cBhvr>
+                                      <p:to>
+                                        <p:strVal val="visible"/>
+                                      </p:to>
+                                    </p:set>
+                                  </p:childTnLst>
+                                </p:cTn>
+                              </p:par>
+                            </p:childTnLst>
+                          </p:cTn>
+                        </p:par>
+                      </p:childTnLst>
+                    </p:cTn>
+                  </p:par>
+                  <p:par>
+                    <p:cTn id="11" fill="hold">
+                      <p:stCondLst>
+                        <p:cond delay="indefinite"/>
+                      </p:stCondLst>
+                      <p:childTnLst>
+                        <p:par>
+                          <p:cTn id="12" fill="hold">
+                            <p:stCondLst>
+                              <p:cond delay="0"/>
+                            </p:stCondLst>
+                            <p:childTnLst>
+                              <p:par>
+                                <p:cTn id="13" presetID="1" presetClass="entr" presetSubtype="0" fill="hold" grpId="0" nodeType="clickEffect">
+                                  <p:stCondLst>
+                                    <p:cond delay="0"/>
+                                  </p:stCondLst>
+                                  <p:childTnLst>
+                                    <p:set>
+                                      <p:cBhvr>
+                                        <p:cTn id="14" dur="1" fill="hold">
+                                          <p:stCondLst>
+                                            <p:cond delay="0"/>
+                                          </p:stCondLst>
+                                        </p:cTn>
+                                        <p:tgtEl>
+                                          <p:spTgt spid="3">
+                                            <p:txEl>
+                                              <p:pRg st="4" end="4"/>
+                                            </p:txEl>
+                                          </p:spTgt>
+                                        </p:tgtEl>
+                                        <p:attrNameLst>
+                                          <p:attrName>style.visibility</p:attrName>
+                                        </p:attrNameLst>
+                                      </p:cBhvr>
+                                      <p:to>
+                                        <p:strVal val="visible"/>
+                                      </p:to>
+                                    </p:set>
+                                  </p:childTnLst>
+                                </p:cTn>
+                              </p:par>
+                            </p:childTnLst>
+                          </p:cTn>
+                        </p:par>
+                      </p:childTnLst>
+                    </p:cTn>
+                  </p:par>
+                  <p:par>
+                    <p:cTn id="15" fill="hold">
+                      <p:stCondLst>
+                        <p:cond delay="indefinite"/>
+                      </p:stCondLst>
+                      <p:childTnLst>
+                        <p:par>
+                          <p:cTn id="16" fill="hold">
+                            <p:stCondLst>
+                              <p:cond delay="0"/>
+                            </p:stCondLst>
+                            <p:childTnLst>
+                              <p:par>
+                                <p:cTn id="17" presetID="1" presetClass="entr" presetSubtype="0" fill="hold" grpId="0" nodeType="clickEffect">
+                                  <p:stCondLst>
+                                    <p:cond delay="0"/>
+                                  </p:stCondLst>
+                                  <p:childTnLst>
+                                    <p:set>
+                                      <p:cBhvr>
+                                        <p:cTn id="18" dur="1" fill="hold">
+                                          <p:stCondLst>
+                                            <p:cond delay="0"/>
+                                          </p:stCondLst>
+                                        </p:cTn>
+                                        <p:tgtEl>
+                                          <p:spTgt spid="3">
+                                            <p:txEl>
+                                              <p:pRg st="6" end="6"/>
+                                            </p:txEl>
+                                          </p:spTgt>
+                                        </p:tgtEl>
+                                        <p:attrNameLst>
+                                          <p:attrName>style.visibility</p:attrName>
+                                        </p:attrNameLst>
+                                      </p:cBhvr>
+                                      <p:to>
+                                        <p:strVal val="visible"/>
+                                      </p:to>
+                                    </p:set>
+                                  </p:childTnLst>
+                                </p:cTn>
+                              </p:par>
+                            </p:childTnLst>
+                          </p:cTn>
+                        </p:par>
+                      </p:childTnLst>
+                    </p:cTn>
+                  </p:par>
+                  <p:par>
+                    <p:cTn id="19" fill="hold">
+                      <p:stCondLst>
+                        <p:cond delay="indefinite"/>
+                      </p:stCondLst>
+                      <p:childTnLst>
+                        <p:par>
+                          <p:cTn id="20" fill="hold">
+                            <p:stCondLst>
+                              <p:cond delay="0"/>
+                            </p:stCondLst>
+                            <p:childTnLst>
+                              <p:par>
+                                <p:cTn id="21" presetID="1" presetClass="entr" presetSubtype="0" fill="hold" grpId="0" nodeType="clickEffect">
+                                  <p:stCondLst>
+                                    <p:cond delay="0"/>
+                                  </p:stCondLst>
+                                  <p:childTnLst>
+                                    <p:set>
+                                      <p:cBhvr>
+                                        <p:cTn id="22" dur="1" fill="hold">
+                                          <p:stCondLst>
+                                            <p:cond delay="0"/>
+                                          </p:stCondLst>
+                                        </p:cTn>
+                                        <p:tgtEl>
+                                          <p:spTgt spid="3">
+                                            <p:txEl>
+                                              <p:pRg st="8" end="8"/>
+                                            </p:txEl>
+                                          </p:spTgt>
+                                        </p:tgtEl>
+                                        <p:attrNameLst>
+                                          <p:attrName>style.visibility</p:attrName>
+                                        </p:attrNameLst>
+                                      </p:cBhvr>
+                                      <p:to>
+                                        <p:strVal val="visible"/>
+                                      </p:to>
+                                    </p:set>
+                                  </p:childTnLst>
+                                </p:cTn>
+                              </p:par>
+                            </p:childTnLst>
+                          </p:cTn>
+                        </p:par>
+                      </p:childTnLst>
+                    </p:cTn>
+                  </p:par>
+                </p:childTnLst>
+              </p:cTn>
+              <p:prevCondLst>
+                <p:cond evt="onPrev" delay="0">
+                  <p:tgtEl>
+                    <p:sldTgt/>
+                  </p:tgtEl>
+                </p:cond>
+              </p:prevCondLst>
+              <p:nextCondLst>
+                <p:cond evt="onNext" delay="0">
+                  <p:tgtEl>
+                    <p:sldTgt/>
+                  </p:tgtEl>
+                </p:cond>
+              </p:nextCondLst>
+            </p:seq>
+          </p:childTnLst>
+        </p:cTn>
+      </p:par>
+    </p:tnLst>
+    <p:bldLst>
+      <p:bldP spid="3" grpId="0" build="p"/>
+    </p:bldLst>
+  </p:timing>
 </p:sld>
 </file>
 
@@ -6271,6 +7395,235 @@
   <p:clrMapOvr>
     <a:masterClrMapping/>
   </p:clrMapOvr>
+  <p:timing>
+    <p:tnLst>
+      <p:par>
+        <p:cTn id="1" dur="indefinite" restart="never" nodeType="tmRoot">
+          <p:childTnLst>
+            <p:seq concurrent="1" nextAc="seek">
+              <p:cTn id="2" dur="indefinite" nodeType="mainSeq">
+                <p:childTnLst>
+                  <p:par>
+                    <p:cTn id="3" fill="hold">
+                      <p:stCondLst>
+                        <p:cond delay="indefinite"/>
+                      </p:stCondLst>
+                      <p:childTnLst>
+                        <p:par>
+                          <p:cTn id="4" fill="hold">
+                            <p:stCondLst>
+                              <p:cond delay="0"/>
+                            </p:stCondLst>
+                            <p:childTnLst>
+                              <p:par>
+                                <p:cTn id="5" presetID="1" presetClass="entr" presetSubtype="0" fill="hold" grpId="0" nodeType="clickEffect">
+                                  <p:stCondLst>
+                                    <p:cond delay="0"/>
+                                  </p:stCondLst>
+                                  <p:childTnLst>
+                                    <p:set>
+                                      <p:cBhvr>
+                                        <p:cTn id="6" dur="1" fill="hold">
+                                          <p:stCondLst>
+                                            <p:cond delay="0"/>
+                                          </p:stCondLst>
+                                        </p:cTn>
+                                        <p:tgtEl>
+                                          <p:spTgt spid="3">
+                                            <p:txEl>
+                                              <p:pRg st="0" end="0"/>
+                                            </p:txEl>
+                                          </p:spTgt>
+                                        </p:tgtEl>
+                                        <p:attrNameLst>
+                                          <p:attrName>style.visibility</p:attrName>
+                                        </p:attrNameLst>
+                                      </p:cBhvr>
+                                      <p:to>
+                                        <p:strVal val="visible"/>
+                                      </p:to>
+                                    </p:set>
+                                  </p:childTnLst>
+                                </p:cTn>
+                              </p:par>
+                            </p:childTnLst>
+                          </p:cTn>
+                        </p:par>
+                      </p:childTnLst>
+                    </p:cTn>
+                  </p:par>
+                  <p:par>
+                    <p:cTn id="7" fill="hold">
+                      <p:stCondLst>
+                        <p:cond delay="indefinite"/>
+                      </p:stCondLst>
+                      <p:childTnLst>
+                        <p:par>
+                          <p:cTn id="8" fill="hold">
+                            <p:stCondLst>
+                              <p:cond delay="0"/>
+                            </p:stCondLst>
+                            <p:childTnLst>
+                              <p:par>
+                                <p:cTn id="9" presetID="1" presetClass="entr" presetSubtype="0" fill="hold" grpId="0" nodeType="clickEffect">
+                                  <p:stCondLst>
+                                    <p:cond delay="0"/>
+                                  </p:stCondLst>
+                                  <p:childTnLst>
+                                    <p:set>
+                                      <p:cBhvr>
+                                        <p:cTn id="10" dur="1" fill="hold">
+                                          <p:stCondLst>
+                                            <p:cond delay="0"/>
+                                          </p:stCondLst>
+                                        </p:cTn>
+                                        <p:tgtEl>
+                                          <p:spTgt spid="3">
+                                            <p:txEl>
+                                              <p:pRg st="2" end="2"/>
+                                            </p:txEl>
+                                          </p:spTgt>
+                                        </p:tgtEl>
+                                        <p:attrNameLst>
+                                          <p:attrName>style.visibility</p:attrName>
+                                        </p:attrNameLst>
+                                      </p:cBhvr>
+                                      <p:to>
+                                        <p:strVal val="visible"/>
+                                      </p:to>
+                                    </p:set>
+                                  </p:childTnLst>
+                                </p:cTn>
+                              </p:par>
+                            </p:childTnLst>
+                          </p:cTn>
+                        </p:par>
+                      </p:childTnLst>
+                    </p:cTn>
+                  </p:par>
+                  <p:par>
+                    <p:cTn id="11" fill="hold">
+                      <p:stCondLst>
+                        <p:cond delay="indefinite"/>
+                      </p:stCondLst>
+                      <p:childTnLst>
+                        <p:par>
+                          <p:cTn id="12" fill="hold">
+                            <p:stCondLst>
+                              <p:cond delay="0"/>
+                            </p:stCondLst>
+                            <p:childTnLst>
+                              <p:par>
+                                <p:cTn id="13" presetID="1" presetClass="entr" presetSubtype="0" fill="hold" grpId="0" nodeType="clickEffect">
+                                  <p:stCondLst>
+                                    <p:cond delay="0"/>
+                                  </p:stCondLst>
+                                  <p:childTnLst>
+                                    <p:set>
+                                      <p:cBhvr>
+                                        <p:cTn id="14" dur="1" fill="hold">
+                                          <p:stCondLst>
+                                            <p:cond delay="0"/>
+                                          </p:stCondLst>
+                                        </p:cTn>
+                                        <p:tgtEl>
+                                          <p:spTgt spid="3">
+                                            <p:txEl>
+                                              <p:pRg st="4" end="4"/>
+                                            </p:txEl>
+                                          </p:spTgt>
+                                        </p:tgtEl>
+                                        <p:attrNameLst>
+                                          <p:attrName>style.visibility</p:attrName>
+                                        </p:attrNameLst>
+                                      </p:cBhvr>
+                                      <p:to>
+                                        <p:strVal val="visible"/>
+                                      </p:to>
+                                    </p:set>
+                                  </p:childTnLst>
+                                </p:cTn>
+                              </p:par>
+                            </p:childTnLst>
+                          </p:cTn>
+                        </p:par>
+                      </p:childTnLst>
+                    </p:cTn>
+                  </p:par>
+                  <p:par>
+                    <p:cTn id="15" fill="hold">
+                      <p:stCondLst>
+                        <p:cond delay="indefinite"/>
+                      </p:stCondLst>
+                      <p:childTnLst>
+                        <p:par>
+                          <p:cTn id="16" fill="hold">
+                            <p:stCondLst>
+                              <p:cond delay="0"/>
+                            </p:stCondLst>
+                            <p:childTnLst>
+                              <p:par>
+                                <p:cTn id="17" presetID="1" presetClass="entr" presetSubtype="0" fill="hold" grpId="0" nodeType="clickEffect">
+                                  <p:stCondLst>
+                                    <p:cond delay="0"/>
+                                  </p:stCondLst>
+                                  <p:childTnLst>
+                                    <p:set>
+                                      <p:cBhvr>
+                                        <p:cTn id="18" dur="1" fill="hold">
+                                          <p:stCondLst>
+                                            <p:cond delay="0"/>
+                                          </p:stCondLst>
+                                        </p:cTn>
+                                        <p:tgtEl>
+                                          <p:spTgt spid="3">
+                                            <p:txEl>
+                                              <p:pRg st="6" end="6"/>
+                                            </p:txEl>
+                                          </p:spTgt>
+                                        </p:tgtEl>
+                                        <p:attrNameLst>
+                                          <p:attrName>style.visibility</p:attrName>
+                                        </p:attrNameLst>
+                                      </p:cBhvr>
+                                      <p:to>
+                                        <p:strVal val="visible"/>
+                                      </p:to>
+                                    </p:set>
+                                  </p:childTnLst>
+                                </p:cTn>
+                              </p:par>
+                            </p:childTnLst>
+                          </p:cTn>
+                        </p:par>
+                      </p:childTnLst>
+                    </p:cTn>
+                  </p:par>
+                </p:childTnLst>
+              </p:cTn>
+              <p:prevCondLst>
+                <p:cond evt="onPrev" delay="0">
+                  <p:tgtEl>
+                    <p:sldTgt/>
+                  </p:tgtEl>
+                </p:cond>
+              </p:prevCondLst>
+              <p:nextCondLst>
+                <p:cond evt="onNext" delay="0">
+                  <p:tgtEl>
+                    <p:sldTgt/>
+                  </p:tgtEl>
+                </p:cond>
+              </p:nextCondLst>
+            </p:seq>
+          </p:childTnLst>
+        </p:cTn>
+      </p:par>
+    </p:tnLst>
+    <p:bldLst>
+      <p:bldP spid="3" grpId="0" build="p"/>
+    </p:bldLst>
+  </p:timing>
 </p:sld>
 </file>
 
@@ -6587,6 +7940,431 @@
   <p:clrMapOvr>
     <a:masterClrMapping/>
   </p:clrMapOvr>
+  <p:timing>
+    <p:tnLst>
+      <p:par>
+        <p:cTn id="1" dur="indefinite" restart="never" nodeType="tmRoot">
+          <p:childTnLst>
+            <p:seq concurrent="1" nextAc="seek">
+              <p:cTn id="2" dur="indefinite" nodeType="mainSeq">
+                <p:childTnLst>
+                  <p:par>
+                    <p:cTn id="3" fill="hold">
+                      <p:stCondLst>
+                        <p:cond delay="indefinite"/>
+                      </p:stCondLst>
+                      <p:childTnLst>
+                        <p:par>
+                          <p:cTn id="4" fill="hold">
+                            <p:stCondLst>
+                              <p:cond delay="0"/>
+                            </p:stCondLst>
+                            <p:childTnLst>
+                              <p:par>
+                                <p:cTn id="5" presetID="1" presetClass="entr" presetSubtype="0" fill="hold" grpId="0" nodeType="clickEffect">
+                                  <p:stCondLst>
+                                    <p:cond delay="0"/>
+                                  </p:stCondLst>
+                                  <p:childTnLst>
+                                    <p:set>
+                                      <p:cBhvr>
+                                        <p:cTn id="6" dur="1" fill="hold">
+                                          <p:stCondLst>
+                                            <p:cond delay="0"/>
+                                          </p:stCondLst>
+                                        </p:cTn>
+                                        <p:tgtEl>
+                                          <p:spTgt spid="3">
+                                            <p:txEl>
+                                              <p:pRg st="0" end="0"/>
+                                            </p:txEl>
+                                          </p:spTgt>
+                                        </p:tgtEl>
+                                        <p:attrNameLst>
+                                          <p:attrName>style.visibility</p:attrName>
+                                        </p:attrNameLst>
+                                      </p:cBhvr>
+                                      <p:to>
+                                        <p:strVal val="visible"/>
+                                      </p:to>
+                                    </p:set>
+                                  </p:childTnLst>
+                                </p:cTn>
+                              </p:par>
+                            </p:childTnLst>
+                          </p:cTn>
+                        </p:par>
+                      </p:childTnLst>
+                    </p:cTn>
+                  </p:par>
+                  <p:par>
+                    <p:cTn id="7" fill="hold">
+                      <p:stCondLst>
+                        <p:cond delay="indefinite"/>
+                      </p:stCondLst>
+                      <p:childTnLst>
+                        <p:par>
+                          <p:cTn id="8" fill="hold">
+                            <p:stCondLst>
+                              <p:cond delay="0"/>
+                            </p:stCondLst>
+                            <p:childTnLst>
+                              <p:par>
+                                <p:cTn id="9" presetID="1" presetClass="entr" presetSubtype="0" fill="hold" grpId="0" nodeType="clickEffect">
+                                  <p:stCondLst>
+                                    <p:cond delay="0"/>
+                                  </p:stCondLst>
+                                  <p:childTnLst>
+                                    <p:set>
+                                      <p:cBhvr>
+                                        <p:cTn id="10" dur="1" fill="hold">
+                                          <p:stCondLst>
+                                            <p:cond delay="0"/>
+                                          </p:stCondLst>
+                                        </p:cTn>
+                                        <p:tgtEl>
+                                          <p:spTgt spid="3">
+                                            <p:txEl>
+                                              <p:pRg st="1" end="1"/>
+                                            </p:txEl>
+                                          </p:spTgt>
+                                        </p:tgtEl>
+                                        <p:attrNameLst>
+                                          <p:attrName>style.visibility</p:attrName>
+                                        </p:attrNameLst>
+                                      </p:cBhvr>
+                                      <p:to>
+                                        <p:strVal val="visible"/>
+                                      </p:to>
+                                    </p:set>
+                                  </p:childTnLst>
+                                </p:cTn>
+                              </p:par>
+                            </p:childTnLst>
+                          </p:cTn>
+                        </p:par>
+                      </p:childTnLst>
+                    </p:cTn>
+                  </p:par>
+                  <p:par>
+                    <p:cTn id="11" fill="hold">
+                      <p:stCondLst>
+                        <p:cond delay="indefinite"/>
+                      </p:stCondLst>
+                      <p:childTnLst>
+                        <p:par>
+                          <p:cTn id="12" fill="hold">
+                            <p:stCondLst>
+                              <p:cond delay="0"/>
+                            </p:stCondLst>
+                            <p:childTnLst>
+                              <p:par>
+                                <p:cTn id="13" presetID="1" presetClass="entr" presetSubtype="0" fill="hold" grpId="0" nodeType="clickEffect">
+                                  <p:stCondLst>
+                                    <p:cond delay="0"/>
+                                  </p:stCondLst>
+                                  <p:childTnLst>
+                                    <p:set>
+                                      <p:cBhvr>
+                                        <p:cTn id="14" dur="1" fill="hold">
+                                          <p:stCondLst>
+                                            <p:cond delay="0"/>
+                                          </p:stCondLst>
+                                        </p:cTn>
+                                        <p:tgtEl>
+                                          <p:spTgt spid="3">
+                                            <p:txEl>
+                                              <p:pRg st="2" end="2"/>
+                                            </p:txEl>
+                                          </p:spTgt>
+                                        </p:tgtEl>
+                                        <p:attrNameLst>
+                                          <p:attrName>style.visibility</p:attrName>
+                                        </p:attrNameLst>
+                                      </p:cBhvr>
+                                      <p:to>
+                                        <p:strVal val="visible"/>
+                                      </p:to>
+                                    </p:set>
+                                  </p:childTnLst>
+                                </p:cTn>
+                              </p:par>
+                            </p:childTnLst>
+                          </p:cTn>
+                        </p:par>
+                      </p:childTnLst>
+                    </p:cTn>
+                  </p:par>
+                  <p:par>
+                    <p:cTn id="15" fill="hold">
+                      <p:stCondLst>
+                        <p:cond delay="indefinite"/>
+                      </p:stCondLst>
+                      <p:childTnLst>
+                        <p:par>
+                          <p:cTn id="16" fill="hold">
+                            <p:stCondLst>
+                              <p:cond delay="0"/>
+                            </p:stCondLst>
+                            <p:childTnLst>
+                              <p:par>
+                                <p:cTn id="17" presetID="1" presetClass="entr" presetSubtype="0" fill="hold" grpId="0" nodeType="clickEffect">
+                                  <p:stCondLst>
+                                    <p:cond delay="0"/>
+                                  </p:stCondLst>
+                                  <p:childTnLst>
+                                    <p:set>
+                                      <p:cBhvr>
+                                        <p:cTn id="18" dur="1" fill="hold">
+                                          <p:stCondLst>
+                                            <p:cond delay="0"/>
+                                          </p:stCondLst>
+                                        </p:cTn>
+                                        <p:tgtEl>
+                                          <p:spTgt spid="3">
+                                            <p:txEl>
+                                              <p:pRg st="3" end="3"/>
+                                            </p:txEl>
+                                          </p:spTgt>
+                                        </p:tgtEl>
+                                        <p:attrNameLst>
+                                          <p:attrName>style.visibility</p:attrName>
+                                        </p:attrNameLst>
+                                      </p:cBhvr>
+                                      <p:to>
+                                        <p:strVal val="visible"/>
+                                      </p:to>
+                                    </p:set>
+                                  </p:childTnLst>
+                                </p:cTn>
+                              </p:par>
+                            </p:childTnLst>
+                          </p:cTn>
+                        </p:par>
+                      </p:childTnLst>
+                    </p:cTn>
+                  </p:par>
+                  <p:par>
+                    <p:cTn id="19" fill="hold">
+                      <p:stCondLst>
+                        <p:cond delay="indefinite"/>
+                      </p:stCondLst>
+                      <p:childTnLst>
+                        <p:par>
+                          <p:cTn id="20" fill="hold">
+                            <p:stCondLst>
+                              <p:cond delay="0"/>
+                            </p:stCondLst>
+                            <p:childTnLst>
+                              <p:par>
+                                <p:cTn id="21" presetID="1" presetClass="entr" presetSubtype="0" fill="hold" grpId="0" nodeType="clickEffect">
+                                  <p:stCondLst>
+                                    <p:cond delay="0"/>
+                                  </p:stCondLst>
+                                  <p:childTnLst>
+                                    <p:set>
+                                      <p:cBhvr>
+                                        <p:cTn id="22" dur="1" fill="hold">
+                                          <p:stCondLst>
+                                            <p:cond delay="0"/>
+                                          </p:stCondLst>
+                                        </p:cTn>
+                                        <p:tgtEl>
+                                          <p:spTgt spid="3">
+                                            <p:txEl>
+                                              <p:pRg st="4" end="4"/>
+                                            </p:txEl>
+                                          </p:spTgt>
+                                        </p:tgtEl>
+                                        <p:attrNameLst>
+                                          <p:attrName>style.visibility</p:attrName>
+                                        </p:attrNameLst>
+                                      </p:cBhvr>
+                                      <p:to>
+                                        <p:strVal val="visible"/>
+                                      </p:to>
+                                    </p:set>
+                                  </p:childTnLst>
+                                </p:cTn>
+                              </p:par>
+                            </p:childTnLst>
+                          </p:cTn>
+                        </p:par>
+                      </p:childTnLst>
+                    </p:cTn>
+                  </p:par>
+                  <p:par>
+                    <p:cTn id="23" fill="hold">
+                      <p:stCondLst>
+                        <p:cond delay="indefinite"/>
+                      </p:stCondLst>
+                      <p:childTnLst>
+                        <p:par>
+                          <p:cTn id="24" fill="hold">
+                            <p:stCondLst>
+                              <p:cond delay="0"/>
+                            </p:stCondLst>
+                            <p:childTnLst>
+                              <p:par>
+                                <p:cTn id="25" presetID="1" presetClass="entr" presetSubtype="0" fill="hold" grpId="0" nodeType="clickEffect">
+                                  <p:stCondLst>
+                                    <p:cond delay="0"/>
+                                  </p:stCondLst>
+                                  <p:childTnLst>
+                                    <p:set>
+                                      <p:cBhvr>
+                                        <p:cTn id="26" dur="1" fill="hold">
+                                          <p:stCondLst>
+                                            <p:cond delay="0"/>
+                                          </p:stCondLst>
+                                        </p:cTn>
+                                        <p:tgtEl>
+                                          <p:spTgt spid="3">
+                                            <p:txEl>
+                                              <p:pRg st="5" end="5"/>
+                                            </p:txEl>
+                                          </p:spTgt>
+                                        </p:tgtEl>
+                                        <p:attrNameLst>
+                                          <p:attrName>style.visibility</p:attrName>
+                                        </p:attrNameLst>
+                                      </p:cBhvr>
+                                      <p:to>
+                                        <p:strVal val="visible"/>
+                                      </p:to>
+                                    </p:set>
+                                  </p:childTnLst>
+                                </p:cTn>
+                              </p:par>
+                            </p:childTnLst>
+                          </p:cTn>
+                        </p:par>
+                      </p:childTnLst>
+                    </p:cTn>
+                  </p:par>
+                  <p:par>
+                    <p:cTn id="27" fill="hold">
+                      <p:stCondLst>
+                        <p:cond delay="indefinite"/>
+                      </p:stCondLst>
+                      <p:childTnLst>
+                        <p:par>
+                          <p:cTn id="28" fill="hold">
+                            <p:stCondLst>
+                              <p:cond delay="0"/>
+                            </p:stCondLst>
+                            <p:childTnLst>
+                              <p:par>
+                                <p:cTn id="29" presetID="1" presetClass="entr" presetSubtype="0" fill="hold" grpId="0" nodeType="clickEffect">
+                                  <p:stCondLst>
+                                    <p:cond delay="0"/>
+                                  </p:stCondLst>
+                                  <p:childTnLst>
+                                    <p:set>
+                                      <p:cBhvr>
+                                        <p:cTn id="30" dur="1" fill="hold">
+                                          <p:stCondLst>
+                                            <p:cond delay="0"/>
+                                          </p:stCondLst>
+                                        </p:cTn>
+                                        <p:tgtEl>
+                                          <p:spTgt spid="3">
+                                            <p:txEl>
+                                              <p:pRg st="6" end="6"/>
+                                            </p:txEl>
+                                          </p:spTgt>
+                                        </p:tgtEl>
+                                        <p:attrNameLst>
+                                          <p:attrName>style.visibility</p:attrName>
+                                        </p:attrNameLst>
+                                      </p:cBhvr>
+                                      <p:to>
+                                        <p:strVal val="visible"/>
+                                      </p:to>
+                                    </p:set>
+                                  </p:childTnLst>
+                                </p:cTn>
+                              </p:par>
+                            </p:childTnLst>
+                          </p:cTn>
+                        </p:par>
+                      </p:childTnLst>
+                    </p:cTn>
+                  </p:par>
+                  <p:par>
+                    <p:cTn id="31" fill="hold">
+                      <p:stCondLst>
+                        <p:cond delay="indefinite"/>
+                      </p:stCondLst>
+                      <p:childTnLst>
+                        <p:par>
+                          <p:cTn id="32" fill="hold">
+                            <p:stCondLst>
+                              <p:cond delay="0"/>
+                            </p:stCondLst>
+                            <p:childTnLst>
+                              <p:par>
+                                <p:cTn id="33" presetID="1" presetClass="entr" presetSubtype="0" fill="hold" grpId="0" nodeType="clickEffect">
+                                  <p:stCondLst>
+                                    <p:cond delay="0"/>
+                                  </p:stCondLst>
+                                  <p:childTnLst>
+                                    <p:set>
+                                      <p:cBhvr>
+                                        <p:cTn id="34" dur="1" fill="hold">
+                                          <p:stCondLst>
+                                            <p:cond delay="0"/>
+                                          </p:stCondLst>
+                                        </p:cTn>
+                                        <p:tgtEl>
+                                          <p:spTgt spid="3">
+                                            <p:txEl>
+                                              <p:pRg st="7" end="7"/>
+                                            </p:txEl>
+                                          </p:spTgt>
+                                        </p:tgtEl>
+                                        <p:attrNameLst>
+                                          <p:attrName>style.visibility</p:attrName>
+                                        </p:attrNameLst>
+                                      </p:cBhvr>
+                                      <p:to>
+                                        <p:strVal val="visible"/>
+                                      </p:to>
+                                    </p:set>
+                                  </p:childTnLst>
+                                </p:cTn>
+                              </p:par>
+                            </p:childTnLst>
+                          </p:cTn>
+                        </p:par>
+                      </p:childTnLst>
+                    </p:cTn>
+                  </p:par>
+                </p:childTnLst>
+              </p:cTn>
+              <p:prevCondLst>
+                <p:cond evt="onPrev" delay="0">
+                  <p:tgtEl>
+                    <p:sldTgt/>
+                  </p:tgtEl>
+                </p:cond>
+              </p:prevCondLst>
+              <p:nextCondLst>
+                <p:cond evt="onNext" delay="0">
+                  <p:tgtEl>
+                    <p:sldTgt/>
+                  </p:tgtEl>
+                </p:cond>
+              </p:nextCondLst>
+            </p:seq>
+          </p:childTnLst>
+        </p:cTn>
+      </p:par>
+    </p:tnLst>
+    <p:bldLst>
+      <p:bldP spid="3" grpId="0" build="p"/>
+    </p:bldLst>
+  </p:timing>
 </p:sld>
 </file>
 
@@ -7798,6 +9576,183 @@
   <p:clrMapOvr>
     <a:masterClrMapping/>
   </p:clrMapOvr>
+  <p:timing>
+    <p:tnLst>
+      <p:par>
+        <p:cTn id="1" dur="indefinite" restart="never" nodeType="tmRoot">
+          <p:childTnLst>
+            <p:seq concurrent="1" nextAc="seek">
+              <p:cTn id="2" dur="indefinite" nodeType="mainSeq">
+                <p:childTnLst>
+                  <p:par>
+                    <p:cTn id="3" fill="hold">
+                      <p:stCondLst>
+                        <p:cond delay="indefinite"/>
+                      </p:stCondLst>
+                      <p:childTnLst>
+                        <p:par>
+                          <p:cTn id="4" fill="hold">
+                            <p:stCondLst>
+                              <p:cond delay="0"/>
+                            </p:stCondLst>
+                            <p:childTnLst>
+                              <p:par>
+                                <p:cTn id="5" presetID="1" presetClass="entr" presetSubtype="0" fill="hold" grpId="0" nodeType="clickEffect">
+                                  <p:stCondLst>
+                                    <p:cond delay="0"/>
+                                  </p:stCondLst>
+                                  <p:childTnLst>
+                                    <p:set>
+                                      <p:cBhvr>
+                                        <p:cTn id="6" dur="1" fill="hold">
+                                          <p:stCondLst>
+                                            <p:cond delay="0"/>
+                                          </p:stCondLst>
+                                        </p:cTn>
+                                        <p:tgtEl>
+                                          <p:spTgt spid="6"/>
+                                        </p:tgtEl>
+                                        <p:attrNameLst>
+                                          <p:attrName>style.visibility</p:attrName>
+                                        </p:attrNameLst>
+                                      </p:cBhvr>
+                                      <p:to>
+                                        <p:strVal val="visible"/>
+                                      </p:to>
+                                    </p:set>
+                                  </p:childTnLst>
+                                </p:cTn>
+                              </p:par>
+                            </p:childTnLst>
+                          </p:cTn>
+                        </p:par>
+                      </p:childTnLst>
+                    </p:cTn>
+                  </p:par>
+                  <p:par>
+                    <p:cTn id="7" fill="hold">
+                      <p:stCondLst>
+                        <p:cond delay="indefinite"/>
+                      </p:stCondLst>
+                      <p:childTnLst>
+                        <p:par>
+                          <p:cTn id="8" fill="hold">
+                            <p:stCondLst>
+                              <p:cond delay="0"/>
+                            </p:stCondLst>
+                            <p:childTnLst>
+                              <p:par>
+                                <p:cTn id="9" presetID="1" presetClass="entr" presetSubtype="0" fill="hold" grpId="0" nodeType="clickEffect">
+                                  <p:stCondLst>
+                                    <p:cond delay="0"/>
+                                  </p:stCondLst>
+                                  <p:childTnLst>
+                                    <p:set>
+                                      <p:cBhvr>
+                                        <p:cTn id="10" dur="1" fill="hold">
+                                          <p:stCondLst>
+                                            <p:cond delay="0"/>
+                                          </p:stCondLst>
+                                        </p:cTn>
+                                        <p:tgtEl>
+                                          <p:spTgt spid="3">
+                                            <p:txEl>
+                                              <p:pRg st="0" end="0"/>
+                                            </p:txEl>
+                                          </p:spTgt>
+                                        </p:tgtEl>
+                                        <p:attrNameLst>
+                                          <p:attrName>style.visibility</p:attrName>
+                                        </p:attrNameLst>
+                                      </p:cBhvr>
+                                      <p:to>
+                                        <p:strVal val="visible"/>
+                                      </p:to>
+                                    </p:set>
+                                  </p:childTnLst>
+                                </p:cTn>
+                              </p:par>
+                            </p:childTnLst>
+                          </p:cTn>
+                        </p:par>
+                      </p:childTnLst>
+                    </p:cTn>
+                  </p:par>
+                  <p:par>
+                    <p:cTn id="11" fill="hold">
+                      <p:stCondLst>
+                        <p:cond delay="indefinite"/>
+                      </p:stCondLst>
+                      <p:childTnLst>
+                        <p:par>
+                          <p:cTn id="12" fill="hold">
+                            <p:stCondLst>
+                              <p:cond delay="0"/>
+                            </p:stCondLst>
+                            <p:childTnLst>
+                              <p:par>
+                                <p:cTn id="13" presetID="1" presetClass="entr" presetSubtype="0" fill="hold" grpId="0" nodeType="clickEffect">
+                                  <p:stCondLst>
+                                    <p:cond delay="0"/>
+                                  </p:stCondLst>
+                                  <p:childTnLst>
+                                    <p:set>
+                                      <p:cBhvr>
+                                        <p:cTn id="14" dur="1" fill="hold">
+                                          <p:stCondLst>
+                                            <p:cond delay="0"/>
+                                          </p:stCondLst>
+                                        </p:cTn>
+                                        <p:tgtEl>
+                                          <p:spTgt spid="3">
+                                            <p:txEl>
+                                              <p:pRg st="1" end="1"/>
+                                            </p:txEl>
+                                          </p:spTgt>
+                                        </p:tgtEl>
+                                        <p:attrNameLst>
+                                          <p:attrName>style.visibility</p:attrName>
+                                        </p:attrNameLst>
+                                      </p:cBhvr>
+                                      <p:to>
+                                        <p:strVal val="visible"/>
+                                      </p:to>
+                                    </p:set>
+                                  </p:childTnLst>
+                                </p:cTn>
+                              </p:par>
+                            </p:childTnLst>
+                          </p:cTn>
+                        </p:par>
+                      </p:childTnLst>
+                    </p:cTn>
+                  </p:par>
+                </p:childTnLst>
+              </p:cTn>
+              <p:prevCondLst>
+                <p:cond evt="onPrev" delay="0">
+                  <p:tgtEl>
+                    <p:sldTgt/>
+                  </p:tgtEl>
+                </p:cond>
+              </p:prevCondLst>
+              <p:nextCondLst>
+                <p:cond evt="onNext" delay="0">
+                  <p:tgtEl>
+                    <p:sldTgt/>
+                  </p:tgtEl>
+                </p:cond>
+              </p:nextCondLst>
+            </p:seq>
+          </p:childTnLst>
+        </p:cTn>
+      </p:par>
+    </p:tnLst>
+    <p:bldLst>
+      <p:bldP spid="3" grpId="0" build="p"/>
+      <p:bldP spid="6" grpId="0"/>
+    </p:bldLst>
+  </p:timing>
 </p:sld>
 </file>
 
@@ -8431,6 +10386,348 @@
   <p:clrMapOvr>
     <a:masterClrMapping/>
   </p:clrMapOvr>
+  <p:timing>
+    <p:tnLst>
+      <p:par>
+        <p:cTn id="1" dur="indefinite" restart="never" nodeType="tmRoot">
+          <p:childTnLst>
+            <p:seq concurrent="1" nextAc="seek">
+              <p:cTn id="2" dur="indefinite" nodeType="mainSeq">
+                <p:childTnLst>
+                  <p:par>
+                    <p:cTn id="3" fill="hold">
+                      <p:stCondLst>
+                        <p:cond delay="indefinite"/>
+                      </p:stCondLst>
+                      <p:childTnLst>
+                        <p:par>
+                          <p:cTn id="4" fill="hold">
+                            <p:stCondLst>
+                              <p:cond delay="0"/>
+                            </p:stCondLst>
+                            <p:childTnLst>
+                              <p:par>
+                                <p:cTn id="5" presetID="1" presetClass="entr" presetSubtype="0" fill="hold" grpId="0" nodeType="clickEffect">
+                                  <p:stCondLst>
+                                    <p:cond delay="0"/>
+                                  </p:stCondLst>
+                                  <p:childTnLst>
+                                    <p:set>
+                                      <p:cBhvr>
+                                        <p:cTn id="6" dur="1" fill="hold">
+                                          <p:stCondLst>
+                                            <p:cond delay="0"/>
+                                          </p:stCondLst>
+                                        </p:cTn>
+                                        <p:tgtEl>
+                                          <p:spTgt spid="3">
+                                            <p:txEl>
+                                              <p:pRg st="0" end="0"/>
+                                            </p:txEl>
+                                          </p:spTgt>
+                                        </p:tgtEl>
+                                        <p:attrNameLst>
+                                          <p:attrName>style.visibility</p:attrName>
+                                        </p:attrNameLst>
+                                      </p:cBhvr>
+                                      <p:to>
+                                        <p:strVal val="visible"/>
+                                      </p:to>
+                                    </p:set>
+                                  </p:childTnLst>
+                                </p:cTn>
+                              </p:par>
+                            </p:childTnLst>
+                          </p:cTn>
+                        </p:par>
+                      </p:childTnLst>
+                    </p:cTn>
+                  </p:par>
+                  <p:par>
+                    <p:cTn id="7" fill="hold">
+                      <p:stCondLst>
+                        <p:cond delay="indefinite"/>
+                      </p:stCondLst>
+                      <p:childTnLst>
+                        <p:par>
+                          <p:cTn id="8" fill="hold">
+                            <p:stCondLst>
+                              <p:cond delay="0"/>
+                            </p:stCondLst>
+                            <p:childTnLst>
+                              <p:par>
+                                <p:cTn id="9" presetID="1" presetClass="entr" presetSubtype="0" fill="hold" grpId="0" nodeType="clickEffect">
+                                  <p:stCondLst>
+                                    <p:cond delay="0"/>
+                                  </p:stCondLst>
+                                  <p:childTnLst>
+                                    <p:set>
+                                      <p:cBhvr>
+                                        <p:cTn id="10" dur="1" fill="hold">
+                                          <p:stCondLst>
+                                            <p:cond delay="0"/>
+                                          </p:stCondLst>
+                                        </p:cTn>
+                                        <p:tgtEl>
+                                          <p:spTgt spid="6"/>
+                                        </p:tgtEl>
+                                        <p:attrNameLst>
+                                          <p:attrName>style.visibility</p:attrName>
+                                        </p:attrNameLst>
+                                      </p:cBhvr>
+                                      <p:to>
+                                        <p:strVal val="visible"/>
+                                      </p:to>
+                                    </p:set>
+                                  </p:childTnLst>
+                                </p:cTn>
+                              </p:par>
+                              <p:par>
+                                <p:cTn id="11" presetID="1" presetClass="entr" presetSubtype="0" fill="hold" grpId="0" nodeType="withEffect">
+                                  <p:stCondLst>
+                                    <p:cond delay="0"/>
+                                  </p:stCondLst>
+                                  <p:childTnLst>
+                                    <p:set>
+                                      <p:cBhvr>
+                                        <p:cTn id="12" dur="1" fill="hold">
+                                          <p:stCondLst>
+                                            <p:cond delay="0"/>
+                                          </p:stCondLst>
+                                        </p:cTn>
+                                        <p:tgtEl>
+                                          <p:spTgt spid="13"/>
+                                        </p:tgtEl>
+                                        <p:attrNameLst>
+                                          <p:attrName>style.visibility</p:attrName>
+                                        </p:attrNameLst>
+                                      </p:cBhvr>
+                                      <p:to>
+                                        <p:strVal val="visible"/>
+                                      </p:to>
+                                    </p:set>
+                                  </p:childTnLst>
+                                </p:cTn>
+                              </p:par>
+                              <p:par>
+                                <p:cTn id="13" presetID="1" presetClass="entr" presetSubtype="0" fill="hold" grpId="0" nodeType="withEffect">
+                                  <p:stCondLst>
+                                    <p:cond delay="0"/>
+                                  </p:stCondLst>
+                                  <p:childTnLst>
+                                    <p:set>
+                                      <p:cBhvr>
+                                        <p:cTn id="14" dur="1" fill="hold">
+                                          <p:stCondLst>
+                                            <p:cond delay="0"/>
+                                          </p:stCondLst>
+                                        </p:cTn>
+                                        <p:tgtEl>
+                                          <p:spTgt spid="14"/>
+                                        </p:tgtEl>
+                                        <p:attrNameLst>
+                                          <p:attrName>style.visibility</p:attrName>
+                                        </p:attrNameLst>
+                                      </p:cBhvr>
+                                      <p:to>
+                                        <p:strVal val="visible"/>
+                                      </p:to>
+                                    </p:set>
+                                  </p:childTnLst>
+                                </p:cTn>
+                              </p:par>
+                              <p:par>
+                                <p:cTn id="15" presetID="1" presetClass="entr" presetSubtype="0" fill="hold" grpId="0" nodeType="withEffect">
+                                  <p:stCondLst>
+                                    <p:cond delay="0"/>
+                                  </p:stCondLst>
+                                  <p:childTnLst>
+                                    <p:set>
+                                      <p:cBhvr>
+                                        <p:cTn id="16" dur="1" fill="hold">
+                                          <p:stCondLst>
+                                            <p:cond delay="0"/>
+                                          </p:stCondLst>
+                                        </p:cTn>
+                                        <p:tgtEl>
+                                          <p:spTgt spid="7"/>
+                                        </p:tgtEl>
+                                        <p:attrNameLst>
+                                          <p:attrName>style.visibility</p:attrName>
+                                        </p:attrNameLst>
+                                      </p:cBhvr>
+                                      <p:to>
+                                        <p:strVal val="visible"/>
+                                      </p:to>
+                                    </p:set>
+                                  </p:childTnLst>
+                                </p:cTn>
+                              </p:par>
+                            </p:childTnLst>
+                          </p:cTn>
+                        </p:par>
+                      </p:childTnLst>
+                    </p:cTn>
+                  </p:par>
+                  <p:par>
+                    <p:cTn id="17" fill="hold">
+                      <p:stCondLst>
+                        <p:cond delay="indefinite"/>
+                      </p:stCondLst>
+                      <p:childTnLst>
+                        <p:par>
+                          <p:cTn id="18" fill="hold">
+                            <p:stCondLst>
+                              <p:cond delay="0"/>
+                            </p:stCondLst>
+                            <p:childTnLst>
+                              <p:par>
+                                <p:cTn id="19" presetID="1" presetClass="entr" presetSubtype="0" fill="hold" grpId="0" nodeType="clickEffect">
+                                  <p:stCondLst>
+                                    <p:cond delay="0"/>
+                                  </p:stCondLst>
+                                  <p:childTnLst>
+                                    <p:set>
+                                      <p:cBhvr>
+                                        <p:cTn id="20" dur="1" fill="hold">
+                                          <p:stCondLst>
+                                            <p:cond delay="0"/>
+                                          </p:stCondLst>
+                                        </p:cTn>
+                                        <p:tgtEl>
+                                          <p:spTgt spid="19"/>
+                                        </p:tgtEl>
+                                        <p:attrNameLst>
+                                          <p:attrName>style.visibility</p:attrName>
+                                        </p:attrNameLst>
+                                      </p:cBhvr>
+                                      <p:to>
+                                        <p:strVal val="visible"/>
+                                      </p:to>
+                                    </p:set>
+                                  </p:childTnLst>
+                                </p:cTn>
+                              </p:par>
+                              <p:par>
+                                <p:cTn id="21" presetID="1" presetClass="entr" presetSubtype="0" fill="hold" grpId="0" nodeType="withEffect">
+                                  <p:stCondLst>
+                                    <p:cond delay="0"/>
+                                  </p:stCondLst>
+                                  <p:childTnLst>
+                                    <p:set>
+                                      <p:cBhvr>
+                                        <p:cTn id="22" dur="1" fill="hold">
+                                          <p:stCondLst>
+                                            <p:cond delay="0"/>
+                                          </p:stCondLst>
+                                        </p:cTn>
+                                        <p:tgtEl>
+                                          <p:spTgt spid="20"/>
+                                        </p:tgtEl>
+                                        <p:attrNameLst>
+                                          <p:attrName>style.visibility</p:attrName>
+                                        </p:attrNameLst>
+                                      </p:cBhvr>
+                                      <p:to>
+                                        <p:strVal val="visible"/>
+                                      </p:to>
+                                    </p:set>
+                                  </p:childTnLst>
+                                </p:cTn>
+                              </p:par>
+                              <p:par>
+                                <p:cTn id="23" presetID="1" presetClass="entr" presetSubtype="0" fill="hold" grpId="0" nodeType="withEffect">
+                                  <p:stCondLst>
+                                    <p:cond delay="0"/>
+                                  </p:stCondLst>
+                                  <p:childTnLst>
+                                    <p:set>
+                                      <p:cBhvr>
+                                        <p:cTn id="24" dur="1" fill="hold">
+                                          <p:stCondLst>
+                                            <p:cond delay="0"/>
+                                          </p:stCondLst>
+                                        </p:cTn>
+                                        <p:tgtEl>
+                                          <p:spTgt spid="21"/>
+                                        </p:tgtEl>
+                                        <p:attrNameLst>
+                                          <p:attrName>style.visibility</p:attrName>
+                                        </p:attrNameLst>
+                                      </p:cBhvr>
+                                      <p:to>
+                                        <p:strVal val="visible"/>
+                                      </p:to>
+                                    </p:set>
+                                  </p:childTnLst>
+                                </p:cTn>
+                              </p:par>
+                              <p:par>
+                                <p:cTn id="25" presetID="1" presetClass="entr" presetSubtype="0" fill="hold" grpId="0" nodeType="withEffect">
+                                  <p:stCondLst>
+                                    <p:cond delay="0"/>
+                                  </p:stCondLst>
+                                  <p:childTnLst>
+                                    <p:set>
+                                      <p:cBhvr>
+                                        <p:cTn id="26" dur="1" fill="hold">
+                                          <p:stCondLst>
+                                            <p:cond delay="0"/>
+                                          </p:stCondLst>
+                                        </p:cTn>
+                                        <p:tgtEl>
+                                          <p:spTgt spid="24"/>
+                                        </p:tgtEl>
+                                        <p:attrNameLst>
+                                          <p:attrName>style.visibility</p:attrName>
+                                        </p:attrNameLst>
+                                      </p:cBhvr>
+                                      <p:to>
+                                        <p:strVal val="visible"/>
+                                      </p:to>
+                                    </p:set>
+                                  </p:childTnLst>
+                                </p:cTn>
+                              </p:par>
+                            </p:childTnLst>
+                          </p:cTn>
+                        </p:par>
+                      </p:childTnLst>
+                    </p:cTn>
+                  </p:par>
+                </p:childTnLst>
+              </p:cTn>
+              <p:prevCondLst>
+                <p:cond evt="onPrev" delay="0">
+                  <p:tgtEl>
+                    <p:sldTgt/>
+                  </p:tgtEl>
+                </p:cond>
+              </p:prevCondLst>
+              <p:nextCondLst>
+                <p:cond evt="onNext" delay="0">
+                  <p:tgtEl>
+                    <p:sldTgt/>
+                  </p:tgtEl>
+                </p:cond>
+              </p:nextCondLst>
+            </p:seq>
+          </p:childTnLst>
+        </p:cTn>
+      </p:par>
+    </p:tnLst>
+    <p:bldLst>
+      <p:bldP spid="3" grpId="0" build="p"/>
+      <p:bldP spid="6" grpId="0"/>
+      <p:bldP spid="13" grpId="0"/>
+      <p:bldP spid="14" grpId="0"/>
+      <p:bldP spid="19" grpId="0"/>
+      <p:bldP spid="20" grpId="0"/>
+      <p:bldP spid="21" grpId="0"/>
+      <p:bldP spid="7" grpId="0"/>
+      <p:bldP spid="24" grpId="0"/>
+    </p:bldLst>
+  </p:timing>
 </p:sld>
 </file>
 
@@ -8871,6 +11168,275 @@
   <p:clrMapOvr>
     <a:masterClrMapping/>
   </p:clrMapOvr>
+  <p:timing>
+    <p:tnLst>
+      <p:par>
+        <p:cTn id="1" dur="indefinite" restart="never" nodeType="tmRoot">
+          <p:childTnLst>
+            <p:seq concurrent="1" nextAc="seek">
+              <p:cTn id="2" dur="indefinite" nodeType="mainSeq">
+                <p:childTnLst>
+                  <p:par>
+                    <p:cTn id="3" fill="hold">
+                      <p:stCondLst>
+                        <p:cond delay="indefinite"/>
+                      </p:stCondLst>
+                      <p:childTnLst>
+                        <p:par>
+                          <p:cTn id="4" fill="hold">
+                            <p:stCondLst>
+                              <p:cond delay="0"/>
+                            </p:stCondLst>
+                            <p:childTnLst>
+                              <p:par>
+                                <p:cTn id="5" presetID="1" presetClass="entr" presetSubtype="0" fill="hold" grpId="0" nodeType="clickEffect">
+                                  <p:stCondLst>
+                                    <p:cond delay="0"/>
+                                  </p:stCondLst>
+                                  <p:childTnLst>
+                                    <p:set>
+                                      <p:cBhvr>
+                                        <p:cTn id="6" dur="1" fill="hold">
+                                          <p:stCondLst>
+                                            <p:cond delay="0"/>
+                                          </p:stCondLst>
+                                        </p:cTn>
+                                        <p:tgtEl>
+                                          <p:spTgt spid="3">
+                                            <p:txEl>
+                                              <p:pRg st="0" end="0"/>
+                                            </p:txEl>
+                                          </p:spTgt>
+                                        </p:tgtEl>
+                                        <p:attrNameLst>
+                                          <p:attrName>style.visibility</p:attrName>
+                                        </p:attrNameLst>
+                                      </p:cBhvr>
+                                      <p:to>
+                                        <p:strVal val="visible"/>
+                                      </p:to>
+                                    </p:set>
+                                  </p:childTnLst>
+                                </p:cTn>
+                              </p:par>
+                            </p:childTnLst>
+                          </p:cTn>
+                        </p:par>
+                      </p:childTnLst>
+                    </p:cTn>
+                  </p:par>
+                  <p:par>
+                    <p:cTn id="7" fill="hold">
+                      <p:stCondLst>
+                        <p:cond delay="indefinite"/>
+                      </p:stCondLst>
+                      <p:childTnLst>
+                        <p:par>
+                          <p:cTn id="8" fill="hold">
+                            <p:stCondLst>
+                              <p:cond delay="0"/>
+                            </p:stCondLst>
+                            <p:childTnLst>
+                              <p:par>
+                                <p:cTn id="9" presetID="1" presetClass="entr" presetSubtype="0" fill="hold" grpId="0" nodeType="clickEffect">
+                                  <p:stCondLst>
+                                    <p:cond delay="0"/>
+                                  </p:stCondLst>
+                                  <p:childTnLst>
+                                    <p:set>
+                                      <p:cBhvr>
+                                        <p:cTn id="10" dur="1" fill="hold">
+                                          <p:stCondLst>
+                                            <p:cond delay="0"/>
+                                          </p:stCondLst>
+                                        </p:cTn>
+                                        <p:tgtEl>
+                                          <p:spTgt spid="3">
+                                            <p:txEl>
+                                              <p:pRg st="1" end="1"/>
+                                            </p:txEl>
+                                          </p:spTgt>
+                                        </p:tgtEl>
+                                        <p:attrNameLst>
+                                          <p:attrName>style.visibility</p:attrName>
+                                        </p:attrNameLst>
+                                      </p:cBhvr>
+                                      <p:to>
+                                        <p:strVal val="visible"/>
+                                      </p:to>
+                                    </p:set>
+                                  </p:childTnLst>
+                                </p:cTn>
+                              </p:par>
+                            </p:childTnLst>
+                          </p:cTn>
+                        </p:par>
+                      </p:childTnLst>
+                    </p:cTn>
+                  </p:par>
+                  <p:par>
+                    <p:cTn id="11" fill="hold">
+                      <p:stCondLst>
+                        <p:cond delay="indefinite"/>
+                      </p:stCondLst>
+                      <p:childTnLst>
+                        <p:par>
+                          <p:cTn id="12" fill="hold">
+                            <p:stCondLst>
+                              <p:cond delay="0"/>
+                            </p:stCondLst>
+                            <p:childTnLst>
+                              <p:par>
+                                <p:cTn id="13" presetID="1" presetClass="entr" presetSubtype="0" fill="hold" grpId="0" nodeType="clickEffect">
+                                  <p:stCondLst>
+                                    <p:cond delay="0"/>
+                                  </p:stCondLst>
+                                  <p:childTnLst>
+                                    <p:set>
+                                      <p:cBhvr>
+                                        <p:cTn id="14" dur="1" fill="hold">
+                                          <p:stCondLst>
+                                            <p:cond delay="0"/>
+                                          </p:stCondLst>
+                                        </p:cTn>
+                                        <p:tgtEl>
+                                          <p:spTgt spid="4"/>
+                                        </p:tgtEl>
+                                        <p:attrNameLst>
+                                          <p:attrName>style.visibility</p:attrName>
+                                        </p:attrNameLst>
+                                      </p:cBhvr>
+                                      <p:to>
+                                        <p:strVal val="visible"/>
+                                      </p:to>
+                                    </p:set>
+                                  </p:childTnLst>
+                                </p:cTn>
+                              </p:par>
+                            </p:childTnLst>
+                          </p:cTn>
+                        </p:par>
+                      </p:childTnLst>
+                    </p:cTn>
+                  </p:par>
+                  <p:par>
+                    <p:cTn id="15" fill="hold">
+                      <p:stCondLst>
+                        <p:cond delay="indefinite"/>
+                      </p:stCondLst>
+                      <p:childTnLst>
+                        <p:par>
+                          <p:cTn id="16" fill="hold">
+                            <p:stCondLst>
+                              <p:cond delay="0"/>
+                            </p:stCondLst>
+                            <p:childTnLst>
+                              <p:par>
+                                <p:cTn id="17" presetID="1" presetClass="entr" presetSubtype="0" fill="hold" grpId="0" nodeType="clickEffect">
+                                  <p:stCondLst>
+                                    <p:cond delay="0"/>
+                                  </p:stCondLst>
+                                  <p:childTnLst>
+                                    <p:set>
+                                      <p:cBhvr>
+                                        <p:cTn id="18" dur="1" fill="hold">
+                                          <p:stCondLst>
+                                            <p:cond delay="0"/>
+                                          </p:stCondLst>
+                                        </p:cTn>
+                                        <p:tgtEl>
+                                          <p:spTgt spid="7"/>
+                                        </p:tgtEl>
+                                        <p:attrNameLst>
+                                          <p:attrName>style.visibility</p:attrName>
+                                        </p:attrNameLst>
+                                      </p:cBhvr>
+                                      <p:to>
+                                        <p:strVal val="visible"/>
+                                      </p:to>
+                                    </p:set>
+                                  </p:childTnLst>
+                                </p:cTn>
+                              </p:par>
+                            </p:childTnLst>
+                          </p:cTn>
+                        </p:par>
+                      </p:childTnLst>
+                    </p:cTn>
+                  </p:par>
+                  <p:par>
+                    <p:cTn id="19" fill="hold">
+                      <p:stCondLst>
+                        <p:cond delay="indefinite"/>
+                      </p:stCondLst>
+                      <p:childTnLst>
+                        <p:par>
+                          <p:cTn id="20" fill="hold">
+                            <p:stCondLst>
+                              <p:cond delay="0"/>
+                            </p:stCondLst>
+                            <p:childTnLst>
+                              <p:par>
+                                <p:cTn id="21" presetID="1" presetClass="entr" presetSubtype="0" fill="hold" grpId="0" nodeType="clickEffect">
+                                  <p:stCondLst>
+                                    <p:cond delay="0"/>
+                                  </p:stCondLst>
+                                  <p:childTnLst>
+                                    <p:set>
+                                      <p:cBhvr>
+                                        <p:cTn id="22" dur="1" fill="hold">
+                                          <p:stCondLst>
+                                            <p:cond delay="0"/>
+                                          </p:stCondLst>
+                                        </p:cTn>
+                                        <p:tgtEl>
+                                          <p:spTgt spid="5"/>
+                                        </p:tgtEl>
+                                        <p:attrNameLst>
+                                          <p:attrName>style.visibility</p:attrName>
+                                        </p:attrNameLst>
+                                      </p:cBhvr>
+                                      <p:to>
+                                        <p:strVal val="visible"/>
+                                      </p:to>
+                                    </p:set>
+                                  </p:childTnLst>
+                                </p:cTn>
+                              </p:par>
+                            </p:childTnLst>
+                          </p:cTn>
+                        </p:par>
+                      </p:childTnLst>
+                    </p:cTn>
+                  </p:par>
+                </p:childTnLst>
+              </p:cTn>
+              <p:prevCondLst>
+                <p:cond evt="onPrev" delay="0">
+                  <p:tgtEl>
+                    <p:sldTgt/>
+                  </p:tgtEl>
+                </p:cond>
+              </p:prevCondLst>
+              <p:nextCondLst>
+                <p:cond evt="onNext" delay="0">
+                  <p:tgtEl>
+                    <p:sldTgt/>
+                  </p:tgtEl>
+                </p:cond>
+              </p:nextCondLst>
+            </p:seq>
+          </p:childTnLst>
+        </p:cTn>
+      </p:par>
+    </p:tnLst>
+    <p:bldLst>
+      <p:bldP spid="3" grpId="0" build="p"/>
+      <p:bldP spid="4" grpId="0"/>
+      <p:bldP spid="7" grpId="0"/>
+      <p:bldP spid="5" grpId="0"/>
+    </p:bldLst>
+  </p:timing>
 </p:sld>
 </file>
 
@@ -9748,6 +12314,240 @@
   <p:clrMapOvr>
     <a:masterClrMapping/>
   </p:clrMapOvr>
+  <p:timing>
+    <p:tnLst>
+      <p:par>
+        <p:cTn id="1" dur="indefinite" restart="never" nodeType="tmRoot">
+          <p:childTnLst>
+            <p:seq concurrent="1" nextAc="seek">
+              <p:cTn id="2" dur="indefinite" nodeType="mainSeq">
+                <p:childTnLst>
+                  <p:par>
+                    <p:cTn id="3" fill="hold">
+                      <p:stCondLst>
+                        <p:cond delay="indefinite"/>
+                      </p:stCondLst>
+                      <p:childTnLst>
+                        <p:par>
+                          <p:cTn id="4" fill="hold">
+                            <p:stCondLst>
+                              <p:cond delay="0"/>
+                            </p:stCondLst>
+                            <p:childTnLst>
+                              <p:par>
+                                <p:cTn id="5" presetID="1" presetClass="entr" presetSubtype="0" fill="hold" nodeType="clickEffect">
+                                  <p:stCondLst>
+                                    <p:cond delay="0"/>
+                                  </p:stCondLst>
+                                  <p:childTnLst>
+                                    <p:set>
+                                      <p:cBhvr>
+                                        <p:cTn id="6" dur="1" fill="hold">
+                                          <p:stCondLst>
+                                            <p:cond delay="0"/>
+                                          </p:stCondLst>
+                                        </p:cTn>
+                                        <p:tgtEl>
+                                          <p:spTgt spid="3">
+                                            <p:txEl>
+                                              <p:pRg st="0" end="0"/>
+                                            </p:txEl>
+                                          </p:spTgt>
+                                        </p:tgtEl>
+                                        <p:attrNameLst>
+                                          <p:attrName>style.visibility</p:attrName>
+                                        </p:attrNameLst>
+                                      </p:cBhvr>
+                                      <p:to>
+                                        <p:strVal val="visible"/>
+                                      </p:to>
+                                    </p:set>
+                                  </p:childTnLst>
+                                </p:cTn>
+                              </p:par>
+                              <p:par>
+                                <p:cTn id="7" presetID="1" presetClass="entr" presetSubtype="0" fill="hold" nodeType="withEffect">
+                                  <p:stCondLst>
+                                    <p:cond delay="0"/>
+                                  </p:stCondLst>
+                                  <p:childTnLst>
+                                    <p:set>
+                                      <p:cBhvr>
+                                        <p:cTn id="8" dur="1" fill="hold">
+                                          <p:stCondLst>
+                                            <p:cond delay="0"/>
+                                          </p:stCondLst>
+                                        </p:cTn>
+                                        <p:tgtEl>
+                                          <p:spTgt spid="3">
+                                            <p:txEl>
+                                              <p:pRg st="1" end="1"/>
+                                            </p:txEl>
+                                          </p:spTgt>
+                                        </p:tgtEl>
+                                        <p:attrNameLst>
+                                          <p:attrName>style.visibility</p:attrName>
+                                        </p:attrNameLst>
+                                      </p:cBhvr>
+                                      <p:to>
+                                        <p:strVal val="visible"/>
+                                      </p:to>
+                                    </p:set>
+                                  </p:childTnLst>
+                                </p:cTn>
+                              </p:par>
+                              <p:par>
+                                <p:cTn id="9" presetID="1" presetClass="entr" presetSubtype="0" fill="hold" nodeType="withEffect">
+                                  <p:stCondLst>
+                                    <p:cond delay="0"/>
+                                  </p:stCondLst>
+                                  <p:childTnLst>
+                                    <p:set>
+                                      <p:cBhvr>
+                                        <p:cTn id="10" dur="1" fill="hold">
+                                          <p:stCondLst>
+                                            <p:cond delay="0"/>
+                                          </p:stCondLst>
+                                        </p:cTn>
+                                        <p:tgtEl>
+                                          <p:spTgt spid="3">
+                                            <p:txEl>
+                                              <p:pRg st="2" end="2"/>
+                                            </p:txEl>
+                                          </p:spTgt>
+                                        </p:tgtEl>
+                                        <p:attrNameLst>
+                                          <p:attrName>style.visibility</p:attrName>
+                                        </p:attrNameLst>
+                                      </p:cBhvr>
+                                      <p:to>
+                                        <p:strVal val="visible"/>
+                                      </p:to>
+                                    </p:set>
+                                  </p:childTnLst>
+                                </p:cTn>
+                              </p:par>
+                              <p:par>
+                                <p:cTn id="11" presetID="1" presetClass="entr" presetSubtype="0" fill="hold" nodeType="withEffect">
+                                  <p:stCondLst>
+                                    <p:cond delay="0"/>
+                                  </p:stCondLst>
+                                  <p:childTnLst>
+                                    <p:set>
+                                      <p:cBhvr>
+                                        <p:cTn id="12" dur="1" fill="hold">
+                                          <p:stCondLst>
+                                            <p:cond delay="0"/>
+                                          </p:stCondLst>
+                                        </p:cTn>
+                                        <p:tgtEl>
+                                          <p:spTgt spid="3">
+                                            <p:txEl>
+                                              <p:pRg st="3" end="3"/>
+                                            </p:txEl>
+                                          </p:spTgt>
+                                        </p:tgtEl>
+                                        <p:attrNameLst>
+                                          <p:attrName>style.visibility</p:attrName>
+                                        </p:attrNameLst>
+                                      </p:cBhvr>
+                                      <p:to>
+                                        <p:strVal val="visible"/>
+                                      </p:to>
+                                    </p:set>
+                                  </p:childTnLst>
+                                </p:cTn>
+                              </p:par>
+                              <p:par>
+                                <p:cTn id="13" presetID="1" presetClass="entr" presetSubtype="0" fill="hold" nodeType="withEffect">
+                                  <p:stCondLst>
+                                    <p:cond delay="0"/>
+                                  </p:stCondLst>
+                                  <p:childTnLst>
+                                    <p:set>
+                                      <p:cBhvr>
+                                        <p:cTn id="14" dur="1" fill="hold">
+                                          <p:stCondLst>
+                                            <p:cond delay="0"/>
+                                          </p:stCondLst>
+                                        </p:cTn>
+                                        <p:tgtEl>
+                                          <p:spTgt spid="3">
+                                            <p:txEl>
+                                              <p:pRg st="4" end="4"/>
+                                            </p:txEl>
+                                          </p:spTgt>
+                                        </p:tgtEl>
+                                        <p:attrNameLst>
+                                          <p:attrName>style.visibility</p:attrName>
+                                        </p:attrNameLst>
+                                      </p:cBhvr>
+                                      <p:to>
+                                        <p:strVal val="visible"/>
+                                      </p:to>
+                                    </p:set>
+                                  </p:childTnLst>
+                                </p:cTn>
+                              </p:par>
+                              <p:par>
+                                <p:cTn id="15" presetID="1" presetClass="entr" presetSubtype="0" fill="hold" nodeType="withEffect">
+                                  <p:stCondLst>
+                                    <p:cond delay="0"/>
+                                  </p:stCondLst>
+                                  <p:childTnLst>
+                                    <p:set>
+                                      <p:cBhvr>
+                                        <p:cTn id="16" dur="1" fill="hold">
+                                          <p:stCondLst>
+                                            <p:cond delay="0"/>
+                                          </p:stCondLst>
+                                        </p:cTn>
+                                        <p:tgtEl>
+                                          <p:spTgt spid="3">
+                                            <p:txEl>
+                                              <p:pRg st="5" end="5"/>
+                                            </p:txEl>
+                                          </p:spTgt>
+                                        </p:tgtEl>
+                                        <p:attrNameLst>
+                                          <p:attrName>style.visibility</p:attrName>
+                                        </p:attrNameLst>
+                                      </p:cBhvr>
+                                      <p:to>
+                                        <p:strVal val="visible"/>
+                                      </p:to>
+                                    </p:set>
+                                  </p:childTnLst>
+                                </p:cTn>
+                              </p:par>
+                            </p:childTnLst>
+                          </p:cTn>
+                        </p:par>
+                      </p:childTnLst>
+                    </p:cTn>
+                  </p:par>
+                </p:childTnLst>
+              </p:cTn>
+              <p:prevCondLst>
+                <p:cond evt="onPrev" delay="0">
+                  <p:tgtEl>
+                    <p:sldTgt/>
+                  </p:tgtEl>
+                </p:cond>
+              </p:prevCondLst>
+              <p:nextCondLst>
+                <p:cond evt="onNext" delay="0">
+                  <p:tgtEl>
+                    <p:sldTgt/>
+                  </p:tgtEl>
+                </p:cond>
+              </p:nextCondLst>
+            </p:seq>
+          </p:childTnLst>
+        </p:cTn>
+      </p:par>
+    </p:tnLst>
+  </p:timing>
 </p:sld>
 </file>
 
@@ -10472,6 +13272,326 @@
   <p:clrMapOvr>
     <a:masterClrMapping/>
   </p:clrMapOvr>
+  <p:timing>
+    <p:tnLst>
+      <p:par>
+        <p:cTn id="1" dur="indefinite" restart="never" nodeType="tmRoot">
+          <p:childTnLst>
+            <p:seq concurrent="1" nextAc="seek">
+              <p:cTn id="2" dur="indefinite" nodeType="mainSeq">
+                <p:childTnLst>
+                  <p:par>
+                    <p:cTn id="3" fill="hold">
+                      <p:stCondLst>
+                        <p:cond delay="indefinite"/>
+                      </p:stCondLst>
+                      <p:childTnLst>
+                        <p:par>
+                          <p:cTn id="4" fill="hold">
+                            <p:stCondLst>
+                              <p:cond delay="0"/>
+                            </p:stCondLst>
+                            <p:childTnLst>
+                              <p:par>
+                                <p:cTn id="5" presetID="1" presetClass="entr" presetSubtype="0" fill="hold" grpId="0" nodeType="clickEffect">
+                                  <p:stCondLst>
+                                    <p:cond delay="0"/>
+                                  </p:stCondLst>
+                                  <p:childTnLst>
+                                    <p:set>
+                                      <p:cBhvr>
+                                        <p:cTn id="6" dur="1" fill="hold">
+                                          <p:stCondLst>
+                                            <p:cond delay="0"/>
+                                          </p:stCondLst>
+                                        </p:cTn>
+                                        <p:tgtEl>
+                                          <p:spTgt spid="5"/>
+                                        </p:tgtEl>
+                                        <p:attrNameLst>
+                                          <p:attrName>style.visibility</p:attrName>
+                                        </p:attrNameLst>
+                                      </p:cBhvr>
+                                      <p:to>
+                                        <p:strVal val="visible"/>
+                                      </p:to>
+                                    </p:set>
+                                  </p:childTnLst>
+                                </p:cTn>
+                              </p:par>
+                            </p:childTnLst>
+                          </p:cTn>
+                        </p:par>
+                      </p:childTnLst>
+                    </p:cTn>
+                  </p:par>
+                  <p:par>
+                    <p:cTn id="7" fill="hold">
+                      <p:stCondLst>
+                        <p:cond delay="indefinite"/>
+                      </p:stCondLst>
+                      <p:childTnLst>
+                        <p:par>
+                          <p:cTn id="8" fill="hold">
+                            <p:stCondLst>
+                              <p:cond delay="0"/>
+                            </p:stCondLst>
+                            <p:childTnLst>
+                              <p:par>
+                                <p:cTn id="9" presetID="1" presetClass="entr" presetSubtype="0" fill="hold" grpId="0" nodeType="clickEffect">
+                                  <p:stCondLst>
+                                    <p:cond delay="0"/>
+                                  </p:stCondLst>
+                                  <p:childTnLst>
+                                    <p:set>
+                                      <p:cBhvr>
+                                        <p:cTn id="10" dur="1" fill="hold">
+                                          <p:stCondLst>
+                                            <p:cond delay="0"/>
+                                          </p:stCondLst>
+                                        </p:cTn>
+                                        <p:tgtEl>
+                                          <p:spTgt spid="7"/>
+                                        </p:tgtEl>
+                                        <p:attrNameLst>
+                                          <p:attrName>style.visibility</p:attrName>
+                                        </p:attrNameLst>
+                                      </p:cBhvr>
+                                      <p:to>
+                                        <p:strVal val="visible"/>
+                                      </p:to>
+                                    </p:set>
+                                  </p:childTnLst>
+                                </p:cTn>
+                              </p:par>
+                              <p:par>
+                                <p:cTn id="11" presetID="1" presetClass="entr" presetSubtype="0" fill="hold" grpId="0" nodeType="withEffect">
+                                  <p:stCondLst>
+                                    <p:cond delay="0"/>
+                                  </p:stCondLst>
+                                  <p:childTnLst>
+                                    <p:set>
+                                      <p:cBhvr>
+                                        <p:cTn id="12" dur="1" fill="hold">
+                                          <p:stCondLst>
+                                            <p:cond delay="0"/>
+                                          </p:stCondLst>
+                                        </p:cTn>
+                                        <p:tgtEl>
+                                          <p:spTgt spid="9"/>
+                                        </p:tgtEl>
+                                        <p:attrNameLst>
+                                          <p:attrName>style.visibility</p:attrName>
+                                        </p:attrNameLst>
+                                      </p:cBhvr>
+                                      <p:to>
+                                        <p:strVal val="visible"/>
+                                      </p:to>
+                                    </p:set>
+                                  </p:childTnLst>
+                                </p:cTn>
+                              </p:par>
+                              <p:par>
+                                <p:cTn id="13" presetID="1" presetClass="entr" presetSubtype="0" fill="hold" grpId="0" nodeType="withEffect">
+                                  <p:stCondLst>
+                                    <p:cond delay="0"/>
+                                  </p:stCondLst>
+                                  <p:childTnLst>
+                                    <p:set>
+                                      <p:cBhvr>
+                                        <p:cTn id="14" dur="1" fill="hold">
+                                          <p:stCondLst>
+                                            <p:cond delay="0"/>
+                                          </p:stCondLst>
+                                        </p:cTn>
+                                        <p:tgtEl>
+                                          <p:spTgt spid="11"/>
+                                        </p:tgtEl>
+                                        <p:attrNameLst>
+                                          <p:attrName>style.visibility</p:attrName>
+                                        </p:attrNameLst>
+                                      </p:cBhvr>
+                                      <p:to>
+                                        <p:strVal val="visible"/>
+                                      </p:to>
+                                    </p:set>
+                                  </p:childTnLst>
+                                </p:cTn>
+                              </p:par>
+                              <p:par>
+                                <p:cTn id="15" presetID="1" presetClass="entr" presetSubtype="0" fill="hold" grpId="0" nodeType="withEffect">
+                                  <p:stCondLst>
+                                    <p:cond delay="0"/>
+                                  </p:stCondLst>
+                                  <p:childTnLst>
+                                    <p:set>
+                                      <p:cBhvr>
+                                        <p:cTn id="16" dur="1" fill="hold">
+                                          <p:stCondLst>
+                                            <p:cond delay="0"/>
+                                          </p:stCondLst>
+                                        </p:cTn>
+                                        <p:tgtEl>
+                                          <p:spTgt spid="12"/>
+                                        </p:tgtEl>
+                                        <p:attrNameLst>
+                                          <p:attrName>style.visibility</p:attrName>
+                                        </p:attrNameLst>
+                                      </p:cBhvr>
+                                      <p:to>
+                                        <p:strVal val="visible"/>
+                                      </p:to>
+                                    </p:set>
+                                  </p:childTnLst>
+                                </p:cTn>
+                              </p:par>
+                              <p:par>
+                                <p:cTn id="17" presetID="1" presetClass="entr" presetSubtype="0" fill="hold" grpId="0" nodeType="withEffect">
+                                  <p:stCondLst>
+                                    <p:cond delay="0"/>
+                                  </p:stCondLst>
+                                  <p:childTnLst>
+                                    <p:set>
+                                      <p:cBhvr>
+                                        <p:cTn id="18" dur="1" fill="hold">
+                                          <p:stCondLst>
+                                            <p:cond delay="0"/>
+                                          </p:stCondLst>
+                                        </p:cTn>
+                                        <p:tgtEl>
+                                          <p:spTgt spid="14"/>
+                                        </p:tgtEl>
+                                        <p:attrNameLst>
+                                          <p:attrName>style.visibility</p:attrName>
+                                        </p:attrNameLst>
+                                      </p:cBhvr>
+                                      <p:to>
+                                        <p:strVal val="visible"/>
+                                      </p:to>
+                                    </p:set>
+                                  </p:childTnLst>
+                                </p:cTn>
+                              </p:par>
+                              <p:par>
+                                <p:cTn id="19" presetID="1" presetClass="entr" presetSubtype="0" fill="hold" grpId="0" nodeType="withEffect">
+                                  <p:stCondLst>
+                                    <p:cond delay="0"/>
+                                  </p:stCondLst>
+                                  <p:childTnLst>
+                                    <p:set>
+                                      <p:cBhvr>
+                                        <p:cTn id="20" dur="1" fill="hold">
+                                          <p:stCondLst>
+                                            <p:cond delay="0"/>
+                                          </p:stCondLst>
+                                        </p:cTn>
+                                        <p:tgtEl>
+                                          <p:spTgt spid="15"/>
+                                        </p:tgtEl>
+                                        <p:attrNameLst>
+                                          <p:attrName>style.visibility</p:attrName>
+                                        </p:attrNameLst>
+                                      </p:cBhvr>
+                                      <p:to>
+                                        <p:strVal val="visible"/>
+                                      </p:to>
+                                    </p:set>
+                                  </p:childTnLst>
+                                </p:cTn>
+                              </p:par>
+                              <p:par>
+                                <p:cTn id="21" presetID="1" presetClass="entr" presetSubtype="0" fill="hold" grpId="0" nodeType="withEffect">
+                                  <p:stCondLst>
+                                    <p:cond delay="0"/>
+                                  </p:stCondLst>
+                                  <p:childTnLst>
+                                    <p:set>
+                                      <p:cBhvr>
+                                        <p:cTn id="22" dur="1" fill="hold">
+                                          <p:stCondLst>
+                                            <p:cond delay="0"/>
+                                          </p:stCondLst>
+                                        </p:cTn>
+                                        <p:tgtEl>
+                                          <p:spTgt spid="17"/>
+                                        </p:tgtEl>
+                                        <p:attrNameLst>
+                                          <p:attrName>style.visibility</p:attrName>
+                                        </p:attrNameLst>
+                                      </p:cBhvr>
+                                      <p:to>
+                                        <p:strVal val="visible"/>
+                                      </p:to>
+                                    </p:set>
+                                  </p:childTnLst>
+                                </p:cTn>
+                              </p:par>
+                              <p:par>
+                                <p:cTn id="23" presetID="1" presetClass="entr" presetSubtype="0" fill="hold" grpId="0" nodeType="withEffect">
+                                  <p:stCondLst>
+                                    <p:cond delay="0"/>
+                                  </p:stCondLst>
+                                  <p:childTnLst>
+                                    <p:set>
+                                      <p:cBhvr>
+                                        <p:cTn id="24" dur="1" fill="hold">
+                                          <p:stCondLst>
+                                            <p:cond delay="0"/>
+                                          </p:stCondLst>
+                                        </p:cTn>
+                                        <p:tgtEl>
+                                          <p:spTgt spid="18"/>
+                                        </p:tgtEl>
+                                        <p:attrNameLst>
+                                          <p:attrName>style.visibility</p:attrName>
+                                        </p:attrNameLst>
+                                      </p:cBhvr>
+                                      <p:to>
+                                        <p:strVal val="visible"/>
+                                      </p:to>
+                                    </p:set>
+                                  </p:childTnLst>
+                                </p:cTn>
+                              </p:par>
+                            </p:childTnLst>
+                          </p:cTn>
+                        </p:par>
+                      </p:childTnLst>
+                    </p:cTn>
+                  </p:par>
+                </p:childTnLst>
+              </p:cTn>
+              <p:prevCondLst>
+                <p:cond evt="onPrev" delay="0">
+                  <p:tgtEl>
+                    <p:sldTgt/>
+                  </p:tgtEl>
+                </p:cond>
+              </p:prevCondLst>
+              <p:nextCondLst>
+                <p:cond evt="onNext" delay="0">
+                  <p:tgtEl>
+                    <p:sldTgt/>
+                  </p:tgtEl>
+                </p:cond>
+              </p:nextCondLst>
+            </p:seq>
+          </p:childTnLst>
+        </p:cTn>
+      </p:par>
+    </p:tnLst>
+    <p:bldLst>
+      <p:bldP spid="7" grpId="0"/>
+      <p:bldP spid="9" grpId="0"/>
+      <p:bldP spid="11" grpId="0"/>
+      <p:bldP spid="12" grpId="0"/>
+      <p:bldP spid="14" grpId="0"/>
+      <p:bldP spid="15" grpId="0"/>
+      <p:bldP spid="17" grpId="0"/>
+      <p:bldP spid="18" grpId="0"/>
+      <p:bldP spid="5" grpId="0"/>
+    </p:bldLst>
+  </p:timing>
 </p:sld>
 </file>
 
@@ -11492,6 +14612,522 @@
   <p:clrMapOvr>
     <a:masterClrMapping/>
   </p:clrMapOvr>
+  <p:timing>
+    <p:tnLst>
+      <p:par>
+        <p:cTn id="1" dur="indefinite" restart="never" nodeType="tmRoot">
+          <p:childTnLst>
+            <p:seq concurrent="1" nextAc="seek">
+              <p:cTn id="2" dur="indefinite" nodeType="mainSeq">
+                <p:childTnLst>
+                  <p:par>
+                    <p:cTn id="3" fill="hold">
+                      <p:stCondLst>
+                        <p:cond delay="indefinite"/>
+                      </p:stCondLst>
+                      <p:childTnLst>
+                        <p:par>
+                          <p:cTn id="4" fill="hold">
+                            <p:stCondLst>
+                              <p:cond delay="0"/>
+                            </p:stCondLst>
+                            <p:childTnLst>
+                              <p:par>
+                                <p:cTn id="5" presetID="1" presetClass="entr" presetSubtype="0" fill="hold" grpId="0" nodeType="clickEffect">
+                                  <p:stCondLst>
+                                    <p:cond delay="0"/>
+                                  </p:stCondLst>
+                                  <p:childTnLst>
+                                    <p:set>
+                                      <p:cBhvr>
+                                        <p:cTn id="6" dur="1" fill="hold">
+                                          <p:stCondLst>
+                                            <p:cond delay="0"/>
+                                          </p:stCondLst>
+                                        </p:cTn>
+                                        <p:tgtEl>
+                                          <p:spTgt spid="30"/>
+                                        </p:tgtEl>
+                                        <p:attrNameLst>
+                                          <p:attrName>style.visibility</p:attrName>
+                                        </p:attrNameLst>
+                                      </p:cBhvr>
+                                      <p:to>
+                                        <p:strVal val="visible"/>
+                                      </p:to>
+                                    </p:set>
+                                  </p:childTnLst>
+                                </p:cTn>
+                              </p:par>
+                            </p:childTnLst>
+                          </p:cTn>
+                        </p:par>
+                      </p:childTnLst>
+                    </p:cTn>
+                  </p:par>
+                  <p:par>
+                    <p:cTn id="7" fill="hold">
+                      <p:stCondLst>
+                        <p:cond delay="indefinite"/>
+                      </p:stCondLst>
+                      <p:childTnLst>
+                        <p:par>
+                          <p:cTn id="8" fill="hold">
+                            <p:stCondLst>
+                              <p:cond delay="0"/>
+                            </p:stCondLst>
+                            <p:childTnLst>
+                              <p:par>
+                                <p:cTn id="9" presetID="1" presetClass="entr" presetSubtype="0" fill="hold" grpId="0" nodeType="clickEffect">
+                                  <p:stCondLst>
+                                    <p:cond delay="0"/>
+                                  </p:stCondLst>
+                                  <p:childTnLst>
+                                    <p:set>
+                                      <p:cBhvr>
+                                        <p:cTn id="10" dur="1" fill="hold">
+                                          <p:stCondLst>
+                                            <p:cond delay="0"/>
+                                          </p:stCondLst>
+                                        </p:cTn>
+                                        <p:tgtEl>
+                                          <p:spTgt spid="7"/>
+                                        </p:tgtEl>
+                                        <p:attrNameLst>
+                                          <p:attrName>style.visibility</p:attrName>
+                                        </p:attrNameLst>
+                                      </p:cBhvr>
+                                      <p:to>
+                                        <p:strVal val="visible"/>
+                                      </p:to>
+                                    </p:set>
+                                  </p:childTnLst>
+                                </p:cTn>
+                              </p:par>
+                              <p:par>
+                                <p:cTn id="11" presetID="1" presetClass="entr" presetSubtype="0" fill="hold" grpId="0" nodeType="withEffect">
+                                  <p:stCondLst>
+                                    <p:cond delay="0"/>
+                                  </p:stCondLst>
+                                  <p:childTnLst>
+                                    <p:set>
+                                      <p:cBhvr>
+                                        <p:cTn id="12" dur="1" fill="hold">
+                                          <p:stCondLst>
+                                            <p:cond delay="0"/>
+                                          </p:stCondLst>
+                                        </p:cTn>
+                                        <p:tgtEl>
+                                          <p:spTgt spid="9"/>
+                                        </p:tgtEl>
+                                        <p:attrNameLst>
+                                          <p:attrName>style.visibility</p:attrName>
+                                        </p:attrNameLst>
+                                      </p:cBhvr>
+                                      <p:to>
+                                        <p:strVal val="visible"/>
+                                      </p:to>
+                                    </p:set>
+                                  </p:childTnLst>
+                                </p:cTn>
+                              </p:par>
+                              <p:par>
+                                <p:cTn id="13" presetID="1" presetClass="entr" presetSubtype="0" fill="hold" grpId="0" nodeType="withEffect">
+                                  <p:stCondLst>
+                                    <p:cond delay="0"/>
+                                  </p:stCondLst>
+                                  <p:childTnLst>
+                                    <p:set>
+                                      <p:cBhvr>
+                                        <p:cTn id="14" dur="1" fill="hold">
+                                          <p:stCondLst>
+                                            <p:cond delay="0"/>
+                                          </p:stCondLst>
+                                        </p:cTn>
+                                        <p:tgtEl>
+                                          <p:spTgt spid="11"/>
+                                        </p:tgtEl>
+                                        <p:attrNameLst>
+                                          <p:attrName>style.visibility</p:attrName>
+                                        </p:attrNameLst>
+                                      </p:cBhvr>
+                                      <p:to>
+                                        <p:strVal val="visible"/>
+                                      </p:to>
+                                    </p:set>
+                                  </p:childTnLst>
+                                </p:cTn>
+                              </p:par>
+                              <p:par>
+                                <p:cTn id="15" presetID="1" presetClass="entr" presetSubtype="0" fill="hold" grpId="0" nodeType="withEffect">
+                                  <p:stCondLst>
+                                    <p:cond delay="0"/>
+                                  </p:stCondLst>
+                                  <p:childTnLst>
+                                    <p:set>
+                                      <p:cBhvr>
+                                        <p:cTn id="16" dur="1" fill="hold">
+                                          <p:stCondLst>
+                                            <p:cond delay="0"/>
+                                          </p:stCondLst>
+                                        </p:cTn>
+                                        <p:tgtEl>
+                                          <p:spTgt spid="14"/>
+                                        </p:tgtEl>
+                                        <p:attrNameLst>
+                                          <p:attrName>style.visibility</p:attrName>
+                                        </p:attrNameLst>
+                                      </p:cBhvr>
+                                      <p:to>
+                                        <p:strVal val="visible"/>
+                                      </p:to>
+                                    </p:set>
+                                  </p:childTnLst>
+                                </p:cTn>
+                              </p:par>
+                              <p:par>
+                                <p:cTn id="17" presetID="1" presetClass="entr" presetSubtype="0" fill="hold" grpId="0" nodeType="withEffect">
+                                  <p:stCondLst>
+                                    <p:cond delay="0"/>
+                                  </p:stCondLst>
+                                  <p:childTnLst>
+                                    <p:set>
+                                      <p:cBhvr>
+                                        <p:cTn id="18" dur="1" fill="hold">
+                                          <p:stCondLst>
+                                            <p:cond delay="0"/>
+                                          </p:stCondLst>
+                                        </p:cTn>
+                                        <p:tgtEl>
+                                          <p:spTgt spid="17"/>
+                                        </p:tgtEl>
+                                        <p:attrNameLst>
+                                          <p:attrName>style.visibility</p:attrName>
+                                        </p:attrNameLst>
+                                      </p:cBhvr>
+                                      <p:to>
+                                        <p:strVal val="visible"/>
+                                      </p:to>
+                                    </p:set>
+                                  </p:childTnLst>
+                                </p:cTn>
+                              </p:par>
+                              <p:par>
+                                <p:cTn id="19" presetID="1" presetClass="entr" presetSubtype="0" fill="hold" grpId="0" nodeType="withEffect">
+                                  <p:stCondLst>
+                                    <p:cond delay="0"/>
+                                  </p:stCondLst>
+                                  <p:childTnLst>
+                                    <p:set>
+                                      <p:cBhvr>
+                                        <p:cTn id="20" dur="1" fill="hold">
+                                          <p:stCondLst>
+                                            <p:cond delay="0"/>
+                                          </p:stCondLst>
+                                        </p:cTn>
+                                        <p:tgtEl>
+                                          <p:spTgt spid="18"/>
+                                        </p:tgtEl>
+                                        <p:attrNameLst>
+                                          <p:attrName>style.visibility</p:attrName>
+                                        </p:attrNameLst>
+                                      </p:cBhvr>
+                                      <p:to>
+                                        <p:strVal val="visible"/>
+                                      </p:to>
+                                    </p:set>
+                                  </p:childTnLst>
+                                </p:cTn>
+                              </p:par>
+                              <p:par>
+                                <p:cTn id="21" presetID="1" presetClass="entr" presetSubtype="0" fill="hold" grpId="0" nodeType="withEffect">
+                                  <p:stCondLst>
+                                    <p:cond delay="0"/>
+                                  </p:stCondLst>
+                                  <p:childTnLst>
+                                    <p:set>
+                                      <p:cBhvr>
+                                        <p:cTn id="22" dur="1" fill="hold">
+                                          <p:stCondLst>
+                                            <p:cond delay="0"/>
+                                          </p:stCondLst>
+                                        </p:cTn>
+                                        <p:tgtEl>
+                                          <p:spTgt spid="19"/>
+                                        </p:tgtEl>
+                                        <p:attrNameLst>
+                                          <p:attrName>style.visibility</p:attrName>
+                                        </p:attrNameLst>
+                                      </p:cBhvr>
+                                      <p:to>
+                                        <p:strVal val="visible"/>
+                                      </p:to>
+                                    </p:set>
+                                  </p:childTnLst>
+                                </p:cTn>
+                              </p:par>
+                              <p:par>
+                                <p:cTn id="23" presetID="1" presetClass="entr" presetSubtype="0" fill="hold" grpId="0" nodeType="withEffect">
+                                  <p:stCondLst>
+                                    <p:cond delay="0"/>
+                                  </p:stCondLst>
+                                  <p:childTnLst>
+                                    <p:set>
+                                      <p:cBhvr>
+                                        <p:cTn id="24" dur="1" fill="hold">
+                                          <p:stCondLst>
+                                            <p:cond delay="0"/>
+                                          </p:stCondLst>
+                                        </p:cTn>
+                                        <p:tgtEl>
+                                          <p:spTgt spid="20"/>
+                                        </p:tgtEl>
+                                        <p:attrNameLst>
+                                          <p:attrName>style.visibility</p:attrName>
+                                        </p:attrNameLst>
+                                      </p:cBhvr>
+                                      <p:to>
+                                        <p:strVal val="visible"/>
+                                      </p:to>
+                                    </p:set>
+                                  </p:childTnLst>
+                                </p:cTn>
+                              </p:par>
+                              <p:par>
+                                <p:cTn id="25" presetID="1" presetClass="entr" presetSubtype="0" fill="hold" grpId="0" nodeType="withEffect">
+                                  <p:stCondLst>
+                                    <p:cond delay="0"/>
+                                  </p:stCondLst>
+                                  <p:childTnLst>
+                                    <p:set>
+                                      <p:cBhvr>
+                                        <p:cTn id="26" dur="1" fill="hold">
+                                          <p:stCondLst>
+                                            <p:cond delay="0"/>
+                                          </p:stCondLst>
+                                        </p:cTn>
+                                        <p:tgtEl>
+                                          <p:spTgt spid="22"/>
+                                        </p:tgtEl>
+                                        <p:attrNameLst>
+                                          <p:attrName>style.visibility</p:attrName>
+                                        </p:attrNameLst>
+                                      </p:cBhvr>
+                                      <p:to>
+                                        <p:strVal val="visible"/>
+                                      </p:to>
+                                    </p:set>
+                                  </p:childTnLst>
+                                </p:cTn>
+                              </p:par>
+                              <p:par>
+                                <p:cTn id="27" presetID="1" presetClass="entr" presetSubtype="0" fill="hold" grpId="0" nodeType="withEffect">
+                                  <p:stCondLst>
+                                    <p:cond delay="0"/>
+                                  </p:stCondLst>
+                                  <p:childTnLst>
+                                    <p:set>
+                                      <p:cBhvr>
+                                        <p:cTn id="28" dur="1" fill="hold">
+                                          <p:stCondLst>
+                                            <p:cond delay="0"/>
+                                          </p:stCondLst>
+                                        </p:cTn>
+                                        <p:tgtEl>
+                                          <p:spTgt spid="23"/>
+                                        </p:tgtEl>
+                                        <p:attrNameLst>
+                                          <p:attrName>style.visibility</p:attrName>
+                                        </p:attrNameLst>
+                                      </p:cBhvr>
+                                      <p:to>
+                                        <p:strVal val="visible"/>
+                                      </p:to>
+                                    </p:set>
+                                  </p:childTnLst>
+                                </p:cTn>
+                              </p:par>
+                              <p:par>
+                                <p:cTn id="29" presetID="1" presetClass="entr" presetSubtype="0" fill="hold" grpId="0" nodeType="withEffect">
+                                  <p:stCondLst>
+                                    <p:cond delay="0"/>
+                                  </p:stCondLst>
+                                  <p:childTnLst>
+                                    <p:set>
+                                      <p:cBhvr>
+                                        <p:cTn id="30" dur="1" fill="hold">
+                                          <p:stCondLst>
+                                            <p:cond delay="0"/>
+                                          </p:stCondLst>
+                                        </p:cTn>
+                                        <p:tgtEl>
+                                          <p:spTgt spid="24"/>
+                                        </p:tgtEl>
+                                        <p:attrNameLst>
+                                          <p:attrName>style.visibility</p:attrName>
+                                        </p:attrNameLst>
+                                      </p:cBhvr>
+                                      <p:to>
+                                        <p:strVal val="visible"/>
+                                      </p:to>
+                                    </p:set>
+                                  </p:childTnLst>
+                                </p:cTn>
+                              </p:par>
+                              <p:par>
+                                <p:cTn id="31" presetID="1" presetClass="entr" presetSubtype="0" fill="hold" grpId="0" nodeType="withEffect">
+                                  <p:stCondLst>
+                                    <p:cond delay="0"/>
+                                  </p:stCondLst>
+                                  <p:childTnLst>
+                                    <p:set>
+                                      <p:cBhvr>
+                                        <p:cTn id="32" dur="1" fill="hold">
+                                          <p:stCondLst>
+                                            <p:cond delay="0"/>
+                                          </p:stCondLst>
+                                        </p:cTn>
+                                        <p:tgtEl>
+                                          <p:spTgt spid="25"/>
+                                        </p:tgtEl>
+                                        <p:attrNameLst>
+                                          <p:attrName>style.visibility</p:attrName>
+                                        </p:attrNameLst>
+                                      </p:cBhvr>
+                                      <p:to>
+                                        <p:strVal val="visible"/>
+                                      </p:to>
+                                    </p:set>
+                                  </p:childTnLst>
+                                </p:cTn>
+                              </p:par>
+                              <p:par>
+                                <p:cTn id="33" presetID="1" presetClass="entr" presetSubtype="0" fill="hold" grpId="0" nodeType="withEffect">
+                                  <p:stCondLst>
+                                    <p:cond delay="0"/>
+                                  </p:stCondLst>
+                                  <p:childTnLst>
+                                    <p:set>
+                                      <p:cBhvr>
+                                        <p:cTn id="34" dur="1" fill="hold">
+                                          <p:stCondLst>
+                                            <p:cond delay="0"/>
+                                          </p:stCondLst>
+                                        </p:cTn>
+                                        <p:tgtEl>
+                                          <p:spTgt spid="26"/>
+                                        </p:tgtEl>
+                                        <p:attrNameLst>
+                                          <p:attrName>style.visibility</p:attrName>
+                                        </p:attrNameLst>
+                                      </p:cBhvr>
+                                      <p:to>
+                                        <p:strVal val="visible"/>
+                                      </p:to>
+                                    </p:set>
+                                  </p:childTnLst>
+                                </p:cTn>
+                              </p:par>
+                              <p:par>
+                                <p:cTn id="35" presetID="1" presetClass="entr" presetSubtype="0" fill="hold" grpId="0" nodeType="withEffect">
+                                  <p:stCondLst>
+                                    <p:cond delay="0"/>
+                                  </p:stCondLst>
+                                  <p:childTnLst>
+                                    <p:set>
+                                      <p:cBhvr>
+                                        <p:cTn id="36" dur="1" fill="hold">
+                                          <p:stCondLst>
+                                            <p:cond delay="0"/>
+                                          </p:stCondLst>
+                                        </p:cTn>
+                                        <p:tgtEl>
+                                          <p:spTgt spid="27"/>
+                                        </p:tgtEl>
+                                        <p:attrNameLst>
+                                          <p:attrName>style.visibility</p:attrName>
+                                        </p:attrNameLst>
+                                      </p:cBhvr>
+                                      <p:to>
+                                        <p:strVal val="visible"/>
+                                      </p:to>
+                                    </p:set>
+                                  </p:childTnLst>
+                                </p:cTn>
+                              </p:par>
+                              <p:par>
+                                <p:cTn id="37" presetID="1" presetClass="entr" presetSubtype="0" fill="hold" grpId="0" nodeType="withEffect">
+                                  <p:stCondLst>
+                                    <p:cond delay="0"/>
+                                  </p:stCondLst>
+                                  <p:childTnLst>
+                                    <p:set>
+                                      <p:cBhvr>
+                                        <p:cTn id="38" dur="1" fill="hold">
+                                          <p:stCondLst>
+                                            <p:cond delay="0"/>
+                                          </p:stCondLst>
+                                        </p:cTn>
+                                        <p:tgtEl>
+                                          <p:spTgt spid="29"/>
+                                        </p:tgtEl>
+                                        <p:attrNameLst>
+                                          <p:attrName>style.visibility</p:attrName>
+                                        </p:attrNameLst>
+                                      </p:cBhvr>
+                                      <p:to>
+                                        <p:strVal val="visible"/>
+                                      </p:to>
+                                    </p:set>
+                                  </p:childTnLst>
+                                </p:cTn>
+                              </p:par>
+                            </p:childTnLst>
+                          </p:cTn>
+                        </p:par>
+                      </p:childTnLst>
+                    </p:cTn>
+                  </p:par>
+                </p:childTnLst>
+              </p:cTn>
+              <p:prevCondLst>
+                <p:cond evt="onPrev" delay="0">
+                  <p:tgtEl>
+                    <p:sldTgt/>
+                  </p:tgtEl>
+                </p:cond>
+              </p:prevCondLst>
+              <p:nextCondLst>
+                <p:cond evt="onNext" delay="0">
+                  <p:tgtEl>
+                    <p:sldTgt/>
+                  </p:tgtEl>
+                </p:cond>
+              </p:nextCondLst>
+            </p:seq>
+          </p:childTnLst>
+        </p:cTn>
+      </p:par>
+    </p:tnLst>
+    <p:bldLst>
+      <p:bldP spid="7" grpId="0"/>
+      <p:bldP spid="9" grpId="0"/>
+      <p:bldP spid="11" grpId="0"/>
+      <p:bldP spid="14" grpId="0"/>
+      <p:bldP spid="17" grpId="0"/>
+      <p:bldP spid="18" grpId="0"/>
+      <p:bldP spid="19" grpId="0"/>
+      <p:bldP spid="20" grpId="0"/>
+      <p:bldP spid="22" grpId="0"/>
+      <p:bldP spid="23" grpId="0"/>
+      <p:bldP spid="24" grpId="0"/>
+      <p:bldP spid="25" grpId="0"/>
+      <p:bldP spid="26" grpId="0"/>
+      <p:bldP spid="27" grpId="0"/>
+      <p:bldP spid="29" grpId="0" animBg="1"/>
+      <p:bldP spid="30" grpId="0"/>
+    </p:bldLst>
+  </p:timing>
 </p:sld>
 </file>
 
@@ -12340,6 +15976,410 @@
   <p:clrMapOvr>
     <a:masterClrMapping/>
   </p:clrMapOvr>
+  <p:timing>
+    <p:tnLst>
+      <p:par>
+        <p:cTn id="1" dur="indefinite" restart="never" nodeType="tmRoot">
+          <p:childTnLst>
+            <p:seq concurrent="1" nextAc="seek">
+              <p:cTn id="2" dur="indefinite" nodeType="mainSeq">
+                <p:childTnLst>
+                  <p:par>
+                    <p:cTn id="3" fill="hold">
+                      <p:stCondLst>
+                        <p:cond delay="indefinite"/>
+                      </p:stCondLst>
+                      <p:childTnLst>
+                        <p:par>
+                          <p:cTn id="4" fill="hold">
+                            <p:stCondLst>
+                              <p:cond delay="0"/>
+                            </p:stCondLst>
+                            <p:childTnLst>
+                              <p:par>
+                                <p:cTn id="5" presetID="1" presetClass="entr" presetSubtype="0" fill="hold" grpId="0" nodeType="clickEffect">
+                                  <p:stCondLst>
+                                    <p:cond delay="0"/>
+                                  </p:stCondLst>
+                                  <p:childTnLst>
+                                    <p:set>
+                                      <p:cBhvr>
+                                        <p:cTn id="6" dur="1" fill="hold">
+                                          <p:stCondLst>
+                                            <p:cond delay="0"/>
+                                          </p:stCondLst>
+                                        </p:cTn>
+                                        <p:tgtEl>
+                                          <p:spTgt spid="26"/>
+                                        </p:tgtEl>
+                                        <p:attrNameLst>
+                                          <p:attrName>style.visibility</p:attrName>
+                                        </p:attrNameLst>
+                                      </p:cBhvr>
+                                      <p:to>
+                                        <p:strVal val="visible"/>
+                                      </p:to>
+                                    </p:set>
+                                  </p:childTnLst>
+                                </p:cTn>
+                              </p:par>
+                            </p:childTnLst>
+                          </p:cTn>
+                        </p:par>
+                      </p:childTnLst>
+                    </p:cTn>
+                  </p:par>
+                  <p:par>
+                    <p:cTn id="7" fill="hold">
+                      <p:stCondLst>
+                        <p:cond delay="indefinite"/>
+                      </p:stCondLst>
+                      <p:childTnLst>
+                        <p:par>
+                          <p:cTn id="8" fill="hold">
+                            <p:stCondLst>
+                              <p:cond delay="0"/>
+                            </p:stCondLst>
+                            <p:childTnLst>
+                              <p:par>
+                                <p:cTn id="9" presetID="1" presetClass="entr" presetSubtype="0" fill="hold" grpId="0" nodeType="clickEffect">
+                                  <p:stCondLst>
+                                    <p:cond delay="0"/>
+                                  </p:stCondLst>
+                                  <p:childTnLst>
+                                    <p:set>
+                                      <p:cBhvr>
+                                        <p:cTn id="10" dur="1" fill="hold">
+                                          <p:stCondLst>
+                                            <p:cond delay="0"/>
+                                          </p:stCondLst>
+                                        </p:cTn>
+                                        <p:tgtEl>
+                                          <p:spTgt spid="8"/>
+                                        </p:tgtEl>
+                                        <p:attrNameLst>
+                                          <p:attrName>style.visibility</p:attrName>
+                                        </p:attrNameLst>
+                                      </p:cBhvr>
+                                      <p:to>
+                                        <p:strVal val="visible"/>
+                                      </p:to>
+                                    </p:set>
+                                  </p:childTnLst>
+                                </p:cTn>
+                              </p:par>
+                              <p:par>
+                                <p:cTn id="11" presetID="1" presetClass="entr" presetSubtype="0" fill="hold" grpId="0" nodeType="withEffect">
+                                  <p:stCondLst>
+                                    <p:cond delay="0"/>
+                                  </p:stCondLst>
+                                  <p:childTnLst>
+                                    <p:set>
+                                      <p:cBhvr>
+                                        <p:cTn id="12" dur="1" fill="hold">
+                                          <p:stCondLst>
+                                            <p:cond delay="0"/>
+                                          </p:stCondLst>
+                                        </p:cTn>
+                                        <p:tgtEl>
+                                          <p:spTgt spid="9"/>
+                                        </p:tgtEl>
+                                        <p:attrNameLst>
+                                          <p:attrName>style.visibility</p:attrName>
+                                        </p:attrNameLst>
+                                      </p:cBhvr>
+                                      <p:to>
+                                        <p:strVal val="visible"/>
+                                      </p:to>
+                                    </p:set>
+                                  </p:childTnLst>
+                                </p:cTn>
+                              </p:par>
+                              <p:par>
+                                <p:cTn id="13" presetID="1" presetClass="entr" presetSubtype="0" fill="hold" grpId="0" nodeType="withEffect">
+                                  <p:stCondLst>
+                                    <p:cond delay="0"/>
+                                  </p:stCondLst>
+                                  <p:childTnLst>
+                                    <p:set>
+                                      <p:cBhvr>
+                                        <p:cTn id="14" dur="1" fill="hold">
+                                          <p:stCondLst>
+                                            <p:cond delay="0"/>
+                                          </p:stCondLst>
+                                        </p:cTn>
+                                        <p:tgtEl>
+                                          <p:spTgt spid="10"/>
+                                        </p:tgtEl>
+                                        <p:attrNameLst>
+                                          <p:attrName>style.visibility</p:attrName>
+                                        </p:attrNameLst>
+                                      </p:cBhvr>
+                                      <p:to>
+                                        <p:strVal val="visible"/>
+                                      </p:to>
+                                    </p:set>
+                                  </p:childTnLst>
+                                </p:cTn>
+                              </p:par>
+                              <p:par>
+                                <p:cTn id="15" presetID="1" presetClass="entr" presetSubtype="0" fill="hold" grpId="0" nodeType="withEffect">
+                                  <p:stCondLst>
+                                    <p:cond delay="0"/>
+                                  </p:stCondLst>
+                                  <p:childTnLst>
+                                    <p:set>
+                                      <p:cBhvr>
+                                        <p:cTn id="16" dur="1" fill="hold">
+                                          <p:stCondLst>
+                                            <p:cond delay="0"/>
+                                          </p:stCondLst>
+                                        </p:cTn>
+                                        <p:tgtEl>
+                                          <p:spTgt spid="11"/>
+                                        </p:tgtEl>
+                                        <p:attrNameLst>
+                                          <p:attrName>style.visibility</p:attrName>
+                                        </p:attrNameLst>
+                                      </p:cBhvr>
+                                      <p:to>
+                                        <p:strVal val="visible"/>
+                                      </p:to>
+                                    </p:set>
+                                  </p:childTnLst>
+                                </p:cTn>
+                              </p:par>
+                              <p:par>
+                                <p:cTn id="17" presetID="1" presetClass="entr" presetSubtype="0" fill="hold" grpId="0" nodeType="withEffect">
+                                  <p:stCondLst>
+                                    <p:cond delay="0"/>
+                                  </p:stCondLst>
+                                  <p:childTnLst>
+                                    <p:set>
+                                      <p:cBhvr>
+                                        <p:cTn id="18" dur="1" fill="hold">
+                                          <p:stCondLst>
+                                            <p:cond delay="0"/>
+                                          </p:stCondLst>
+                                        </p:cTn>
+                                        <p:tgtEl>
+                                          <p:spTgt spid="13"/>
+                                        </p:tgtEl>
+                                        <p:attrNameLst>
+                                          <p:attrName>style.visibility</p:attrName>
+                                        </p:attrNameLst>
+                                      </p:cBhvr>
+                                      <p:to>
+                                        <p:strVal val="visible"/>
+                                      </p:to>
+                                    </p:set>
+                                  </p:childTnLst>
+                                </p:cTn>
+                              </p:par>
+                              <p:par>
+                                <p:cTn id="19" presetID="1" presetClass="entr" presetSubtype="0" fill="hold" grpId="0" nodeType="withEffect">
+                                  <p:stCondLst>
+                                    <p:cond delay="0"/>
+                                  </p:stCondLst>
+                                  <p:childTnLst>
+                                    <p:set>
+                                      <p:cBhvr>
+                                        <p:cTn id="20" dur="1" fill="hold">
+                                          <p:stCondLst>
+                                            <p:cond delay="0"/>
+                                          </p:stCondLst>
+                                        </p:cTn>
+                                        <p:tgtEl>
+                                          <p:spTgt spid="14"/>
+                                        </p:tgtEl>
+                                        <p:attrNameLst>
+                                          <p:attrName>style.visibility</p:attrName>
+                                        </p:attrNameLst>
+                                      </p:cBhvr>
+                                      <p:to>
+                                        <p:strVal val="visible"/>
+                                      </p:to>
+                                    </p:set>
+                                  </p:childTnLst>
+                                </p:cTn>
+                              </p:par>
+                              <p:par>
+                                <p:cTn id="21" presetID="1" presetClass="entr" presetSubtype="0" fill="hold" grpId="0" nodeType="withEffect">
+                                  <p:stCondLst>
+                                    <p:cond delay="0"/>
+                                  </p:stCondLst>
+                                  <p:childTnLst>
+                                    <p:set>
+                                      <p:cBhvr>
+                                        <p:cTn id="22" dur="1" fill="hold">
+                                          <p:stCondLst>
+                                            <p:cond delay="0"/>
+                                          </p:stCondLst>
+                                        </p:cTn>
+                                        <p:tgtEl>
+                                          <p:spTgt spid="15"/>
+                                        </p:tgtEl>
+                                        <p:attrNameLst>
+                                          <p:attrName>style.visibility</p:attrName>
+                                        </p:attrNameLst>
+                                      </p:cBhvr>
+                                      <p:to>
+                                        <p:strVal val="visible"/>
+                                      </p:to>
+                                    </p:set>
+                                  </p:childTnLst>
+                                </p:cTn>
+                              </p:par>
+                              <p:par>
+                                <p:cTn id="23" presetID="1" presetClass="entr" presetSubtype="0" fill="hold" grpId="0" nodeType="withEffect">
+                                  <p:stCondLst>
+                                    <p:cond delay="0"/>
+                                  </p:stCondLst>
+                                  <p:childTnLst>
+                                    <p:set>
+                                      <p:cBhvr>
+                                        <p:cTn id="24" dur="1" fill="hold">
+                                          <p:stCondLst>
+                                            <p:cond delay="0"/>
+                                          </p:stCondLst>
+                                        </p:cTn>
+                                        <p:tgtEl>
+                                          <p:spTgt spid="16"/>
+                                        </p:tgtEl>
+                                        <p:attrNameLst>
+                                          <p:attrName>style.visibility</p:attrName>
+                                        </p:attrNameLst>
+                                      </p:cBhvr>
+                                      <p:to>
+                                        <p:strVal val="visible"/>
+                                      </p:to>
+                                    </p:set>
+                                  </p:childTnLst>
+                                </p:cTn>
+                              </p:par>
+                              <p:par>
+                                <p:cTn id="25" presetID="1" presetClass="entr" presetSubtype="0" fill="hold" grpId="0" nodeType="withEffect">
+                                  <p:stCondLst>
+                                    <p:cond delay="0"/>
+                                  </p:stCondLst>
+                                  <p:childTnLst>
+                                    <p:set>
+                                      <p:cBhvr>
+                                        <p:cTn id="26" dur="1" fill="hold">
+                                          <p:stCondLst>
+                                            <p:cond delay="0"/>
+                                          </p:stCondLst>
+                                        </p:cTn>
+                                        <p:tgtEl>
+                                          <p:spTgt spid="20"/>
+                                        </p:tgtEl>
+                                        <p:attrNameLst>
+                                          <p:attrName>style.visibility</p:attrName>
+                                        </p:attrNameLst>
+                                      </p:cBhvr>
+                                      <p:to>
+                                        <p:strVal val="visible"/>
+                                      </p:to>
+                                    </p:set>
+                                  </p:childTnLst>
+                                </p:cTn>
+                              </p:par>
+                              <p:par>
+                                <p:cTn id="27" presetID="1" presetClass="entr" presetSubtype="0" fill="hold" grpId="0" nodeType="withEffect">
+                                  <p:stCondLst>
+                                    <p:cond delay="0"/>
+                                  </p:stCondLst>
+                                  <p:childTnLst>
+                                    <p:set>
+                                      <p:cBhvr>
+                                        <p:cTn id="28" dur="1" fill="hold">
+                                          <p:stCondLst>
+                                            <p:cond delay="0"/>
+                                          </p:stCondLst>
+                                        </p:cTn>
+                                        <p:tgtEl>
+                                          <p:spTgt spid="21"/>
+                                        </p:tgtEl>
+                                        <p:attrNameLst>
+                                          <p:attrName>style.visibility</p:attrName>
+                                        </p:attrNameLst>
+                                      </p:cBhvr>
+                                      <p:to>
+                                        <p:strVal val="visible"/>
+                                      </p:to>
+                                    </p:set>
+                                  </p:childTnLst>
+                                </p:cTn>
+                              </p:par>
+                              <p:par>
+                                <p:cTn id="29" presetID="1" presetClass="entr" presetSubtype="0" fill="hold" grpId="0" nodeType="withEffect">
+                                  <p:stCondLst>
+                                    <p:cond delay="0"/>
+                                  </p:stCondLst>
+                                  <p:childTnLst>
+                                    <p:set>
+                                      <p:cBhvr>
+                                        <p:cTn id="30" dur="1" fill="hold">
+                                          <p:stCondLst>
+                                            <p:cond delay="0"/>
+                                          </p:stCondLst>
+                                        </p:cTn>
+                                        <p:tgtEl>
+                                          <p:spTgt spid="25"/>
+                                        </p:tgtEl>
+                                        <p:attrNameLst>
+                                          <p:attrName>style.visibility</p:attrName>
+                                        </p:attrNameLst>
+                                      </p:cBhvr>
+                                      <p:to>
+                                        <p:strVal val="visible"/>
+                                      </p:to>
+                                    </p:set>
+                                  </p:childTnLst>
+                                </p:cTn>
+                              </p:par>
+                            </p:childTnLst>
+                          </p:cTn>
+                        </p:par>
+                      </p:childTnLst>
+                    </p:cTn>
+                  </p:par>
+                </p:childTnLst>
+              </p:cTn>
+              <p:prevCondLst>
+                <p:cond evt="onPrev" delay="0">
+                  <p:tgtEl>
+                    <p:sldTgt/>
+                  </p:tgtEl>
+                </p:cond>
+              </p:prevCondLst>
+              <p:nextCondLst>
+                <p:cond evt="onNext" delay="0">
+                  <p:tgtEl>
+                    <p:sldTgt/>
+                  </p:tgtEl>
+                </p:cond>
+              </p:nextCondLst>
+            </p:seq>
+          </p:childTnLst>
+        </p:cTn>
+      </p:par>
+    </p:tnLst>
+    <p:bldLst>
+      <p:bldP spid="8" grpId="0"/>
+      <p:bldP spid="9" grpId="0"/>
+      <p:bldP spid="10" grpId="0"/>
+      <p:bldP spid="11" grpId="0"/>
+      <p:bldP spid="13" grpId="0"/>
+      <p:bldP spid="14" grpId="0"/>
+      <p:bldP spid="15" grpId="0"/>
+      <p:bldP spid="16" grpId="0"/>
+      <p:bldP spid="20" grpId="0"/>
+      <p:bldP spid="21" grpId="0"/>
+      <p:bldP spid="25" grpId="0" animBg="1"/>
+      <p:bldP spid="26" grpId="0"/>
+    </p:bldLst>
+  </p:timing>
 </p:sld>
 </file>
 

</xml_diff>